<commit_message>
updated guide references to PostgreSQL
</commit_message>
<xml_diff>
--- a/Whiteboard design session/WDS trainer presentation - Continuous delivery in Azure DevOps.pptx
+++ b/Whiteboard design session/WDS trainer presentation - Continuous delivery in Azure DevOps.pptx
@@ -18,7 +18,7 @@
     <p:sldId id="337" r:id="rId9"/>
     <p:sldId id="338" r:id="rId10"/>
     <p:sldId id="339" r:id="rId11"/>
-    <p:sldId id="325" r:id="rId12"/>
+    <p:sldId id="358" r:id="rId12"/>
     <p:sldId id="326" r:id="rId13"/>
     <p:sldId id="340" r:id="rId14"/>
     <p:sldId id="352" r:id="rId15"/>
@@ -231,7 +231,7 @@
           <a:p>
             <a:fld id="{52A13B17-C506-4D51-BB37-16B365906619}" type="datetimeFigureOut">
               <a:rPr lang="en-US" smtClean="0"/>
-              <a:t>8/11/19</a:t>
+              <a:t>8/28/19</a:t>
             </a:fld>
             <a:endParaRPr lang="en-US" dirty="0"/>
           </a:p>
@@ -736,18 +736,78 @@
           <a:bodyPr/>
           <a:lstStyle/>
           <a:p>
+            <a:pPr marL="0" marR="0" lvl="0" indent="0" algn="r" defTabSz="914400" rtl="0" eaLnBrk="1" fontAlgn="auto" latinLnBrk="0" hangingPunct="1">
+              <a:lnSpc>
+                <a:spcPct val="100000"/>
+              </a:lnSpc>
+              <a:spcBef>
+                <a:spcPts val="0"/>
+              </a:spcBef>
+              <a:spcAft>
+                <a:spcPts val="0"/>
+              </a:spcAft>
+              <a:buClrTx/>
+              <a:buSzTx/>
+              <a:buFontTx/>
+              <a:buNone/>
+              <a:tabLst/>
+              <a:defRPr/>
+            </a:pPr>
             <a:fld id="{0998D5BB-B127-481F-BC0A-2F77C576BB34}" type="slidenum">
-              <a:rPr lang="en-US" smtClean="0"/>
+              <a:rPr kumimoji="0" lang="en-US" sz="1200" b="0" i="0" u="none" strike="noStrike" kern="1200" cap="none" spc="0" normalizeH="0" baseline="0" noProof="0" smtClean="0">
+                <a:ln>
+                  <a:noFill/>
+                </a:ln>
+                <a:solidFill>
+                  <a:prstClr val="black"/>
+                </a:solidFill>
+                <a:effectLst/>
+                <a:uLnTx/>
+                <a:uFillTx/>
+                <a:latin typeface="Calibri" panose="020F0502020204030204"/>
+                <a:ea typeface="+mn-ea"/>
+                <a:cs typeface="+mn-cs"/>
+              </a:rPr>
+              <a:pPr marL="0" marR="0" lvl="0" indent="0" algn="r" defTabSz="914400" rtl="0" eaLnBrk="1" fontAlgn="auto" latinLnBrk="0" hangingPunct="1">
+                <a:lnSpc>
+                  <a:spcPct val="100000"/>
+                </a:lnSpc>
+                <a:spcBef>
+                  <a:spcPts val="0"/>
+                </a:spcBef>
+                <a:spcAft>
+                  <a:spcPts val="0"/>
+                </a:spcAft>
+                <a:buClrTx/>
+                <a:buSzTx/>
+                <a:buFontTx/>
+                <a:buNone/>
+                <a:tabLst/>
+                <a:defRPr/>
+              </a:pPr>
               <a:t>10</a:t>
             </a:fld>
-            <a:endParaRPr lang="en-US" dirty="0"/>
+            <a:endParaRPr kumimoji="0" lang="en-US" sz="1200" b="0" i="0" u="none" strike="noStrike" kern="1200" cap="none" spc="0" normalizeH="0" baseline="0" noProof="0" dirty="0">
+              <a:ln>
+                <a:noFill/>
+              </a:ln>
+              <a:solidFill>
+                <a:prstClr val="black"/>
+              </a:solidFill>
+              <a:effectLst/>
+              <a:uLnTx/>
+              <a:uFillTx/>
+              <a:latin typeface="Calibri" panose="020F0502020204030204"/>
+              <a:ea typeface="+mn-ea"/>
+              <a:cs typeface="+mn-cs"/>
+            </a:endParaRPr>
           </a:p>
         </p:txBody>
       </p:sp>
     </p:spTree>
     <p:extLst>
       <p:ext uri="{BB962C8B-B14F-4D97-AF65-F5344CB8AC3E}">
-        <p14:creationId xmlns:p14="http://schemas.microsoft.com/office/powerpoint/2010/main" val="104500755"/>
+        <p14:creationId xmlns:p14="http://schemas.microsoft.com/office/powerpoint/2010/main" val="1278718907"/>
       </p:ext>
     </p:extLst>
   </p:cSld>
@@ -3177,7 +3237,7 @@
                   <a:prstClr val="black"/>
                 </a:solidFill>
               </a:rPr>
-              <a:t>8/11/19 10:53 PM</a:t>
+              <a:t>8/28/19 4:26 PM</a:t>
             </a:fld>
             <a:endParaRPr lang="en-US" dirty="0">
               <a:solidFill>
@@ -15887,65 +15947,23 @@
       </p:grpSpPr>
       <p:sp>
         <p:nvSpPr>
-          <p:cNvPr id="40" name="Title 1">
-            <a:extLst>
-              <a:ext uri="{FF2B5EF4-FFF2-40B4-BE49-F238E27FC236}">
-                <a16:creationId xmlns:a16="http://schemas.microsoft.com/office/drawing/2014/main" id="{800E309D-D3E2-4D48-8D86-DDC4599A0398}"/>
-              </a:ext>
-            </a:extLst>
-          </p:cNvPr>
-          <p:cNvSpPr txBox="1">
-            <a:spLocks/>
+          <p:cNvPr id="2" name="Title 1"/>
+          <p:cNvSpPr>
+            <a:spLocks noGrp="1"/>
           </p:cNvSpPr>
-          <p:nvPr/>
+          <p:nvPr>
+            <p:ph type="title"/>
+          </p:nvPr>
         </p:nvSpPr>
-        <p:spPr>
-          <a:xfrm>
-            <a:off x="269240" y="289511"/>
-            <a:ext cx="11655840" cy="899665"/>
-          </a:xfrm>
-          <a:prstGeom prst="rect">
-            <a:avLst/>
-          </a:prstGeom>
-        </p:spPr>
+        <p:spPr/>
         <p:txBody>
-          <a:bodyPr vert="horz" wrap="square" lIns="146304" tIns="91440" rIns="146304" bIns="91440" rtlCol="0" anchor="t">
+          <a:bodyPr>
             <a:normAutofit/>
           </a:bodyPr>
-          <a:lstStyle>
-            <a:lvl1pPr algn="l" defTabSz="914367" rtl="0" eaLnBrk="1" latinLnBrk="0" hangingPunct="1">
-              <a:lnSpc>
-                <a:spcPct val="90000"/>
-              </a:lnSpc>
-              <a:spcBef>
-                <a:spcPct val="0"/>
-              </a:spcBef>
-              <a:buNone/>
-              <a:defRPr lang="en-US" sz="4705" b="0" kern="1200" cap="none" spc="-100" baseline="0" dirty="0" smtClean="0">
-                <a:ln w="3175">
-                  <a:noFill/>
-                </a:ln>
-                <a:gradFill>
-                  <a:gsLst>
-                    <a:gs pos="1250">
-                      <a:schemeClr val="tx1"/>
-                    </a:gs>
-                    <a:gs pos="100000">
-                      <a:schemeClr val="tx1"/>
-                    </a:gs>
-                  </a:gsLst>
-                  <a:lin ang="5400000" scaled="0"/>
-                </a:gradFill>
-                <a:effectLst/>
-                <a:latin typeface="+mj-lt"/>
-                <a:ea typeface="+mn-ea"/>
-                <a:cs typeface="Segoe UI" pitchFamily="34" charset="0"/>
-              </a:defRPr>
-            </a:lvl1pPr>
-          </a:lstStyle>
-          <a:p>
-            <a:r>
-              <a:rPr lang="en-US" sz="4400">
+          <a:lstStyle/>
+          <a:p>
+            <a:r>
+              <a:rPr lang="en-US" sz="4400" dirty="0">
                 <a:solidFill>
                   <a:schemeClr val="tx1"/>
                 </a:solidFill>
@@ -15959,10 +15977,10 @@
       </p:sp>
       <p:sp>
         <p:nvSpPr>
-          <p:cNvPr id="41" name="Rectangle 40">
+          <p:cNvPr id="20" name="Rectangle 19">
             <a:extLst>
               <a:ext uri="{FF2B5EF4-FFF2-40B4-BE49-F238E27FC236}">
-                <a16:creationId xmlns:a16="http://schemas.microsoft.com/office/drawing/2014/main" id="{41A52B96-7B08-D242-93CF-FF1AD53540AE}"/>
+                <a16:creationId xmlns:a16="http://schemas.microsoft.com/office/drawing/2014/main" id="{A7DF9AD5-882F-4D4B-90F0-DA4ABC4F92A0}"/>
               </a:ext>
             </a:extLst>
           </p:cNvPr>
@@ -16037,10 +16055,10 @@
       </p:sp>
       <p:grpSp>
         <p:nvGrpSpPr>
-          <p:cNvPr id="42" name="Group 41">
+          <p:cNvPr id="3" name="Group 2">
             <a:extLst>
               <a:ext uri="{FF2B5EF4-FFF2-40B4-BE49-F238E27FC236}">
-                <a16:creationId xmlns:a16="http://schemas.microsoft.com/office/drawing/2014/main" id="{2E990415-33D0-DE4D-8C7C-9891F6654DBE}"/>
+                <a16:creationId xmlns:a16="http://schemas.microsoft.com/office/drawing/2014/main" id="{8C99E4B3-CA1D-4B4E-B526-E6E8E985D963}"/>
               </a:ext>
             </a:extLst>
           </p:cNvPr>
@@ -16050,17 +16068,17 @@
         <p:grpSpPr>
           <a:xfrm>
             <a:off x="622299" y="2115254"/>
-            <a:ext cx="10932448" cy="4284400"/>
+            <a:ext cx="10932448" cy="4379040"/>
             <a:chOff x="622299" y="2115254"/>
-            <a:chExt cx="10932448" cy="4284400"/>
+            <a:chExt cx="10932448" cy="4379040"/>
           </a:xfrm>
         </p:grpSpPr>
         <p:grpSp>
           <p:nvGrpSpPr>
-            <p:cNvPr id="43" name="Alt text group" descr="This is a diagram of Tailspin Toys' existing solution architecture. On the left is a Visual Studio icon and the words “development,” “test,” and “master,” which represents the development team hosting its source control in Visual Studio Team Services with branches set up for development, test, and master environments.&#10;&#10;Three arrows point from these environments to a server and monitor icon on the right labeled Manual internal code review &amp; QA on local developer machines.&#10;&#10;An arrow points from this icon to another Visual Studio icon on the right labeled Visual Studio/FTP, which represents developers manually deploying updates through Visual Studio or FTP.&#10;&#10;Two arrows point from this icon to two icons on the right: on the top, Azure App Service with Web App (S3 Instance), and on the bottom, Azure SQL Database (S1 Instance)." title="Existing solution architecture diagram">
+            <p:cNvPr id="62" name="Alt text group" descr="This is a diagram of Tailspin Toys' existing solution architecture. On the left is a Visual Studio icon and the words “development,” “test,” and “master,” which represents the development team hosting its source control in Visual Studio Team Services with branches set up for development, test, and master environments.&#10;&#10;Three arrows point from these environments to a server and monitor icon on the right labeled Manual internal code review &amp; QA on local developer machines.&#10;&#10;An arrow points from this icon to another Visual Studio icon on the right labeled Visual Studio/FTP, which represents developers manually deploying updates through Visual Studio or FTP.&#10;&#10;Two arrows point from this icon to two icons on the right: on the top, Azure App Service with Web App (S3 Instance), and on the bottom, Azure SQL Database (S1 Instance)." title="Existing solution architecture diagram">
               <a:extLst>
                 <a:ext uri="{FF2B5EF4-FFF2-40B4-BE49-F238E27FC236}">
-                  <a16:creationId xmlns:a16="http://schemas.microsoft.com/office/drawing/2014/main" id="{F4B2A987-E31C-D144-8B9C-9E1E1ACC6E89}"/>
+                  <a16:creationId xmlns:a16="http://schemas.microsoft.com/office/drawing/2014/main" id="{9FF7B1F0-4816-4E25-AF53-4F383551D663}"/>
                 </a:ext>
               </a:extLst>
             </p:cNvPr>
@@ -16070,17 +16088,17 @@
           <p:grpSpPr>
             <a:xfrm>
               <a:off x="622299" y="2115254"/>
-              <a:ext cx="10932448" cy="4284400"/>
+              <a:ext cx="10932448" cy="4379040"/>
               <a:chOff x="831849" y="2115254"/>
-              <a:chExt cx="10932448" cy="4284400"/>
+              <a:chExt cx="10932448" cy="4379040"/>
             </a:xfrm>
           </p:grpSpPr>
           <p:sp>
             <p:nvSpPr>
-              <p:cNvPr id="45" name="Rectangle 44">
+              <p:cNvPr id="4" name="Rectangle 3">
                 <a:extLst>
                   <a:ext uri="{FF2B5EF4-FFF2-40B4-BE49-F238E27FC236}">
-                    <a16:creationId xmlns:a16="http://schemas.microsoft.com/office/drawing/2014/main" id="{65C3D07A-AECF-D94A-8B54-EB080692FF76}"/>
+                    <a16:creationId xmlns:a16="http://schemas.microsoft.com/office/drawing/2014/main" id="{FBE81C97-60DA-43A9-9E36-E3BB513C08BE}"/>
                   </a:ext>
                 </a:extLst>
               </p:cNvPr>
@@ -16164,10 +16182,10 @@
           </p:sp>
           <p:pic>
             <p:nvPicPr>
-              <p:cNvPr id="46" name="Picture 45">
+              <p:cNvPr id="5" name="Picture 4">
                 <a:extLst>
                   <a:ext uri="{FF2B5EF4-FFF2-40B4-BE49-F238E27FC236}">
-                    <a16:creationId xmlns:a16="http://schemas.microsoft.com/office/drawing/2014/main" id="{8DDE795C-8023-D141-8675-7D92B7F85798}"/>
+                    <a16:creationId xmlns:a16="http://schemas.microsoft.com/office/drawing/2014/main" id="{99C9F7AE-362B-4DD4-9004-223EA1DDD41E}"/>
                   </a:ext>
                 </a:extLst>
               </p:cNvPr>
@@ -16200,10 +16218,10 @@
           </p:pic>
           <p:sp>
             <p:nvSpPr>
-              <p:cNvPr id="47" name="TextBox 46">
+              <p:cNvPr id="12" name="TextBox 11">
                 <a:extLst>
                   <a:ext uri="{FF2B5EF4-FFF2-40B4-BE49-F238E27FC236}">
-                    <a16:creationId xmlns:a16="http://schemas.microsoft.com/office/drawing/2014/main" id="{67F0F8AC-847A-AA46-9383-6CBD523D5421}"/>
+                    <a16:creationId xmlns:a16="http://schemas.microsoft.com/office/drawing/2014/main" id="{379928B8-4527-4D9E-9EE7-0A4028F33FFC}"/>
                   </a:ext>
                 </a:extLst>
               </p:cNvPr>
@@ -16301,10 +16319,10 @@
           </p:sp>
           <p:sp>
             <p:nvSpPr>
-              <p:cNvPr id="48" name="TextBox 47">
+              <p:cNvPr id="13" name="TextBox 12">
                 <a:extLst>
                   <a:ext uri="{FF2B5EF4-FFF2-40B4-BE49-F238E27FC236}">
-                    <a16:creationId xmlns:a16="http://schemas.microsoft.com/office/drawing/2014/main" id="{F63D6C82-A73A-4E44-A8AE-054E12B93302}"/>
+                    <a16:creationId xmlns:a16="http://schemas.microsoft.com/office/drawing/2014/main" id="{818BDF10-2FC3-4BE3-961A-4094F58844C2}"/>
                   </a:ext>
                 </a:extLst>
               </p:cNvPr>
@@ -16314,7 +16332,7 @@
             <p:spPr>
               <a:xfrm>
                 <a:off x="9972487" y="5235488"/>
-                <a:ext cx="1781978" cy="1037207"/>
+                <a:ext cx="1781978" cy="1258806"/>
               </a:xfrm>
               <a:prstGeom prst="rect">
                 <a:avLst/>
@@ -16359,7 +16377,7 @@
                     <a:ea typeface="+mn-ea"/>
                     <a:cs typeface="+mn-cs"/>
                   </a:rPr>
-                  <a:t>Azure SQL Database</a:t>
+                  <a:t>Azure PostgreSQL Database</a:t>
                 </a:r>
               </a:p>
               <a:p>
@@ -16402,10 +16420,10 @@
           </p:sp>
           <p:cxnSp>
             <p:nvCxnSpPr>
-              <p:cNvPr id="49" name="Straight Connector 48">
+              <p:cNvPr id="19" name="Straight Connector 18">
                 <a:extLst>
                   <a:ext uri="{FF2B5EF4-FFF2-40B4-BE49-F238E27FC236}">
-                    <a16:creationId xmlns:a16="http://schemas.microsoft.com/office/drawing/2014/main" id="{416E899D-9A98-0541-BAF3-9C98C4AB8C58}"/>
+                    <a16:creationId xmlns:a16="http://schemas.microsoft.com/office/drawing/2014/main" id="{CE79BFD8-A1AF-41C1-8025-2BC4EDDA18BB}"/>
                   </a:ext>
                 </a:extLst>
               </p:cNvPr>
@@ -16445,10 +16463,10 @@
           </p:cxnSp>
           <p:grpSp>
             <p:nvGrpSpPr>
-              <p:cNvPr id="50" name="Group 49">
+              <p:cNvPr id="22" name="Group 21">
                 <a:extLst>
                   <a:ext uri="{FF2B5EF4-FFF2-40B4-BE49-F238E27FC236}">
-                    <a16:creationId xmlns:a16="http://schemas.microsoft.com/office/drawing/2014/main" id="{4F21C7CA-BA45-B64E-90EB-36D3454373F9}"/>
+                    <a16:creationId xmlns:a16="http://schemas.microsoft.com/office/drawing/2014/main" id="{FAB42331-B0AE-4792-9EFA-8058224B6627}"/>
                   </a:ext>
                 </a:extLst>
               </p:cNvPr>
@@ -16465,10 +16483,10 @@
             </p:grpSpPr>
             <p:pic>
               <p:nvPicPr>
-                <p:cNvPr id="107" name="Picture 106">
+                <p:cNvPr id="16" name="Picture 15">
                   <a:extLst>
                     <a:ext uri="{FF2B5EF4-FFF2-40B4-BE49-F238E27FC236}">
-                      <a16:creationId xmlns:a16="http://schemas.microsoft.com/office/drawing/2014/main" id="{3E2E791E-6567-EE47-AE01-FE518BDD3C21}"/>
+                      <a16:creationId xmlns:a16="http://schemas.microsoft.com/office/drawing/2014/main" id="{EFFA7D4E-2361-4D0E-8CC5-F8D2FC8A84BC}"/>
                     </a:ext>
                   </a:extLst>
                 </p:cNvPr>
@@ -16501,10 +16519,10 @@
             </p:pic>
             <p:sp>
               <p:nvSpPr>
-                <p:cNvPr id="108" name="TextBox 107">
+                <p:cNvPr id="21" name="TextBox 20">
                   <a:extLst>
                     <a:ext uri="{FF2B5EF4-FFF2-40B4-BE49-F238E27FC236}">
-                      <a16:creationId xmlns:a16="http://schemas.microsoft.com/office/drawing/2014/main" id="{EC56732A-9E54-1C4B-A62F-19E6B9CAFE0D}"/>
+                      <a16:creationId xmlns:a16="http://schemas.microsoft.com/office/drawing/2014/main" id="{2D79299A-4464-4FE2-A565-639FA864E695}"/>
                     </a:ext>
                   </a:extLst>
                 </p:cNvPr>
@@ -16567,10 +16585,10 @@
           </p:grpSp>
           <p:grpSp>
             <p:nvGrpSpPr>
-              <p:cNvPr id="51" name="Group 50">
+              <p:cNvPr id="26" name="Group 25">
                 <a:extLst>
                   <a:ext uri="{FF2B5EF4-FFF2-40B4-BE49-F238E27FC236}">
-                    <a16:creationId xmlns:a16="http://schemas.microsoft.com/office/drawing/2014/main" id="{1C179660-75AA-744A-A34E-A5FF6DC06F46}"/>
+                    <a16:creationId xmlns:a16="http://schemas.microsoft.com/office/drawing/2014/main" id="{6A155122-75A7-47B6-98DD-B3414DC9BEBB}"/>
                   </a:ext>
                 </a:extLst>
               </p:cNvPr>
@@ -16587,10 +16605,10 @@
             </p:grpSpPr>
             <p:pic>
               <p:nvPicPr>
-                <p:cNvPr id="71" name="Picture 70">
+                <p:cNvPr id="24" name="Picture 23">
                   <a:extLst>
                     <a:ext uri="{FF2B5EF4-FFF2-40B4-BE49-F238E27FC236}">
-                      <a16:creationId xmlns:a16="http://schemas.microsoft.com/office/drawing/2014/main" id="{137E7540-F2C4-0C4B-977F-9924F2BA172F}"/>
+                      <a16:creationId xmlns:a16="http://schemas.microsoft.com/office/drawing/2014/main" id="{A981FA67-EAF7-492E-BE74-06F67D281616}"/>
                     </a:ext>
                   </a:extLst>
                 </p:cNvPr>
@@ -16623,10 +16641,10 @@
             </p:pic>
             <p:sp>
               <p:nvSpPr>
-                <p:cNvPr id="106" name="TextBox 105">
+                <p:cNvPr id="25" name="TextBox 24">
                   <a:extLst>
                     <a:ext uri="{FF2B5EF4-FFF2-40B4-BE49-F238E27FC236}">
-                      <a16:creationId xmlns:a16="http://schemas.microsoft.com/office/drawing/2014/main" id="{CF6641AA-B43D-FB47-A05D-70F7F8B64BA4}"/>
+                      <a16:creationId xmlns:a16="http://schemas.microsoft.com/office/drawing/2014/main" id="{B7C0A930-D207-41F2-8BC4-EB1A2B6950EC}"/>
                     </a:ext>
                   </a:extLst>
                 </p:cNvPr>
@@ -16689,10 +16707,10 @@
           </p:grpSp>
           <p:cxnSp>
             <p:nvCxnSpPr>
-              <p:cNvPr id="52" name="Straight Connector 51">
+              <p:cNvPr id="28" name="Straight Connector 27">
                 <a:extLst>
                   <a:ext uri="{FF2B5EF4-FFF2-40B4-BE49-F238E27FC236}">
-                    <a16:creationId xmlns:a16="http://schemas.microsoft.com/office/drawing/2014/main" id="{D99AD6FA-8F55-F948-9416-C8D90DC8F056}"/>
+                    <a16:creationId xmlns:a16="http://schemas.microsoft.com/office/drawing/2014/main" id="{3E1AB382-BC5E-4EC8-9564-66DBCA755598}"/>
                   </a:ext>
                 </a:extLst>
               </p:cNvPr>
@@ -16736,10 +16754,10 @@
           </p:cxnSp>
           <p:sp>
             <p:nvSpPr>
-              <p:cNvPr id="53" name="TextBox 52">
+              <p:cNvPr id="29" name="TextBox 28">
                 <a:extLst>
                   <a:ext uri="{FF2B5EF4-FFF2-40B4-BE49-F238E27FC236}">
-                    <a16:creationId xmlns:a16="http://schemas.microsoft.com/office/drawing/2014/main" id="{BBA30D36-C9AC-CB4C-84EB-6614AC91279A}"/>
+                    <a16:creationId xmlns:a16="http://schemas.microsoft.com/office/drawing/2014/main" id="{2DE7C23F-41EF-4BBB-B466-8C52A4ED067C}"/>
                   </a:ext>
                 </a:extLst>
               </p:cNvPr>
@@ -16801,10 +16819,10 @@
           </p:sp>
           <p:grpSp>
             <p:nvGrpSpPr>
-              <p:cNvPr id="54" name="Group 53">
+              <p:cNvPr id="41" name="Group 40">
                 <a:extLst>
                   <a:ext uri="{FF2B5EF4-FFF2-40B4-BE49-F238E27FC236}">
-                    <a16:creationId xmlns:a16="http://schemas.microsoft.com/office/drawing/2014/main" id="{662E25BB-9F71-FC41-AEC1-DE7093220246}"/>
+                    <a16:creationId xmlns:a16="http://schemas.microsoft.com/office/drawing/2014/main" id="{BB7E9F7B-005E-4F38-99C4-5C402BE4DFBC}"/>
                   </a:ext>
                 </a:extLst>
               </p:cNvPr>
@@ -16821,10 +16839,10 @@
             </p:grpSpPr>
             <p:grpSp>
               <p:nvGrpSpPr>
-                <p:cNvPr id="61" name="Group 60">
+                <p:cNvPr id="40" name="Group 39">
                   <a:extLst>
                     <a:ext uri="{FF2B5EF4-FFF2-40B4-BE49-F238E27FC236}">
-                      <a16:creationId xmlns:a16="http://schemas.microsoft.com/office/drawing/2014/main" id="{630E68E0-669A-1A40-BF57-A14DFBC2C2E6}"/>
+                      <a16:creationId xmlns:a16="http://schemas.microsoft.com/office/drawing/2014/main" id="{3A1E0ACC-CDE7-4889-9C66-ED5D901F01F1}"/>
                     </a:ext>
                   </a:extLst>
                 </p:cNvPr>
@@ -16841,10 +16859,10 @@
               </p:grpSpPr>
               <p:grpSp>
                 <p:nvGrpSpPr>
-                  <p:cNvPr id="65" name="Group 64">
+                  <p:cNvPr id="39" name="Group 38">
                     <a:extLst>
                       <a:ext uri="{FF2B5EF4-FFF2-40B4-BE49-F238E27FC236}">
-                        <a16:creationId xmlns:a16="http://schemas.microsoft.com/office/drawing/2014/main" id="{63B657DA-2990-BF44-BF07-2375788BDFFB}"/>
+                        <a16:creationId xmlns:a16="http://schemas.microsoft.com/office/drawing/2014/main" id="{0FABD9B0-022A-4A6F-9AFE-EE3E9D7E6706}"/>
                       </a:ext>
                     </a:extLst>
                   </p:cNvPr>
@@ -16861,10 +16879,10 @@
                 </p:grpSpPr>
                 <p:grpSp>
                   <p:nvGrpSpPr>
-                    <p:cNvPr id="67" name="Group 66">
+                    <p:cNvPr id="10" name="Group 9">
                       <a:extLst>
                         <a:ext uri="{FF2B5EF4-FFF2-40B4-BE49-F238E27FC236}">
-                          <a16:creationId xmlns:a16="http://schemas.microsoft.com/office/drawing/2014/main" id="{DE932628-CF40-5B4C-940C-549BB3EA62BD}"/>
+                          <a16:creationId xmlns:a16="http://schemas.microsoft.com/office/drawing/2014/main" id="{93A13F4C-93BF-4E9C-8D8C-8DD2C1E4A984}"/>
                         </a:ext>
                       </a:extLst>
                     </p:cNvPr>
@@ -16881,10 +16899,10 @@
                   </p:grpSpPr>
                   <p:pic>
                     <p:nvPicPr>
-                      <p:cNvPr id="69" name="Picture 68">
+                      <p:cNvPr id="8" name="Picture 7">
                         <a:extLst>
                           <a:ext uri="{FF2B5EF4-FFF2-40B4-BE49-F238E27FC236}">
-                            <a16:creationId xmlns:a16="http://schemas.microsoft.com/office/drawing/2014/main" id="{1C5A8A26-7AB0-9245-BA4B-BE493031BA57}"/>
+                            <a16:creationId xmlns:a16="http://schemas.microsoft.com/office/drawing/2014/main" id="{887DEB18-E89F-47AF-91AF-685B1A8499C7}"/>
                           </a:ext>
                         </a:extLst>
                       </p:cNvPr>
@@ -16917,10 +16935,10 @@
                   </p:pic>
                   <p:sp>
                     <p:nvSpPr>
-                      <p:cNvPr id="70" name="TextBox 69">
+                      <p:cNvPr id="15" name="TextBox 14">
                         <a:extLst>
                           <a:ext uri="{FF2B5EF4-FFF2-40B4-BE49-F238E27FC236}">
-                            <a16:creationId xmlns:a16="http://schemas.microsoft.com/office/drawing/2014/main" id="{C55FA7D7-655A-D848-BEF0-53CDC1563A88}"/>
+                            <a16:creationId xmlns:a16="http://schemas.microsoft.com/office/drawing/2014/main" id="{9E33BAC1-87FE-47D1-9ED8-35A9BEE25DD9}"/>
                           </a:ext>
                         </a:extLst>
                       </p:cNvPr>
@@ -16983,10 +17001,10 @@
                 </p:grpSp>
                 <p:sp>
                   <p:nvSpPr>
-                    <p:cNvPr id="68" name="TextBox 67">
+                    <p:cNvPr id="30" name="TextBox 29">
                       <a:extLst>
                         <a:ext uri="{FF2B5EF4-FFF2-40B4-BE49-F238E27FC236}">
-                          <a16:creationId xmlns:a16="http://schemas.microsoft.com/office/drawing/2014/main" id="{B93A9F17-CBED-314E-905D-149570437E6D}"/>
+                          <a16:creationId xmlns:a16="http://schemas.microsoft.com/office/drawing/2014/main" id="{1FDF7D5F-A9D0-4918-BB2A-9F7923E25D61}"/>
                         </a:ext>
                       </a:extLst>
                     </p:cNvPr>
@@ -17049,10 +17067,10 @@
               </p:grpSp>
               <p:sp>
                 <p:nvSpPr>
-                  <p:cNvPr id="66" name="TextBox 65">
+                  <p:cNvPr id="31" name="TextBox 30">
                     <a:extLst>
                       <a:ext uri="{FF2B5EF4-FFF2-40B4-BE49-F238E27FC236}">
-                        <a16:creationId xmlns:a16="http://schemas.microsoft.com/office/drawing/2014/main" id="{6BD03632-3A1E-804A-B1F9-BD63773FB47A}"/>
+                        <a16:creationId xmlns:a16="http://schemas.microsoft.com/office/drawing/2014/main" id="{97C325C1-3411-417C-A0EA-CDE647C38898}"/>
                       </a:ext>
                     </a:extLst>
                   </p:cNvPr>
@@ -17115,10 +17133,10 @@
             </p:grpSp>
             <p:cxnSp>
               <p:nvCxnSpPr>
-                <p:cNvPr id="62" name="Straight Connector 61">
+                <p:cNvPr id="33" name="Straight Connector 32">
                   <a:extLst>
                     <a:ext uri="{FF2B5EF4-FFF2-40B4-BE49-F238E27FC236}">
-                      <a16:creationId xmlns:a16="http://schemas.microsoft.com/office/drawing/2014/main" id="{00F9ABB1-9FEF-D44D-ABF5-1A316E9D1185}"/>
+                      <a16:creationId xmlns:a16="http://schemas.microsoft.com/office/drawing/2014/main" id="{44A222D9-3361-4F50-9008-80E517E62892}"/>
                     </a:ext>
                   </a:extLst>
                 </p:cNvPr>
@@ -17162,10 +17180,10 @@
             </p:cxnSp>
             <p:cxnSp>
               <p:nvCxnSpPr>
-                <p:cNvPr id="63" name="Straight Connector 62">
+                <p:cNvPr id="35" name="Straight Connector 34">
                   <a:extLst>
                     <a:ext uri="{FF2B5EF4-FFF2-40B4-BE49-F238E27FC236}">
-                      <a16:creationId xmlns:a16="http://schemas.microsoft.com/office/drawing/2014/main" id="{83DCD002-A61F-844A-8241-655A82D7ED08}"/>
+                      <a16:creationId xmlns:a16="http://schemas.microsoft.com/office/drawing/2014/main" id="{C8E346AC-B8A7-402F-8F08-57E5685F01D3}"/>
                     </a:ext>
                   </a:extLst>
                 </p:cNvPr>
@@ -17209,10 +17227,10 @@
             </p:cxnSp>
             <p:cxnSp>
               <p:nvCxnSpPr>
-                <p:cNvPr id="64" name="Straight Connector 63">
+                <p:cNvPr id="36" name="Straight Connector 35">
                   <a:extLst>
                     <a:ext uri="{FF2B5EF4-FFF2-40B4-BE49-F238E27FC236}">
-                      <a16:creationId xmlns:a16="http://schemas.microsoft.com/office/drawing/2014/main" id="{8FEC06DC-ADC5-E04B-B7A3-B568A4D9CCD9}"/>
+                      <a16:creationId xmlns:a16="http://schemas.microsoft.com/office/drawing/2014/main" id="{9539FA49-B62F-47F8-BAB9-AE4DA6B56DE2}"/>
                     </a:ext>
                   </a:extLst>
                 </p:cNvPr>
@@ -17257,10 +17275,10 @@
           </p:grpSp>
           <p:cxnSp>
             <p:nvCxnSpPr>
-              <p:cNvPr id="55" name="Straight Arrow Connector 54">
+              <p:cNvPr id="51" name="Straight Arrow Connector 50">
                 <a:extLst>
                   <a:ext uri="{FF2B5EF4-FFF2-40B4-BE49-F238E27FC236}">
-                    <a16:creationId xmlns:a16="http://schemas.microsoft.com/office/drawing/2014/main" id="{2BC8E8A3-1AFB-394B-A317-DE507897BDE0}"/>
+                    <a16:creationId xmlns:a16="http://schemas.microsoft.com/office/drawing/2014/main" id="{77CD2061-C432-4FE7-BAD8-D73D69FC6E9B}"/>
                   </a:ext>
                 </a:extLst>
               </p:cNvPr>
@@ -17304,10 +17322,10 @@
           </p:cxnSp>
           <p:cxnSp>
             <p:nvCxnSpPr>
-              <p:cNvPr id="56" name="Straight Arrow Connector 55">
+              <p:cNvPr id="55" name="Straight Arrow Connector 54">
                 <a:extLst>
                   <a:ext uri="{FF2B5EF4-FFF2-40B4-BE49-F238E27FC236}">
-                    <a16:creationId xmlns:a16="http://schemas.microsoft.com/office/drawing/2014/main" id="{CACA4DF4-480B-6B4E-B080-0911265CA161}"/>
+                    <a16:creationId xmlns:a16="http://schemas.microsoft.com/office/drawing/2014/main" id="{B75395E3-E527-4B6F-B920-9C2E2A3133FF}"/>
                   </a:ext>
                 </a:extLst>
               </p:cNvPr>
@@ -17351,10 +17369,10 @@
           </p:cxnSp>
           <p:cxnSp>
             <p:nvCxnSpPr>
-              <p:cNvPr id="57" name="Straight Arrow Connector 56">
+              <p:cNvPr id="56" name="Straight Arrow Connector 55">
                 <a:extLst>
                   <a:ext uri="{FF2B5EF4-FFF2-40B4-BE49-F238E27FC236}">
-                    <a16:creationId xmlns:a16="http://schemas.microsoft.com/office/drawing/2014/main" id="{F9626C54-CDC9-5344-BA4A-C69EC1F9AB3F}"/>
+                    <a16:creationId xmlns:a16="http://schemas.microsoft.com/office/drawing/2014/main" id="{1212FB9E-3633-4C68-BC3B-C30A1BA53799}"/>
                   </a:ext>
                 </a:extLst>
               </p:cNvPr>
@@ -17398,10 +17416,10 @@
           </p:cxnSp>
           <p:cxnSp>
             <p:nvCxnSpPr>
-              <p:cNvPr id="58" name="Straight Arrow Connector 57">
+              <p:cNvPr id="57" name="Straight Arrow Connector 56">
                 <a:extLst>
                   <a:ext uri="{FF2B5EF4-FFF2-40B4-BE49-F238E27FC236}">
-                    <a16:creationId xmlns:a16="http://schemas.microsoft.com/office/drawing/2014/main" id="{3EBAA87C-2E46-7242-A3BF-E6B76F25B89E}"/>
+                    <a16:creationId xmlns:a16="http://schemas.microsoft.com/office/drawing/2014/main" id="{0664FB98-8381-4BA7-8425-5FBDE7C3D48F}"/>
                   </a:ext>
                 </a:extLst>
               </p:cNvPr>
@@ -17445,10 +17463,10 @@
           </p:cxnSp>
           <p:cxnSp>
             <p:nvCxnSpPr>
-              <p:cNvPr id="59" name="Straight Arrow Connector 58">
+              <p:cNvPr id="60" name="Straight Arrow Connector 59">
                 <a:extLst>
                   <a:ext uri="{FF2B5EF4-FFF2-40B4-BE49-F238E27FC236}">
-                    <a16:creationId xmlns:a16="http://schemas.microsoft.com/office/drawing/2014/main" id="{DEC603F4-910F-A04A-B9AD-97C1F23E7B10}"/>
+                    <a16:creationId xmlns:a16="http://schemas.microsoft.com/office/drawing/2014/main" id="{C049AD7A-F2F9-4389-9F66-F527BB91EBC1}"/>
                   </a:ext>
                 </a:extLst>
               </p:cNvPr>
@@ -17492,10 +17510,10 @@
           </p:cxnSp>
           <p:cxnSp>
             <p:nvCxnSpPr>
-              <p:cNvPr id="60" name="Straight Arrow Connector 59">
+              <p:cNvPr id="61" name="Straight Arrow Connector 60">
                 <a:extLst>
                   <a:ext uri="{FF2B5EF4-FFF2-40B4-BE49-F238E27FC236}">
-                    <a16:creationId xmlns:a16="http://schemas.microsoft.com/office/drawing/2014/main" id="{3C270B36-599D-594F-B0B5-D093C718AF6F}"/>
+                    <a16:creationId xmlns:a16="http://schemas.microsoft.com/office/drawing/2014/main" id="{385C4E28-8977-4B1F-AA9D-64A196A2E1C2}"/>
                   </a:ext>
                 </a:extLst>
               </p:cNvPr>
@@ -17540,10 +17558,10 @@
         </p:grpSp>
         <p:pic>
           <p:nvPicPr>
-            <p:cNvPr id="44" name="Picture 43">
+            <p:cNvPr id="38" name="Picture 37">
               <a:extLst>
                 <a:ext uri="{FF2B5EF4-FFF2-40B4-BE49-F238E27FC236}">
-                  <a16:creationId xmlns:a16="http://schemas.microsoft.com/office/drawing/2014/main" id="{4ECE8C4B-26BB-9F40-AA82-43E8076DEB4B}"/>
+                  <a16:creationId xmlns:a16="http://schemas.microsoft.com/office/drawing/2014/main" id="{C6DA6E5A-6E33-C541-BA30-EE98EB86F5A4}"/>
                 </a:ext>
               </a:extLst>
             </p:cNvPr>
@@ -17571,10 +17589,10 @@
       </p:grpSp>
       <p:pic>
         <p:nvPicPr>
-          <p:cNvPr id="109" name="Graphic 108">
+          <p:cNvPr id="42" name="Graphic 41">
             <a:extLst>
               <a:ext uri="{FF2B5EF4-FFF2-40B4-BE49-F238E27FC236}">
-                <a16:creationId xmlns:a16="http://schemas.microsoft.com/office/drawing/2014/main" id="{0F381CC5-3924-0E4B-BD26-7CBEE002B377}"/>
+                <a16:creationId xmlns:a16="http://schemas.microsoft.com/office/drawing/2014/main" id="{5AD105B8-7589-5445-9FBB-D4E80C14DC01}"/>
               </a:ext>
             </a:extLst>
           </p:cNvPr>
@@ -17611,7 +17629,7 @@
     </p:spTree>
     <p:extLst>
       <p:ext uri="{BB962C8B-B14F-4D97-AF65-F5344CB8AC3E}">
-        <p14:creationId xmlns:p14="http://schemas.microsoft.com/office/powerpoint/2010/main" val="3735592401"/>
+        <p14:creationId xmlns:p14="http://schemas.microsoft.com/office/powerpoint/2010/main" val="3236685712"/>
       </p:ext>
     </p:extLst>
   </p:cSld>
@@ -24755,7 +24773,7 @@
         <p:spPr>
           <a:xfrm>
             <a:off x="340285" y="1741246"/>
-            <a:ext cx="11584795" cy="4604337"/>
+            <a:ext cx="11584795" cy="4173450"/>
           </a:xfrm>
           <a:prstGeom prst="rect">
             <a:avLst/>
@@ -24770,7 +24788,7 @@
           <a:p>
             <a:r>
               <a:rPr lang="en-US" sz="2800" dirty="0"/>
-              <a:t>Based in Portland, OR, Tailspin Toys, Inc. makes and sells one of the world’s leading integrated construction systems for children. Their products are sold worldwide and can be virtually explored on their public website.</a:t>
+              <a:t>Based in Portland, OR, Tailspin Toys, Inc. makes and sells one of the world’s leading integrated construction systems for children. Their products are sold worldwide and can be virtually explored on their public website which runs on Angular, .NET Core, and PostgreSQL.</a:t>
             </a:r>
           </a:p>
           <a:p>

</xml_diff>

<commit_message>
Updated logos to new format (post Ignite 2019)
</commit_message>
<xml_diff>
--- a/Whiteboard design session/WDS trainer presentation - Continuous delivery in Azure DevOps.pptx
+++ b/Whiteboard design session/WDS trainer presentation - Continuous delivery in Azure DevOps.pptx
@@ -231,7 +231,7 @@
           <a:p>
             <a:fld id="{52A13B17-C506-4D51-BB37-16B365906619}" type="datetimeFigureOut">
               <a:rPr lang="en-US" smtClean="0"/>
-              <a:t>8/28/19</a:t>
+              <a:t>12/6/2019</a:t>
             </a:fld>
             <a:endParaRPr lang="en-US" dirty="0"/>
           </a:p>
@@ -3237,7 +3237,7 @@
                   <a:prstClr val="black"/>
                 </a:solidFill>
               </a:rPr>
-              <a:t>8/28/19 4:26 PM</a:t>
+              <a:t>12/6/2019 1:20 AM</a:t>
             </a:fld>
             <a:endParaRPr lang="en-US" dirty="0">
               <a:solidFill>
@@ -18021,6 +18021,36 @@
           </a:p>
         </p:txBody>
       </p:sp>
+      <p:pic>
+        <p:nvPicPr>
+          <p:cNvPr id="4" name="Picture 3">
+            <a:extLst>
+              <a:ext uri="{FF2B5EF4-FFF2-40B4-BE49-F238E27FC236}">
+                <a16:creationId xmlns:a16="http://schemas.microsoft.com/office/drawing/2014/main" id="{04695CDB-6CA5-48B4-B109-1296E4768E99}"/>
+              </a:ext>
+            </a:extLst>
+          </p:cNvPr>
+          <p:cNvPicPr>
+            <a:picLocks noChangeAspect="1"/>
+          </p:cNvPicPr>
+          <p:nvPr/>
+        </p:nvPicPr>
+        <p:blipFill>
+          <a:blip r:embed="rId3"/>
+          <a:stretch>
+            <a:fillRect/>
+          </a:stretch>
+        </p:blipFill>
+        <p:spPr>
+          <a:xfrm>
+            <a:off x="6186331" y="2604806"/>
+            <a:ext cx="490204" cy="508000"/>
+          </a:xfrm>
+          <a:prstGeom prst="rect">
+            <a:avLst/>
+          </a:prstGeom>
+        </p:spPr>
+      </p:pic>
       <p:sp>
         <p:nvSpPr>
           <p:cNvPr id="3" name="Title 2">
@@ -18049,1020 +18079,963 @@
           </a:p>
         </p:txBody>
       </p:sp>
-      <p:grpSp>
-        <p:nvGrpSpPr>
-          <p:cNvPr id="88" name="Group 87">
+      <p:pic>
+        <p:nvPicPr>
+          <p:cNvPr id="89" name="Picture 88">
             <a:extLst>
               <a:ext uri="{FF2B5EF4-FFF2-40B4-BE49-F238E27FC236}">
-                <a16:creationId xmlns:a16="http://schemas.microsoft.com/office/drawing/2014/main" id="{E9676A41-2DC5-884D-B94C-FDFACB27B51B}"/>
+                <a16:creationId xmlns:a16="http://schemas.microsoft.com/office/drawing/2014/main" id="{6276561F-EBC2-0A45-B589-1BBFEF85A9DA}"/>
               </a:ext>
             </a:extLst>
           </p:cNvPr>
-          <p:cNvGrpSpPr/>
+          <p:cNvPicPr>
+            <a:picLocks noChangeAspect="1"/>
+          </p:cNvPicPr>
           <p:nvPr/>
-        </p:nvGrpSpPr>
-        <p:grpSpPr>
+        </p:nvPicPr>
+        <p:blipFill>
+          <a:blip r:embed="rId4" cstate="print">
+            <a:extLst>
+              <a:ext uri="{28A0092B-C50C-407E-A947-70E740481C1C}">
+                <a14:useLocalDpi xmlns:a14="http://schemas.microsoft.com/office/drawing/2010/main" val="0"/>
+              </a:ext>
+            </a:extLst>
+          </a:blip>
+          <a:stretch>
+            <a:fillRect/>
+          </a:stretch>
+        </p:blipFill>
+        <p:spPr>
+          <a:xfrm>
+            <a:off x="596740" y="3269471"/>
+            <a:ext cx="481585" cy="481585"/>
+          </a:xfrm>
+          <a:prstGeom prst="rect">
+            <a:avLst/>
+          </a:prstGeom>
+        </p:spPr>
+      </p:pic>
+      <p:sp>
+        <p:nvSpPr>
+          <p:cNvPr id="90" name="TextBox 89">
+            <a:extLst>
+              <a:ext uri="{FF2B5EF4-FFF2-40B4-BE49-F238E27FC236}">
+                <a16:creationId xmlns:a16="http://schemas.microsoft.com/office/drawing/2014/main" id="{F5107D4E-FDF7-5144-9B0B-67BC47016A7A}"/>
+              </a:ext>
+            </a:extLst>
+          </p:cNvPr>
+          <p:cNvSpPr txBox="1"/>
+          <p:nvPr/>
+        </p:nvSpPr>
+        <p:spPr>
+          <a:xfrm>
+            <a:off x="1240469" y="2021875"/>
+            <a:ext cx="4363720" cy="400110"/>
+          </a:xfrm>
+          <a:prstGeom prst="rect">
+            <a:avLst/>
+          </a:prstGeom>
+          <a:noFill/>
+        </p:spPr>
+        <p:txBody>
+          <a:bodyPr wrap="square" rtlCol="0">
+            <a:spAutoFit/>
+          </a:bodyPr>
+          <a:lstStyle/>
+          <a:p>
+            <a:r>
+              <a:rPr lang="en-US" sz="2000" dirty="0"/>
+              <a:t>Azure DevOps</a:t>
+            </a:r>
+          </a:p>
+        </p:txBody>
+      </p:sp>
+      <p:sp>
+        <p:nvSpPr>
+          <p:cNvPr id="91" name="TextBox 90">
+            <a:extLst>
+              <a:ext uri="{FF2B5EF4-FFF2-40B4-BE49-F238E27FC236}">
+                <a16:creationId xmlns:a16="http://schemas.microsoft.com/office/drawing/2014/main" id="{2551AD69-BCF9-234C-A556-8243E7EBC1B7}"/>
+              </a:ext>
+            </a:extLst>
+          </p:cNvPr>
+          <p:cNvSpPr txBox="1"/>
+          <p:nvPr/>
+        </p:nvSpPr>
+        <p:spPr>
+          <a:xfrm>
+            <a:off x="1260789" y="2680773"/>
+            <a:ext cx="4751697" cy="400110"/>
+          </a:xfrm>
+          <a:prstGeom prst="rect">
+            <a:avLst/>
+          </a:prstGeom>
+          <a:noFill/>
+        </p:spPr>
+        <p:txBody>
+          <a:bodyPr wrap="square" rtlCol="0">
+            <a:spAutoFit/>
+          </a:bodyPr>
+          <a:lstStyle/>
+          <a:p>
+            <a:r>
+              <a:rPr lang="en-US" sz="2000" dirty="0"/>
+              <a:t>Azure Repos</a:t>
+            </a:r>
+          </a:p>
+        </p:txBody>
+      </p:sp>
+      <p:sp>
+        <p:nvSpPr>
+          <p:cNvPr id="92" name="TextBox 91">
+            <a:extLst>
+              <a:ext uri="{FF2B5EF4-FFF2-40B4-BE49-F238E27FC236}">
+                <a16:creationId xmlns:a16="http://schemas.microsoft.com/office/drawing/2014/main" id="{3E3E1ADB-2DB6-784D-9B2A-1E82D13A8507}"/>
+              </a:ext>
+            </a:extLst>
+          </p:cNvPr>
+          <p:cNvSpPr txBox="1"/>
+          <p:nvPr/>
+        </p:nvSpPr>
+        <p:spPr>
+          <a:xfrm>
+            <a:off x="1260789" y="3351655"/>
+            <a:ext cx="5725280" cy="400110"/>
+          </a:xfrm>
+          <a:prstGeom prst="rect">
+            <a:avLst/>
+          </a:prstGeom>
+          <a:noFill/>
+        </p:spPr>
+        <p:txBody>
+          <a:bodyPr wrap="square" rtlCol="0">
+            <a:spAutoFit/>
+          </a:bodyPr>
+          <a:lstStyle/>
+          <a:p>
+            <a:r>
+              <a:rPr lang="en-US" sz="2000" dirty="0"/>
+              <a:t>Azure DevOps with GitHub</a:t>
+            </a:r>
+          </a:p>
+        </p:txBody>
+      </p:sp>
+      <p:sp>
+        <p:nvSpPr>
+          <p:cNvPr id="94" name="TextBox 93">
+            <a:extLst>
+              <a:ext uri="{FF2B5EF4-FFF2-40B4-BE49-F238E27FC236}">
+                <a16:creationId xmlns:a16="http://schemas.microsoft.com/office/drawing/2014/main" id="{1137E064-AB24-4E4B-8EEC-606BF4C9ACE6}"/>
+              </a:ext>
+            </a:extLst>
+          </p:cNvPr>
+          <p:cNvSpPr txBox="1"/>
+          <p:nvPr/>
+        </p:nvSpPr>
+        <p:spPr>
+          <a:xfrm>
+            <a:off x="6868458" y="2686511"/>
+            <a:ext cx="5725280" cy="400110"/>
+          </a:xfrm>
+          <a:prstGeom prst="rect">
+            <a:avLst/>
+          </a:prstGeom>
+          <a:noFill/>
+        </p:spPr>
+        <p:txBody>
+          <a:bodyPr wrap="square" rtlCol="0">
+            <a:spAutoFit/>
+          </a:bodyPr>
+          <a:lstStyle/>
+          <a:p>
+            <a:r>
+              <a:rPr lang="en-US" sz="2000" dirty="0"/>
+              <a:t>Azure Web Apps</a:t>
+            </a:r>
+          </a:p>
+        </p:txBody>
+      </p:sp>
+      <p:sp>
+        <p:nvSpPr>
+          <p:cNvPr id="95" name="TextBox 94">
+            <a:extLst>
+              <a:ext uri="{FF2B5EF4-FFF2-40B4-BE49-F238E27FC236}">
+                <a16:creationId xmlns:a16="http://schemas.microsoft.com/office/drawing/2014/main" id="{A4E4334B-62CC-BA42-8923-2B43F0112C64}"/>
+              </a:ext>
+            </a:extLst>
+          </p:cNvPr>
+          <p:cNvSpPr txBox="1"/>
+          <p:nvPr/>
+        </p:nvSpPr>
+        <p:spPr>
+          <a:xfrm>
+            <a:off x="6868458" y="3351655"/>
+            <a:ext cx="5725280" cy="400110"/>
+          </a:xfrm>
+          <a:prstGeom prst="rect">
+            <a:avLst/>
+          </a:prstGeom>
+          <a:noFill/>
+        </p:spPr>
+        <p:txBody>
+          <a:bodyPr wrap="square" rtlCol="0">
+            <a:spAutoFit/>
+          </a:bodyPr>
+          <a:lstStyle/>
+          <a:p>
+            <a:r>
+              <a:rPr lang="en-US" sz="2000" dirty="0"/>
+              <a:t>Azure PostreSQL Database</a:t>
+            </a:r>
+          </a:p>
+        </p:txBody>
+      </p:sp>
+      <p:cxnSp>
+        <p:nvCxnSpPr>
+          <p:cNvPr id="96" name="Straight Arrow Connector 95">
+            <a:extLst>
+              <a:ext uri="{FF2B5EF4-FFF2-40B4-BE49-F238E27FC236}">
+                <a16:creationId xmlns:a16="http://schemas.microsoft.com/office/drawing/2014/main" id="{D3A0320F-285E-B344-9A30-657BFD4A5593}"/>
+              </a:ext>
+            </a:extLst>
+          </p:cNvPr>
+          <p:cNvCxnSpPr>
+            <a:cxnSpLocks/>
+            <a:stCxn id="100" idx="3"/>
+            <a:endCxn id="101" idx="1"/>
+          </p:cNvCxnSpPr>
+          <p:nvPr/>
+        </p:nvCxnSpPr>
+        <p:spPr>
+          <a:xfrm>
+            <a:off x="2995792" y="4666243"/>
+            <a:ext cx="465694" cy="0"/>
+          </a:xfrm>
+          <a:prstGeom prst="straightConnector1">
+            <a:avLst/>
+          </a:prstGeom>
+          <a:ln w="9525" cap="flat" cmpd="sng" algn="ctr">
+            <a:solidFill>
+              <a:schemeClr val="accent6"/>
+            </a:solidFill>
+            <a:prstDash val="solid"/>
+            <a:round/>
+            <a:headEnd type="none" w="med" len="med"/>
+            <a:tailEnd type="arrow" w="med" len="med"/>
+          </a:ln>
+        </p:spPr>
+        <p:style>
+          <a:lnRef idx="0">
+            <a:scrgbClr r="0" g="0" b="0"/>
+          </a:lnRef>
+          <a:fillRef idx="0">
+            <a:scrgbClr r="0" g="0" b="0"/>
+          </a:fillRef>
+          <a:effectRef idx="0">
+            <a:scrgbClr r="0" g="0" b="0"/>
+          </a:effectRef>
+          <a:fontRef idx="minor">
+            <a:schemeClr val="tx1"/>
+          </a:fontRef>
+        </p:style>
+      </p:cxnSp>
+      <p:cxnSp>
+        <p:nvCxnSpPr>
+          <p:cNvPr id="97" name="Straight Arrow Connector 96">
+            <a:extLst>
+              <a:ext uri="{FF2B5EF4-FFF2-40B4-BE49-F238E27FC236}">
+                <a16:creationId xmlns:a16="http://schemas.microsoft.com/office/drawing/2014/main" id="{BC4BAE5C-7CBB-2645-B693-B5918A80E60A}"/>
+              </a:ext>
+            </a:extLst>
+          </p:cNvPr>
+          <p:cNvCxnSpPr>
+            <a:cxnSpLocks/>
+            <a:stCxn id="101" idx="3"/>
+            <a:endCxn id="102" idx="1"/>
+          </p:cNvCxnSpPr>
+          <p:nvPr/>
+        </p:nvCxnSpPr>
+        <p:spPr>
+          <a:xfrm>
+            <a:off x="5142447" y="4666243"/>
+            <a:ext cx="465694" cy="0"/>
+          </a:xfrm>
+          <a:prstGeom prst="straightConnector1">
+            <a:avLst/>
+          </a:prstGeom>
+          <a:ln w="9525" cap="flat" cmpd="sng" algn="ctr">
+            <a:solidFill>
+              <a:schemeClr val="accent6"/>
+            </a:solidFill>
+            <a:prstDash val="solid"/>
+            <a:round/>
+            <a:headEnd type="none" w="med" len="med"/>
+            <a:tailEnd type="arrow" w="med" len="med"/>
+          </a:ln>
+        </p:spPr>
+        <p:style>
+          <a:lnRef idx="0">
+            <a:scrgbClr r="0" g="0" b="0"/>
+          </a:lnRef>
+          <a:fillRef idx="0">
+            <a:scrgbClr r="0" g="0" b="0"/>
+          </a:fillRef>
+          <a:effectRef idx="0">
+            <a:scrgbClr r="0" g="0" b="0"/>
+          </a:effectRef>
+          <a:fontRef idx="minor">
+            <a:schemeClr val="tx1"/>
+          </a:fontRef>
+        </p:style>
+      </p:cxnSp>
+      <p:cxnSp>
+        <p:nvCxnSpPr>
+          <p:cNvPr id="98" name="Straight Arrow Connector 97">
+            <a:extLst>
+              <a:ext uri="{FF2B5EF4-FFF2-40B4-BE49-F238E27FC236}">
+                <a16:creationId xmlns:a16="http://schemas.microsoft.com/office/drawing/2014/main" id="{D0D3FAA1-451B-144B-A568-5F736357D4EC}"/>
+              </a:ext>
+            </a:extLst>
+          </p:cNvPr>
+          <p:cNvCxnSpPr>
+            <a:cxnSpLocks/>
+            <a:stCxn id="102" idx="3"/>
+            <a:endCxn id="103" idx="1"/>
+          </p:cNvCxnSpPr>
+          <p:nvPr/>
+        </p:nvCxnSpPr>
+        <p:spPr>
+          <a:xfrm>
+            <a:off x="7289102" y="4666243"/>
+            <a:ext cx="465694" cy="0"/>
+          </a:xfrm>
+          <a:prstGeom prst="straightConnector1">
+            <a:avLst/>
+          </a:prstGeom>
+          <a:ln w="9525" cap="flat" cmpd="sng" algn="ctr">
+            <a:solidFill>
+              <a:schemeClr val="accent6"/>
+            </a:solidFill>
+            <a:prstDash val="solid"/>
+            <a:round/>
+            <a:headEnd type="none" w="med" len="med"/>
+            <a:tailEnd type="arrow" w="med" len="med"/>
+          </a:ln>
+        </p:spPr>
+        <p:style>
+          <a:lnRef idx="0">
+            <a:scrgbClr r="0" g="0" b="0"/>
+          </a:lnRef>
+          <a:fillRef idx="0">
+            <a:scrgbClr r="0" g="0" b="0"/>
+          </a:fillRef>
+          <a:effectRef idx="0">
+            <a:scrgbClr r="0" g="0" b="0"/>
+          </a:effectRef>
+          <a:fontRef idx="minor">
+            <a:schemeClr val="tx1"/>
+          </a:fontRef>
+        </p:style>
+      </p:cxnSp>
+      <p:cxnSp>
+        <p:nvCxnSpPr>
+          <p:cNvPr id="99" name="Straight Arrow Connector 98">
+            <a:extLst>
+              <a:ext uri="{FF2B5EF4-FFF2-40B4-BE49-F238E27FC236}">
+                <a16:creationId xmlns:a16="http://schemas.microsoft.com/office/drawing/2014/main" id="{30435B2B-6826-7842-B0FF-05D2012A05FD}"/>
+              </a:ext>
+            </a:extLst>
+          </p:cNvPr>
+          <p:cNvCxnSpPr>
+            <a:cxnSpLocks/>
+            <a:stCxn id="103" idx="3"/>
+            <a:endCxn id="104" idx="1"/>
+          </p:cNvCxnSpPr>
+          <p:nvPr/>
+        </p:nvCxnSpPr>
+        <p:spPr>
+          <a:xfrm>
+            <a:off x="9435757" y="4666243"/>
+            <a:ext cx="465694" cy="0"/>
+          </a:xfrm>
+          <a:prstGeom prst="straightConnector1">
+            <a:avLst/>
+          </a:prstGeom>
+          <a:ln w="9525" cap="flat" cmpd="sng" algn="ctr">
+            <a:solidFill>
+              <a:schemeClr val="accent6"/>
+            </a:solidFill>
+            <a:prstDash val="solid"/>
+            <a:round/>
+            <a:headEnd type="none" w="med" len="med"/>
+            <a:tailEnd type="arrow" w="med" len="med"/>
+          </a:ln>
+        </p:spPr>
+        <p:style>
+          <a:lnRef idx="0">
+            <a:scrgbClr r="0" g="0" b="0"/>
+          </a:lnRef>
+          <a:fillRef idx="0">
+            <a:scrgbClr r="0" g="0" b="0"/>
+          </a:fillRef>
+          <a:effectRef idx="0">
+            <a:scrgbClr r="0" g="0" b="0"/>
+          </a:effectRef>
+          <a:fontRef idx="minor">
+            <a:schemeClr val="tx1"/>
+          </a:fontRef>
+        </p:style>
+      </p:cxnSp>
+      <p:sp>
+        <p:nvSpPr>
+          <p:cNvPr id="100" name="Rectangle 99">
+            <a:extLst>
+              <a:ext uri="{FF2B5EF4-FFF2-40B4-BE49-F238E27FC236}">
+                <a16:creationId xmlns:a16="http://schemas.microsoft.com/office/drawing/2014/main" id="{576729F6-E197-FA4C-8E9D-DCE4120B2FEE}"/>
+              </a:ext>
+            </a:extLst>
+          </p:cNvPr>
+          <p:cNvSpPr/>
+          <p:nvPr/>
+        </p:nvSpPr>
+        <p:spPr bwMode="auto">
+          <a:xfrm>
+            <a:off x="611564" y="4272604"/>
+            <a:ext cx="2384228" cy="787277"/>
+          </a:xfrm>
+          <a:prstGeom prst="rect">
+            <a:avLst/>
+          </a:prstGeom>
+          <a:solidFill>
+            <a:srgbClr val="002060"/>
+          </a:solidFill>
+          <a:ln>
+            <a:noFill/>
+            <a:headEnd type="none" w="med" len="med"/>
+            <a:tailEnd type="none" w="med" len="med"/>
+          </a:ln>
+          <a:effectLst/>
+        </p:spPr>
+        <p:style>
+          <a:lnRef idx="1">
+            <a:schemeClr val="accent2"/>
+          </a:lnRef>
+          <a:fillRef idx="3">
+            <a:schemeClr val="accent2"/>
+          </a:fillRef>
+          <a:effectRef idx="2">
+            <a:schemeClr val="accent2"/>
+          </a:effectRef>
+          <a:fontRef idx="minor">
+            <a:schemeClr val="lt1"/>
+          </a:fontRef>
+        </p:style>
+        <p:txBody>
+          <a:bodyPr rot="0" spcFirstLastPara="0" vertOverflow="overflow" horzOverflow="overflow" vert="horz" wrap="square" lIns="182857" tIns="146285" rIns="182857" bIns="146285" numCol="1" spcCol="0" rtlCol="0" fromWordArt="0" anchor="t" anchorCtr="0" forceAA="0" compatLnSpc="1">
+            <a:prstTxWarp prst="textNoShape">
+              <a:avLst/>
+            </a:prstTxWarp>
+            <a:noAutofit/>
+          </a:bodyPr>
+          <a:lstStyle/>
+          <a:p>
+            <a:pPr marL="0" marR="0" lvl="0" indent="0" algn="ctr" defTabSz="932021" rtl="0" eaLnBrk="1" fontAlgn="auto" latinLnBrk="0" hangingPunct="1">
+              <a:lnSpc>
+                <a:spcPct val="90000"/>
+              </a:lnSpc>
+              <a:spcBef>
+                <a:spcPts val="0"/>
+              </a:spcBef>
+              <a:spcAft>
+                <a:spcPts val="0"/>
+              </a:spcAft>
+              <a:buClrTx/>
+              <a:buSzTx/>
+              <a:buFontTx/>
+              <a:buNone/>
+              <a:tabLst/>
+              <a:defRPr/>
+            </a:pPr>
+            <a:r>
+              <a:rPr kumimoji="0" lang="en-US" sz="1400" b="1" i="0" u="none" strike="noStrike" kern="0" cap="none" spc="0" normalizeH="0" baseline="0" noProof="0" dirty="0">
+                <a:ln>
+                  <a:noFill/>
+                </a:ln>
+                <a:gradFill>
+                  <a:gsLst>
+                    <a:gs pos="0">
+                      <a:srgbClr val="FFFFFF"/>
+                    </a:gs>
+                    <a:gs pos="100000">
+                      <a:srgbClr val="FFFFFF"/>
+                    </a:gs>
+                  </a:gsLst>
+                  <a:lin ang="5400000" scaled="0"/>
+                </a:gradFill>
+                <a:effectLst/>
+                <a:uLnTx/>
+                <a:uFillTx/>
+                <a:latin typeface="Segoe UI Light"/>
+                <a:ea typeface="Segoe UI" pitchFamily="34" charset="0"/>
+                <a:cs typeface="Segoe UI" pitchFamily="34" charset="0"/>
+              </a:rPr>
+              <a:t>SOURCE CONTROL</a:t>
+            </a:r>
+          </a:p>
+        </p:txBody>
+      </p:sp>
+      <p:sp>
+        <p:nvSpPr>
+          <p:cNvPr id="101" name="Rectangle 100">
+            <a:extLst>
+              <a:ext uri="{FF2B5EF4-FFF2-40B4-BE49-F238E27FC236}">
+                <a16:creationId xmlns:a16="http://schemas.microsoft.com/office/drawing/2014/main" id="{6938DFFB-2E41-6B44-ABA0-FF6C35412EFF}"/>
+              </a:ext>
+            </a:extLst>
+          </p:cNvPr>
+          <p:cNvSpPr/>
+          <p:nvPr/>
+        </p:nvSpPr>
+        <p:spPr bwMode="auto">
+          <a:xfrm>
+            <a:off x="3461486" y="4272604"/>
+            <a:ext cx="1680961" cy="787277"/>
+          </a:xfrm>
+          <a:prstGeom prst="rect">
+            <a:avLst/>
+          </a:prstGeom>
+          <a:solidFill>
+            <a:srgbClr val="002060"/>
+          </a:solidFill>
+          <a:ln>
+            <a:noFill/>
+            <a:headEnd type="none" w="med" len="med"/>
+            <a:tailEnd type="none" w="med" len="med"/>
+          </a:ln>
+          <a:effectLst/>
+        </p:spPr>
+        <p:style>
+          <a:lnRef idx="1">
+            <a:schemeClr val="accent2"/>
+          </a:lnRef>
+          <a:fillRef idx="3">
+            <a:schemeClr val="accent2"/>
+          </a:fillRef>
+          <a:effectRef idx="2">
+            <a:schemeClr val="accent2"/>
+          </a:effectRef>
+          <a:fontRef idx="minor">
+            <a:schemeClr val="lt1"/>
+          </a:fontRef>
+        </p:style>
+        <p:txBody>
+          <a:bodyPr rot="0" spcFirstLastPara="0" vertOverflow="overflow" horzOverflow="overflow" vert="horz" wrap="square" lIns="182857" tIns="146285" rIns="182857" bIns="146285" numCol="1" spcCol="0" rtlCol="0" fromWordArt="0" anchor="t" anchorCtr="0" forceAA="0" compatLnSpc="1">
+            <a:prstTxWarp prst="textNoShape">
+              <a:avLst/>
+            </a:prstTxWarp>
+            <a:noAutofit/>
+          </a:bodyPr>
+          <a:lstStyle/>
+          <a:p>
+            <a:pPr marL="0" marR="0" lvl="0" indent="0" algn="ctr" defTabSz="932021" rtl="0" eaLnBrk="1" fontAlgn="auto" latinLnBrk="0" hangingPunct="1">
+              <a:lnSpc>
+                <a:spcPct val="90000"/>
+              </a:lnSpc>
+              <a:spcBef>
+                <a:spcPts val="0"/>
+              </a:spcBef>
+              <a:spcAft>
+                <a:spcPts val="0"/>
+              </a:spcAft>
+              <a:buClrTx/>
+              <a:buSzTx/>
+              <a:buFontTx/>
+              <a:buNone/>
+              <a:tabLst/>
+              <a:defRPr/>
+            </a:pPr>
+            <a:r>
+              <a:rPr kumimoji="0" lang="en-US" sz="1400" b="1" i="0" u="none" strike="noStrike" kern="0" cap="none" spc="0" normalizeH="0" baseline="0" noProof="0" dirty="0">
+                <a:ln>
+                  <a:noFill/>
+                </a:ln>
+                <a:gradFill>
+                  <a:gsLst>
+                    <a:gs pos="0">
+                      <a:srgbClr val="FFFFFF"/>
+                    </a:gs>
+                    <a:gs pos="100000">
+                      <a:srgbClr val="FFFFFF"/>
+                    </a:gs>
+                  </a:gsLst>
+                  <a:lin ang="5400000" scaled="0"/>
+                </a:gradFill>
+                <a:effectLst/>
+                <a:uLnTx/>
+                <a:uFillTx/>
+                <a:latin typeface="Segoe UI Light"/>
+                <a:ea typeface="Segoe UI" pitchFamily="34" charset="0"/>
+                <a:cs typeface="Segoe UI" pitchFamily="34" charset="0"/>
+              </a:rPr>
+              <a:t>CI</a:t>
+            </a:r>
+          </a:p>
+        </p:txBody>
+      </p:sp>
+      <p:sp>
+        <p:nvSpPr>
+          <p:cNvPr id="102" name="Rectangle 101">
+            <a:extLst>
+              <a:ext uri="{FF2B5EF4-FFF2-40B4-BE49-F238E27FC236}">
+                <a16:creationId xmlns:a16="http://schemas.microsoft.com/office/drawing/2014/main" id="{79C21FAA-E266-0745-A345-C8F9B36EE244}"/>
+              </a:ext>
+            </a:extLst>
+          </p:cNvPr>
+          <p:cNvSpPr/>
+          <p:nvPr/>
+        </p:nvSpPr>
+        <p:spPr bwMode="auto">
+          <a:xfrm>
+            <a:off x="5608141" y="4272604"/>
+            <a:ext cx="1680961" cy="787277"/>
+          </a:xfrm>
+          <a:prstGeom prst="rect">
+            <a:avLst/>
+          </a:prstGeom>
+          <a:solidFill>
+            <a:srgbClr val="002060"/>
+          </a:solidFill>
+          <a:ln>
+            <a:noFill/>
+            <a:headEnd type="none" w="med" len="med"/>
+            <a:tailEnd type="none" w="med" len="med"/>
+          </a:ln>
+          <a:effectLst/>
+        </p:spPr>
+        <p:style>
+          <a:lnRef idx="1">
+            <a:schemeClr val="accent2"/>
+          </a:lnRef>
+          <a:fillRef idx="3">
+            <a:schemeClr val="accent2"/>
+          </a:fillRef>
+          <a:effectRef idx="2">
+            <a:schemeClr val="accent2"/>
+          </a:effectRef>
+          <a:fontRef idx="minor">
+            <a:schemeClr val="lt1"/>
+          </a:fontRef>
+        </p:style>
+        <p:txBody>
+          <a:bodyPr rot="0" spcFirstLastPara="0" vertOverflow="overflow" horzOverflow="overflow" vert="horz" wrap="square" lIns="182857" tIns="146285" rIns="182857" bIns="146285" numCol="1" spcCol="0" rtlCol="0" fromWordArt="0" anchor="t" anchorCtr="0" forceAA="0" compatLnSpc="1">
+            <a:prstTxWarp prst="textNoShape">
+              <a:avLst/>
+            </a:prstTxWarp>
+            <a:noAutofit/>
+          </a:bodyPr>
+          <a:lstStyle/>
+          <a:p>
+            <a:pPr marL="0" marR="0" lvl="0" indent="0" algn="ctr" defTabSz="932021" rtl="0" eaLnBrk="1" fontAlgn="auto" latinLnBrk="0" hangingPunct="1">
+              <a:lnSpc>
+                <a:spcPct val="90000"/>
+              </a:lnSpc>
+              <a:spcBef>
+                <a:spcPts val="0"/>
+              </a:spcBef>
+              <a:spcAft>
+                <a:spcPts val="0"/>
+              </a:spcAft>
+              <a:buClrTx/>
+              <a:buSzTx/>
+              <a:buFontTx/>
+              <a:buNone/>
+              <a:tabLst/>
+              <a:defRPr/>
+            </a:pPr>
+            <a:r>
+              <a:rPr kumimoji="0" lang="en-US" sz="1400" b="1" i="0" u="none" strike="noStrike" kern="0" cap="none" spc="0" normalizeH="0" baseline="0" noProof="0" dirty="0">
+                <a:ln>
+                  <a:noFill/>
+                </a:ln>
+                <a:gradFill>
+                  <a:gsLst>
+                    <a:gs pos="0">
+                      <a:srgbClr val="FFFFFF"/>
+                    </a:gs>
+                    <a:gs pos="100000">
+                      <a:srgbClr val="FFFFFF"/>
+                    </a:gs>
+                  </a:gsLst>
+                  <a:lin ang="5400000" scaled="0"/>
+                </a:gradFill>
+                <a:effectLst/>
+                <a:uLnTx/>
+                <a:uFillTx/>
+                <a:latin typeface="Segoe UI Light"/>
+                <a:ea typeface="Segoe UI" pitchFamily="34" charset="0"/>
+                <a:cs typeface="Segoe UI" pitchFamily="34" charset="0"/>
+              </a:rPr>
+              <a:t>PACKAGE</a:t>
+            </a:r>
+          </a:p>
+        </p:txBody>
+      </p:sp>
+      <p:sp>
+        <p:nvSpPr>
+          <p:cNvPr id="103" name="Rectangle 102">
+            <a:extLst>
+              <a:ext uri="{FF2B5EF4-FFF2-40B4-BE49-F238E27FC236}">
+                <a16:creationId xmlns:a16="http://schemas.microsoft.com/office/drawing/2014/main" id="{C43ED478-8C63-4543-93C0-28F25717B8CF}"/>
+              </a:ext>
+            </a:extLst>
+          </p:cNvPr>
+          <p:cNvSpPr/>
+          <p:nvPr/>
+        </p:nvSpPr>
+        <p:spPr bwMode="auto">
+          <a:xfrm>
+            <a:off x="7754796" y="4272604"/>
+            <a:ext cx="1680961" cy="787277"/>
+          </a:xfrm>
+          <a:prstGeom prst="rect">
+            <a:avLst/>
+          </a:prstGeom>
+          <a:solidFill>
+            <a:srgbClr val="002060"/>
+          </a:solidFill>
+          <a:ln>
+            <a:noFill/>
+            <a:headEnd type="none" w="med" len="med"/>
+            <a:tailEnd type="none" w="med" len="med"/>
+          </a:ln>
+          <a:effectLst/>
+        </p:spPr>
+        <p:style>
+          <a:lnRef idx="1">
+            <a:schemeClr val="accent2"/>
+          </a:lnRef>
+          <a:fillRef idx="3">
+            <a:schemeClr val="accent2"/>
+          </a:fillRef>
+          <a:effectRef idx="2">
+            <a:schemeClr val="accent2"/>
+          </a:effectRef>
+          <a:fontRef idx="minor">
+            <a:schemeClr val="lt1"/>
+          </a:fontRef>
+        </p:style>
+        <p:txBody>
+          <a:bodyPr rot="0" spcFirstLastPara="0" vertOverflow="overflow" horzOverflow="overflow" vert="horz" wrap="square" lIns="182857" tIns="146285" rIns="182857" bIns="146285" numCol="1" spcCol="0" rtlCol="0" fromWordArt="0" anchor="t" anchorCtr="0" forceAA="0" compatLnSpc="1">
+            <a:prstTxWarp prst="textNoShape">
+              <a:avLst/>
+            </a:prstTxWarp>
+            <a:noAutofit/>
+          </a:bodyPr>
+          <a:lstStyle/>
+          <a:p>
+            <a:pPr marL="0" marR="0" lvl="0" indent="0" algn="ctr" defTabSz="932021" rtl="0" eaLnBrk="1" fontAlgn="auto" latinLnBrk="0" hangingPunct="1">
+              <a:lnSpc>
+                <a:spcPct val="90000"/>
+              </a:lnSpc>
+              <a:spcBef>
+                <a:spcPts val="0"/>
+              </a:spcBef>
+              <a:spcAft>
+                <a:spcPts val="0"/>
+              </a:spcAft>
+              <a:buClrTx/>
+              <a:buSzTx/>
+              <a:buFontTx/>
+              <a:buNone/>
+              <a:tabLst/>
+              <a:defRPr/>
+            </a:pPr>
+            <a:r>
+              <a:rPr kumimoji="0" lang="en-US" sz="1400" b="1" i="0" u="none" strike="noStrike" kern="0" cap="none" spc="0" normalizeH="0" baseline="0" noProof="0" dirty="0">
+                <a:ln>
+                  <a:noFill/>
+                </a:ln>
+                <a:gradFill>
+                  <a:gsLst>
+                    <a:gs pos="0">
+                      <a:srgbClr val="FFFFFF"/>
+                    </a:gs>
+                    <a:gs pos="100000">
+                      <a:srgbClr val="FFFFFF"/>
+                    </a:gs>
+                  </a:gsLst>
+                  <a:lin ang="5400000" scaled="0"/>
+                </a:gradFill>
+                <a:effectLst/>
+                <a:uLnTx/>
+                <a:uFillTx/>
+                <a:latin typeface="Segoe UI Light"/>
+                <a:ea typeface="Segoe UI" pitchFamily="34" charset="0"/>
+                <a:cs typeface="Segoe UI" pitchFamily="34" charset="0"/>
+              </a:rPr>
+              <a:t>PIPELINE</a:t>
+            </a:r>
+          </a:p>
+        </p:txBody>
+      </p:sp>
+      <p:sp>
+        <p:nvSpPr>
+          <p:cNvPr id="104" name="Rectangle 103">
+            <a:extLst>
+              <a:ext uri="{FF2B5EF4-FFF2-40B4-BE49-F238E27FC236}">
+                <a16:creationId xmlns:a16="http://schemas.microsoft.com/office/drawing/2014/main" id="{73DAE83E-EDA8-F94C-B4D7-6A4394E24EDF}"/>
+              </a:ext>
+            </a:extLst>
+          </p:cNvPr>
+          <p:cNvSpPr/>
+          <p:nvPr/>
+        </p:nvSpPr>
+        <p:spPr bwMode="auto">
+          <a:xfrm>
+            <a:off x="9901451" y="4272604"/>
+            <a:ext cx="1680961" cy="787277"/>
+          </a:xfrm>
+          <a:prstGeom prst="rect">
+            <a:avLst/>
+          </a:prstGeom>
+          <a:solidFill>
+            <a:srgbClr val="002060"/>
+          </a:solidFill>
+          <a:ln>
+            <a:noFill/>
+            <a:headEnd type="none" w="med" len="med"/>
+            <a:tailEnd type="none" w="med" len="med"/>
+          </a:ln>
+          <a:effectLst/>
+        </p:spPr>
+        <p:style>
+          <a:lnRef idx="1">
+            <a:schemeClr val="accent2"/>
+          </a:lnRef>
+          <a:fillRef idx="3">
+            <a:schemeClr val="accent2"/>
+          </a:fillRef>
+          <a:effectRef idx="2">
+            <a:schemeClr val="accent2"/>
+          </a:effectRef>
+          <a:fontRef idx="minor">
+            <a:schemeClr val="lt1"/>
+          </a:fontRef>
+        </p:style>
+        <p:txBody>
+          <a:bodyPr rot="0" spcFirstLastPara="0" vertOverflow="overflow" horzOverflow="overflow" vert="horz" wrap="square" lIns="182857" tIns="146285" rIns="182857" bIns="146285" numCol="1" spcCol="0" rtlCol="0" fromWordArt="0" anchor="t" anchorCtr="0" forceAA="0" compatLnSpc="1">
+            <a:prstTxWarp prst="textNoShape">
+              <a:avLst/>
+            </a:prstTxWarp>
+            <a:noAutofit/>
+          </a:bodyPr>
+          <a:lstStyle/>
+          <a:p>
+            <a:pPr marL="0" marR="0" lvl="0" indent="0" algn="ctr" defTabSz="932021" rtl="0" eaLnBrk="1" fontAlgn="auto" latinLnBrk="0" hangingPunct="1">
+              <a:lnSpc>
+                <a:spcPct val="90000"/>
+              </a:lnSpc>
+              <a:spcBef>
+                <a:spcPts val="0"/>
+              </a:spcBef>
+              <a:spcAft>
+                <a:spcPts val="0"/>
+              </a:spcAft>
+              <a:buClrTx/>
+              <a:buSzTx/>
+              <a:buFontTx/>
+              <a:buNone/>
+              <a:tabLst/>
+              <a:defRPr/>
+            </a:pPr>
+            <a:r>
+              <a:rPr kumimoji="0" lang="en-US" sz="1400" b="1" i="0" u="none" strike="noStrike" kern="0" cap="none" spc="0" normalizeH="0" baseline="0" noProof="0" dirty="0">
+                <a:ln>
+                  <a:noFill/>
+                </a:ln>
+                <a:gradFill>
+                  <a:gsLst>
+                    <a:gs pos="0">
+                      <a:srgbClr val="FFFFFF"/>
+                    </a:gs>
+                    <a:gs pos="100000">
+                      <a:srgbClr val="FFFFFF"/>
+                    </a:gs>
+                  </a:gsLst>
+                  <a:lin ang="5400000" scaled="0"/>
+                </a:gradFill>
+                <a:effectLst/>
+                <a:uLnTx/>
+                <a:uFillTx/>
+                <a:latin typeface="Segoe UI Light"/>
+                <a:ea typeface="Segoe UI" pitchFamily="34" charset="0"/>
+                <a:cs typeface="Segoe UI" pitchFamily="34" charset="0"/>
+              </a:rPr>
+              <a:t>DEPLOYMENT</a:t>
+            </a:r>
+          </a:p>
+        </p:txBody>
+      </p:sp>
+      <p:pic>
+        <p:nvPicPr>
+          <p:cNvPr id="105" name="Picture 104">
+            <a:extLst>
+              <a:ext uri="{FF2B5EF4-FFF2-40B4-BE49-F238E27FC236}">
+                <a16:creationId xmlns:a16="http://schemas.microsoft.com/office/drawing/2014/main" id="{BCB726B6-7291-E342-8FD5-DEED6C776B1A}"/>
+              </a:ext>
+            </a:extLst>
+          </p:cNvPr>
+          <p:cNvPicPr>
+            <a:picLocks noChangeAspect="1"/>
+          </p:cNvPicPr>
+          <p:nvPr/>
+        </p:nvPicPr>
+        <p:blipFill>
+          <a:blip r:embed="rId5"/>
+          <a:stretch>
+            <a:fillRect/>
+          </a:stretch>
+        </p:blipFill>
+        <p:spPr>
+          <a:xfrm>
+            <a:off x="598356" y="2604806"/>
+            <a:ext cx="508000" cy="508000"/>
+          </a:xfrm>
+          <a:prstGeom prst="rect">
+            <a:avLst/>
+          </a:prstGeom>
+        </p:spPr>
+      </p:pic>
+      <p:pic>
+        <p:nvPicPr>
+          <p:cNvPr id="106" name="Picture 105">
+            <a:extLst>
+              <a:ext uri="{FF2B5EF4-FFF2-40B4-BE49-F238E27FC236}">
+                <a16:creationId xmlns:a16="http://schemas.microsoft.com/office/drawing/2014/main" id="{AE06475A-4E4E-A942-AA53-7ABC22F78264}"/>
+              </a:ext>
+            </a:extLst>
+          </p:cNvPr>
+          <p:cNvPicPr>
+            <a:picLocks noChangeAspect="1"/>
+          </p:cNvPicPr>
+          <p:nvPr/>
+        </p:nvPicPr>
+        <p:blipFill>
+          <a:blip r:embed="rId6"/>
+          <a:stretch>
+            <a:fillRect/>
+          </a:stretch>
+        </p:blipFill>
+        <p:spPr>
           <a:xfrm>
             <a:off x="596740" y="1949030"/>
-            <a:ext cx="11996998" cy="3110851"/>
-            <a:chOff x="426262" y="1747556"/>
-            <a:chExt cx="11996998" cy="3110851"/>
+            <a:ext cx="508000" cy="508000"/>
           </a:xfrm>
-        </p:grpSpPr>
-        <p:pic>
-          <p:nvPicPr>
-            <p:cNvPr id="89" name="Picture 88">
-              <a:extLst>
-                <a:ext uri="{FF2B5EF4-FFF2-40B4-BE49-F238E27FC236}">
-                  <a16:creationId xmlns:a16="http://schemas.microsoft.com/office/drawing/2014/main" id="{6276561F-EBC2-0A45-B589-1BBFEF85A9DA}"/>
-                </a:ext>
-              </a:extLst>
-            </p:cNvPr>
-            <p:cNvPicPr>
-              <a:picLocks noChangeAspect="1"/>
-            </p:cNvPicPr>
-            <p:nvPr/>
-          </p:nvPicPr>
-          <p:blipFill>
-            <a:blip r:embed="rId3">
-              <a:extLst>
-                <a:ext uri="{28A0092B-C50C-407E-A947-70E740481C1C}">
-                  <a14:useLocalDpi xmlns:a14="http://schemas.microsoft.com/office/drawing/2010/main" val="0"/>
-                </a:ext>
-              </a:extLst>
-            </a:blip>
-            <a:stretch>
-              <a:fillRect/>
-            </a:stretch>
-          </p:blipFill>
-          <p:spPr>
-            <a:xfrm>
-              <a:off x="426262" y="3067997"/>
-              <a:ext cx="481585" cy="481585"/>
-            </a:xfrm>
-            <a:prstGeom prst="rect">
-              <a:avLst/>
-            </a:prstGeom>
-          </p:spPr>
-        </p:pic>
-        <p:sp>
-          <p:nvSpPr>
-            <p:cNvPr id="90" name="TextBox 89">
-              <a:extLst>
-                <a:ext uri="{FF2B5EF4-FFF2-40B4-BE49-F238E27FC236}">
-                  <a16:creationId xmlns:a16="http://schemas.microsoft.com/office/drawing/2014/main" id="{F5107D4E-FDF7-5144-9B0B-67BC47016A7A}"/>
-                </a:ext>
-              </a:extLst>
-            </p:cNvPr>
-            <p:cNvSpPr txBox="1"/>
-            <p:nvPr/>
-          </p:nvSpPr>
-          <p:spPr>
-            <a:xfrm>
-              <a:off x="1069991" y="1820401"/>
-              <a:ext cx="4363720" cy="400110"/>
-            </a:xfrm>
-            <a:prstGeom prst="rect">
-              <a:avLst/>
-            </a:prstGeom>
-            <a:noFill/>
-          </p:spPr>
-          <p:txBody>
-            <a:bodyPr wrap="square" rtlCol="0">
-              <a:spAutoFit/>
-            </a:bodyPr>
-            <a:lstStyle/>
-            <a:p>
-              <a:r>
-                <a:rPr lang="en-US" sz="2000" dirty="0"/>
-                <a:t>Azure DevOps</a:t>
-              </a:r>
-            </a:p>
-          </p:txBody>
-        </p:sp>
-        <p:sp>
-          <p:nvSpPr>
-            <p:cNvPr id="91" name="TextBox 90">
-              <a:extLst>
-                <a:ext uri="{FF2B5EF4-FFF2-40B4-BE49-F238E27FC236}">
-                  <a16:creationId xmlns:a16="http://schemas.microsoft.com/office/drawing/2014/main" id="{2551AD69-BCF9-234C-A556-8243E7EBC1B7}"/>
-                </a:ext>
-              </a:extLst>
-            </p:cNvPr>
-            <p:cNvSpPr txBox="1"/>
-            <p:nvPr/>
-          </p:nvSpPr>
-          <p:spPr>
-            <a:xfrm>
-              <a:off x="1090311" y="2479299"/>
-              <a:ext cx="5725280" cy="400110"/>
-            </a:xfrm>
-            <a:prstGeom prst="rect">
-              <a:avLst/>
-            </a:prstGeom>
-            <a:noFill/>
-          </p:spPr>
-          <p:txBody>
-            <a:bodyPr wrap="square" rtlCol="0">
-              <a:spAutoFit/>
-            </a:bodyPr>
-            <a:lstStyle/>
-            <a:p>
-              <a:r>
-                <a:rPr lang="en-US" sz="2000" dirty="0"/>
-                <a:t>Azure Repos</a:t>
-              </a:r>
-            </a:p>
-          </p:txBody>
-        </p:sp>
-        <p:sp>
-          <p:nvSpPr>
-            <p:cNvPr id="92" name="TextBox 91">
-              <a:extLst>
-                <a:ext uri="{FF2B5EF4-FFF2-40B4-BE49-F238E27FC236}">
-                  <a16:creationId xmlns:a16="http://schemas.microsoft.com/office/drawing/2014/main" id="{3E3E1ADB-2DB6-784D-9B2A-1E82D13A8507}"/>
-                </a:ext>
-              </a:extLst>
-            </p:cNvPr>
-            <p:cNvSpPr txBox="1"/>
-            <p:nvPr/>
-          </p:nvSpPr>
-          <p:spPr>
-            <a:xfrm>
-              <a:off x="1090311" y="3150181"/>
-              <a:ext cx="5725280" cy="400110"/>
-            </a:xfrm>
-            <a:prstGeom prst="rect">
-              <a:avLst/>
-            </a:prstGeom>
-            <a:noFill/>
-          </p:spPr>
-          <p:txBody>
-            <a:bodyPr wrap="square" rtlCol="0">
-              <a:spAutoFit/>
-            </a:bodyPr>
-            <a:lstStyle/>
-            <a:p>
-              <a:r>
-                <a:rPr lang="en-US" sz="2000" dirty="0"/>
-                <a:t>Azure DevOps with GitHub</a:t>
-              </a:r>
-            </a:p>
-          </p:txBody>
-        </p:sp>
-        <p:pic>
-          <p:nvPicPr>
-            <p:cNvPr id="93" name="Picture 92">
-              <a:extLst>
-                <a:ext uri="{FF2B5EF4-FFF2-40B4-BE49-F238E27FC236}">
-                  <a16:creationId xmlns:a16="http://schemas.microsoft.com/office/drawing/2014/main" id="{DE94B35E-10CD-7344-84CC-01F874BBF2DD}"/>
-                </a:ext>
-              </a:extLst>
-            </p:cNvPr>
-            <p:cNvPicPr>
-              <a:picLocks noChangeAspect="1"/>
-            </p:cNvPicPr>
-            <p:nvPr/>
-          </p:nvPicPr>
-          <p:blipFill>
-            <a:blip r:embed="rId4">
-              <a:extLst>
-                <a:ext uri="{28A0092B-C50C-407E-A947-70E740481C1C}">
-                  <a14:useLocalDpi xmlns:a14="http://schemas.microsoft.com/office/drawing/2010/main" val="0"/>
-                </a:ext>
-              </a:extLst>
-            </a:blip>
-            <a:stretch>
-              <a:fillRect/>
-            </a:stretch>
-          </p:blipFill>
-          <p:spPr>
-            <a:xfrm>
-              <a:off x="6033931" y="2453363"/>
-              <a:ext cx="414427" cy="414427"/>
-            </a:xfrm>
-            <a:prstGeom prst="rect">
-              <a:avLst/>
-            </a:prstGeom>
-          </p:spPr>
-        </p:pic>
-        <p:sp>
-          <p:nvSpPr>
-            <p:cNvPr id="94" name="TextBox 93">
-              <a:extLst>
-                <a:ext uri="{FF2B5EF4-FFF2-40B4-BE49-F238E27FC236}">
-                  <a16:creationId xmlns:a16="http://schemas.microsoft.com/office/drawing/2014/main" id="{1137E064-AB24-4E4B-8EEC-606BF4C9ACE6}"/>
-                </a:ext>
-              </a:extLst>
-            </p:cNvPr>
-            <p:cNvSpPr txBox="1"/>
-            <p:nvPr/>
-          </p:nvSpPr>
-          <p:spPr>
-            <a:xfrm>
-              <a:off x="6697980" y="2485037"/>
-              <a:ext cx="5725280" cy="400110"/>
-            </a:xfrm>
-            <a:prstGeom prst="rect">
-              <a:avLst/>
-            </a:prstGeom>
-            <a:noFill/>
-          </p:spPr>
-          <p:txBody>
-            <a:bodyPr wrap="square" rtlCol="0">
-              <a:spAutoFit/>
-            </a:bodyPr>
-            <a:lstStyle/>
-            <a:p>
-              <a:r>
-                <a:rPr lang="en-US" sz="2000" dirty="0"/>
-                <a:t>Azure Web Apps</a:t>
-              </a:r>
-            </a:p>
-          </p:txBody>
-        </p:sp>
-        <p:sp>
-          <p:nvSpPr>
-            <p:cNvPr id="95" name="TextBox 94">
-              <a:extLst>
-                <a:ext uri="{FF2B5EF4-FFF2-40B4-BE49-F238E27FC236}">
-                  <a16:creationId xmlns:a16="http://schemas.microsoft.com/office/drawing/2014/main" id="{A4E4334B-62CC-BA42-8923-2B43F0112C64}"/>
-                </a:ext>
-              </a:extLst>
-            </p:cNvPr>
-            <p:cNvSpPr txBox="1"/>
-            <p:nvPr/>
-          </p:nvSpPr>
-          <p:spPr>
-            <a:xfrm>
-              <a:off x="6697980" y="3150181"/>
-              <a:ext cx="5725280" cy="400110"/>
-            </a:xfrm>
-            <a:prstGeom prst="rect">
-              <a:avLst/>
-            </a:prstGeom>
-            <a:noFill/>
-          </p:spPr>
-          <p:txBody>
-            <a:bodyPr wrap="square" rtlCol="0">
-              <a:spAutoFit/>
-            </a:bodyPr>
-            <a:lstStyle/>
-            <a:p>
-              <a:r>
-                <a:rPr lang="en-US" sz="2000" dirty="0"/>
-                <a:t>Azure PostreSQL Database</a:t>
-              </a:r>
-            </a:p>
-          </p:txBody>
-        </p:sp>
-        <p:cxnSp>
-          <p:nvCxnSpPr>
-            <p:cNvPr id="96" name="Straight Arrow Connector 95">
-              <a:extLst>
-                <a:ext uri="{FF2B5EF4-FFF2-40B4-BE49-F238E27FC236}">
-                  <a16:creationId xmlns:a16="http://schemas.microsoft.com/office/drawing/2014/main" id="{D3A0320F-285E-B344-9A30-657BFD4A5593}"/>
-                </a:ext>
-              </a:extLst>
-            </p:cNvPr>
-            <p:cNvCxnSpPr>
-              <a:cxnSpLocks/>
-              <a:stCxn id="100" idx="3"/>
-              <a:endCxn id="101" idx="1"/>
-            </p:cNvCxnSpPr>
-            <p:nvPr/>
-          </p:nvCxnSpPr>
-          <p:spPr>
-            <a:xfrm>
-              <a:off x="2825314" y="4464769"/>
-              <a:ext cx="465694" cy="0"/>
-            </a:xfrm>
-            <a:prstGeom prst="straightConnector1">
-              <a:avLst/>
-            </a:prstGeom>
-            <a:ln w="9525" cap="flat" cmpd="sng" algn="ctr">
-              <a:solidFill>
-                <a:schemeClr val="accent6"/>
-              </a:solidFill>
-              <a:prstDash val="solid"/>
-              <a:round/>
-              <a:headEnd type="none" w="med" len="med"/>
-              <a:tailEnd type="arrow" w="med" len="med"/>
-            </a:ln>
-          </p:spPr>
-          <p:style>
-            <a:lnRef idx="0">
-              <a:scrgbClr r="0" g="0" b="0"/>
-            </a:lnRef>
-            <a:fillRef idx="0">
-              <a:scrgbClr r="0" g="0" b="0"/>
-            </a:fillRef>
-            <a:effectRef idx="0">
-              <a:scrgbClr r="0" g="0" b="0"/>
-            </a:effectRef>
-            <a:fontRef idx="minor">
-              <a:schemeClr val="tx1"/>
-            </a:fontRef>
-          </p:style>
-        </p:cxnSp>
-        <p:cxnSp>
-          <p:nvCxnSpPr>
-            <p:cNvPr id="97" name="Straight Arrow Connector 96">
-              <a:extLst>
-                <a:ext uri="{FF2B5EF4-FFF2-40B4-BE49-F238E27FC236}">
-                  <a16:creationId xmlns:a16="http://schemas.microsoft.com/office/drawing/2014/main" id="{BC4BAE5C-7CBB-2645-B693-B5918A80E60A}"/>
-                </a:ext>
-              </a:extLst>
-            </p:cNvPr>
-            <p:cNvCxnSpPr>
-              <a:cxnSpLocks/>
-              <a:stCxn id="101" idx="3"/>
-              <a:endCxn id="102" idx="1"/>
-            </p:cNvCxnSpPr>
-            <p:nvPr/>
-          </p:nvCxnSpPr>
-          <p:spPr>
-            <a:xfrm>
-              <a:off x="4971969" y="4464769"/>
-              <a:ext cx="465694" cy="0"/>
-            </a:xfrm>
-            <a:prstGeom prst="straightConnector1">
-              <a:avLst/>
-            </a:prstGeom>
-            <a:ln w="9525" cap="flat" cmpd="sng" algn="ctr">
-              <a:solidFill>
-                <a:schemeClr val="accent6"/>
-              </a:solidFill>
-              <a:prstDash val="solid"/>
-              <a:round/>
-              <a:headEnd type="none" w="med" len="med"/>
-              <a:tailEnd type="arrow" w="med" len="med"/>
-            </a:ln>
-          </p:spPr>
-          <p:style>
-            <a:lnRef idx="0">
-              <a:scrgbClr r="0" g="0" b="0"/>
-            </a:lnRef>
-            <a:fillRef idx="0">
-              <a:scrgbClr r="0" g="0" b="0"/>
-            </a:fillRef>
-            <a:effectRef idx="0">
-              <a:scrgbClr r="0" g="0" b="0"/>
-            </a:effectRef>
-            <a:fontRef idx="minor">
-              <a:schemeClr val="tx1"/>
-            </a:fontRef>
-          </p:style>
-        </p:cxnSp>
-        <p:cxnSp>
-          <p:nvCxnSpPr>
-            <p:cNvPr id="98" name="Straight Arrow Connector 97">
-              <a:extLst>
-                <a:ext uri="{FF2B5EF4-FFF2-40B4-BE49-F238E27FC236}">
-                  <a16:creationId xmlns:a16="http://schemas.microsoft.com/office/drawing/2014/main" id="{D0D3FAA1-451B-144B-A568-5F736357D4EC}"/>
-                </a:ext>
-              </a:extLst>
-            </p:cNvPr>
-            <p:cNvCxnSpPr>
-              <a:cxnSpLocks/>
-              <a:stCxn id="102" idx="3"/>
-              <a:endCxn id="103" idx="1"/>
-            </p:cNvCxnSpPr>
-            <p:nvPr/>
-          </p:nvCxnSpPr>
-          <p:spPr>
-            <a:xfrm>
-              <a:off x="7118624" y="4464769"/>
-              <a:ext cx="465694" cy="0"/>
-            </a:xfrm>
-            <a:prstGeom prst="straightConnector1">
-              <a:avLst/>
-            </a:prstGeom>
-            <a:ln w="9525" cap="flat" cmpd="sng" algn="ctr">
-              <a:solidFill>
-                <a:schemeClr val="accent6"/>
-              </a:solidFill>
-              <a:prstDash val="solid"/>
-              <a:round/>
-              <a:headEnd type="none" w="med" len="med"/>
-              <a:tailEnd type="arrow" w="med" len="med"/>
-            </a:ln>
-          </p:spPr>
-          <p:style>
-            <a:lnRef idx="0">
-              <a:scrgbClr r="0" g="0" b="0"/>
-            </a:lnRef>
-            <a:fillRef idx="0">
-              <a:scrgbClr r="0" g="0" b="0"/>
-            </a:fillRef>
-            <a:effectRef idx="0">
-              <a:scrgbClr r="0" g="0" b="0"/>
-            </a:effectRef>
-            <a:fontRef idx="minor">
-              <a:schemeClr val="tx1"/>
-            </a:fontRef>
-          </p:style>
-        </p:cxnSp>
-        <p:cxnSp>
-          <p:nvCxnSpPr>
-            <p:cNvPr id="99" name="Straight Arrow Connector 98">
-              <a:extLst>
-                <a:ext uri="{FF2B5EF4-FFF2-40B4-BE49-F238E27FC236}">
-                  <a16:creationId xmlns:a16="http://schemas.microsoft.com/office/drawing/2014/main" id="{30435B2B-6826-7842-B0FF-05D2012A05FD}"/>
-                </a:ext>
-              </a:extLst>
-            </p:cNvPr>
-            <p:cNvCxnSpPr>
-              <a:cxnSpLocks/>
-              <a:stCxn id="103" idx="3"/>
-              <a:endCxn id="104" idx="1"/>
-            </p:cNvCxnSpPr>
-            <p:nvPr/>
-          </p:nvCxnSpPr>
-          <p:spPr>
-            <a:xfrm>
-              <a:off x="9265279" y="4464769"/>
-              <a:ext cx="465694" cy="0"/>
-            </a:xfrm>
-            <a:prstGeom prst="straightConnector1">
-              <a:avLst/>
-            </a:prstGeom>
-            <a:ln w="9525" cap="flat" cmpd="sng" algn="ctr">
-              <a:solidFill>
-                <a:schemeClr val="accent6"/>
-              </a:solidFill>
-              <a:prstDash val="solid"/>
-              <a:round/>
-              <a:headEnd type="none" w="med" len="med"/>
-              <a:tailEnd type="arrow" w="med" len="med"/>
-            </a:ln>
-          </p:spPr>
-          <p:style>
-            <a:lnRef idx="0">
-              <a:scrgbClr r="0" g="0" b="0"/>
-            </a:lnRef>
-            <a:fillRef idx="0">
-              <a:scrgbClr r="0" g="0" b="0"/>
-            </a:fillRef>
-            <a:effectRef idx="0">
-              <a:scrgbClr r="0" g="0" b="0"/>
-            </a:effectRef>
-            <a:fontRef idx="minor">
-              <a:schemeClr val="tx1"/>
-            </a:fontRef>
-          </p:style>
-        </p:cxnSp>
-        <p:sp>
-          <p:nvSpPr>
-            <p:cNvPr id="100" name="Rectangle 99">
-              <a:extLst>
-                <a:ext uri="{FF2B5EF4-FFF2-40B4-BE49-F238E27FC236}">
-                  <a16:creationId xmlns:a16="http://schemas.microsoft.com/office/drawing/2014/main" id="{576729F6-E197-FA4C-8E9D-DCE4120B2FEE}"/>
-                </a:ext>
-              </a:extLst>
-            </p:cNvPr>
-            <p:cNvSpPr/>
-            <p:nvPr/>
-          </p:nvSpPr>
-          <p:spPr bwMode="auto">
-            <a:xfrm>
-              <a:off x="441086" y="4071130"/>
-              <a:ext cx="2384228" cy="787277"/>
-            </a:xfrm>
-            <a:prstGeom prst="rect">
-              <a:avLst/>
-            </a:prstGeom>
-            <a:solidFill>
-              <a:srgbClr val="002060"/>
-            </a:solidFill>
-            <a:ln>
-              <a:noFill/>
-              <a:headEnd type="none" w="med" len="med"/>
-              <a:tailEnd type="none" w="med" len="med"/>
-            </a:ln>
-            <a:effectLst/>
-          </p:spPr>
-          <p:style>
-            <a:lnRef idx="1">
-              <a:schemeClr val="accent2"/>
-            </a:lnRef>
-            <a:fillRef idx="3">
-              <a:schemeClr val="accent2"/>
-            </a:fillRef>
-            <a:effectRef idx="2">
-              <a:schemeClr val="accent2"/>
-            </a:effectRef>
-            <a:fontRef idx="minor">
-              <a:schemeClr val="lt1"/>
-            </a:fontRef>
-          </p:style>
-          <p:txBody>
-            <a:bodyPr rot="0" spcFirstLastPara="0" vertOverflow="overflow" horzOverflow="overflow" vert="horz" wrap="square" lIns="182857" tIns="146285" rIns="182857" bIns="146285" numCol="1" spcCol="0" rtlCol="0" fromWordArt="0" anchor="t" anchorCtr="0" forceAA="0" compatLnSpc="1">
-              <a:prstTxWarp prst="textNoShape">
-                <a:avLst/>
-              </a:prstTxWarp>
-              <a:noAutofit/>
-            </a:bodyPr>
-            <a:lstStyle/>
-            <a:p>
-              <a:pPr marL="0" marR="0" lvl="0" indent="0" algn="ctr" defTabSz="932021" rtl="0" eaLnBrk="1" fontAlgn="auto" latinLnBrk="0" hangingPunct="1">
-                <a:lnSpc>
-                  <a:spcPct val="90000"/>
-                </a:lnSpc>
-                <a:spcBef>
-                  <a:spcPts val="0"/>
-                </a:spcBef>
-                <a:spcAft>
-                  <a:spcPts val="0"/>
-                </a:spcAft>
-                <a:buClrTx/>
-                <a:buSzTx/>
-                <a:buFontTx/>
-                <a:buNone/>
-                <a:tabLst/>
-                <a:defRPr/>
-              </a:pPr>
-              <a:r>
-                <a:rPr kumimoji="0" lang="en-US" sz="1400" b="1" i="0" u="none" strike="noStrike" kern="0" cap="none" spc="0" normalizeH="0" baseline="0" noProof="0" dirty="0">
-                  <a:ln>
-                    <a:noFill/>
-                  </a:ln>
-                  <a:gradFill>
-                    <a:gsLst>
-                      <a:gs pos="0">
-                        <a:srgbClr val="FFFFFF"/>
-                      </a:gs>
-                      <a:gs pos="100000">
-                        <a:srgbClr val="FFFFFF"/>
-                      </a:gs>
-                    </a:gsLst>
-                    <a:lin ang="5400000" scaled="0"/>
-                  </a:gradFill>
-                  <a:effectLst/>
-                  <a:uLnTx/>
-                  <a:uFillTx/>
-                  <a:latin typeface="Segoe UI Light"/>
-                  <a:ea typeface="Segoe UI" pitchFamily="34" charset="0"/>
-                  <a:cs typeface="Segoe UI" pitchFamily="34" charset="0"/>
-                </a:rPr>
-                <a:t>SOURCE CONTROL</a:t>
-              </a:r>
-            </a:p>
-          </p:txBody>
-        </p:sp>
-        <p:sp>
-          <p:nvSpPr>
-            <p:cNvPr id="101" name="Rectangle 100">
-              <a:extLst>
-                <a:ext uri="{FF2B5EF4-FFF2-40B4-BE49-F238E27FC236}">
-                  <a16:creationId xmlns:a16="http://schemas.microsoft.com/office/drawing/2014/main" id="{6938DFFB-2E41-6B44-ABA0-FF6C35412EFF}"/>
-                </a:ext>
-              </a:extLst>
-            </p:cNvPr>
-            <p:cNvSpPr/>
-            <p:nvPr/>
-          </p:nvSpPr>
-          <p:spPr bwMode="auto">
-            <a:xfrm>
-              <a:off x="3291008" y="4071130"/>
-              <a:ext cx="1680961" cy="787277"/>
-            </a:xfrm>
-            <a:prstGeom prst="rect">
-              <a:avLst/>
-            </a:prstGeom>
-            <a:solidFill>
-              <a:srgbClr val="002060"/>
-            </a:solidFill>
-            <a:ln>
-              <a:noFill/>
-              <a:headEnd type="none" w="med" len="med"/>
-              <a:tailEnd type="none" w="med" len="med"/>
-            </a:ln>
-            <a:effectLst/>
-          </p:spPr>
-          <p:style>
-            <a:lnRef idx="1">
-              <a:schemeClr val="accent2"/>
-            </a:lnRef>
-            <a:fillRef idx="3">
-              <a:schemeClr val="accent2"/>
-            </a:fillRef>
-            <a:effectRef idx="2">
-              <a:schemeClr val="accent2"/>
-            </a:effectRef>
-            <a:fontRef idx="minor">
-              <a:schemeClr val="lt1"/>
-            </a:fontRef>
-          </p:style>
-          <p:txBody>
-            <a:bodyPr rot="0" spcFirstLastPara="0" vertOverflow="overflow" horzOverflow="overflow" vert="horz" wrap="square" lIns="182857" tIns="146285" rIns="182857" bIns="146285" numCol="1" spcCol="0" rtlCol="0" fromWordArt="0" anchor="t" anchorCtr="0" forceAA="0" compatLnSpc="1">
-              <a:prstTxWarp prst="textNoShape">
-                <a:avLst/>
-              </a:prstTxWarp>
-              <a:noAutofit/>
-            </a:bodyPr>
-            <a:lstStyle/>
-            <a:p>
-              <a:pPr marL="0" marR="0" lvl="0" indent="0" algn="ctr" defTabSz="932021" rtl="0" eaLnBrk="1" fontAlgn="auto" latinLnBrk="0" hangingPunct="1">
-                <a:lnSpc>
-                  <a:spcPct val="90000"/>
-                </a:lnSpc>
-                <a:spcBef>
-                  <a:spcPts val="0"/>
-                </a:spcBef>
-                <a:spcAft>
-                  <a:spcPts val="0"/>
-                </a:spcAft>
-                <a:buClrTx/>
-                <a:buSzTx/>
-                <a:buFontTx/>
-                <a:buNone/>
-                <a:tabLst/>
-                <a:defRPr/>
-              </a:pPr>
-              <a:r>
-                <a:rPr kumimoji="0" lang="en-US" sz="1400" b="1" i="0" u="none" strike="noStrike" kern="0" cap="none" spc="0" normalizeH="0" baseline="0" noProof="0" dirty="0">
-                  <a:ln>
-                    <a:noFill/>
-                  </a:ln>
-                  <a:gradFill>
-                    <a:gsLst>
-                      <a:gs pos="0">
-                        <a:srgbClr val="FFFFFF"/>
-                      </a:gs>
-                      <a:gs pos="100000">
-                        <a:srgbClr val="FFFFFF"/>
-                      </a:gs>
-                    </a:gsLst>
-                    <a:lin ang="5400000" scaled="0"/>
-                  </a:gradFill>
-                  <a:effectLst/>
-                  <a:uLnTx/>
-                  <a:uFillTx/>
-                  <a:latin typeface="Segoe UI Light"/>
-                  <a:ea typeface="Segoe UI" pitchFamily="34" charset="0"/>
-                  <a:cs typeface="Segoe UI" pitchFamily="34" charset="0"/>
-                </a:rPr>
-                <a:t>CI</a:t>
-              </a:r>
-            </a:p>
-          </p:txBody>
-        </p:sp>
-        <p:sp>
-          <p:nvSpPr>
-            <p:cNvPr id="102" name="Rectangle 101">
-              <a:extLst>
-                <a:ext uri="{FF2B5EF4-FFF2-40B4-BE49-F238E27FC236}">
-                  <a16:creationId xmlns:a16="http://schemas.microsoft.com/office/drawing/2014/main" id="{79C21FAA-E266-0745-A345-C8F9B36EE244}"/>
-                </a:ext>
-              </a:extLst>
-            </p:cNvPr>
-            <p:cNvSpPr/>
-            <p:nvPr/>
-          </p:nvSpPr>
-          <p:spPr bwMode="auto">
-            <a:xfrm>
-              <a:off x="5437663" y="4071130"/>
-              <a:ext cx="1680961" cy="787277"/>
-            </a:xfrm>
-            <a:prstGeom prst="rect">
-              <a:avLst/>
-            </a:prstGeom>
-            <a:solidFill>
-              <a:srgbClr val="002060"/>
-            </a:solidFill>
-            <a:ln>
-              <a:noFill/>
-              <a:headEnd type="none" w="med" len="med"/>
-              <a:tailEnd type="none" w="med" len="med"/>
-            </a:ln>
-            <a:effectLst/>
-          </p:spPr>
-          <p:style>
-            <a:lnRef idx="1">
-              <a:schemeClr val="accent2"/>
-            </a:lnRef>
-            <a:fillRef idx="3">
-              <a:schemeClr val="accent2"/>
-            </a:fillRef>
-            <a:effectRef idx="2">
-              <a:schemeClr val="accent2"/>
-            </a:effectRef>
-            <a:fontRef idx="minor">
-              <a:schemeClr val="lt1"/>
-            </a:fontRef>
-          </p:style>
-          <p:txBody>
-            <a:bodyPr rot="0" spcFirstLastPara="0" vertOverflow="overflow" horzOverflow="overflow" vert="horz" wrap="square" lIns="182857" tIns="146285" rIns="182857" bIns="146285" numCol="1" spcCol="0" rtlCol="0" fromWordArt="0" anchor="t" anchorCtr="0" forceAA="0" compatLnSpc="1">
-              <a:prstTxWarp prst="textNoShape">
-                <a:avLst/>
-              </a:prstTxWarp>
-              <a:noAutofit/>
-            </a:bodyPr>
-            <a:lstStyle/>
-            <a:p>
-              <a:pPr marL="0" marR="0" lvl="0" indent="0" algn="ctr" defTabSz="932021" rtl="0" eaLnBrk="1" fontAlgn="auto" latinLnBrk="0" hangingPunct="1">
-                <a:lnSpc>
-                  <a:spcPct val="90000"/>
-                </a:lnSpc>
-                <a:spcBef>
-                  <a:spcPts val="0"/>
-                </a:spcBef>
-                <a:spcAft>
-                  <a:spcPts val="0"/>
-                </a:spcAft>
-                <a:buClrTx/>
-                <a:buSzTx/>
-                <a:buFontTx/>
-                <a:buNone/>
-                <a:tabLst/>
-                <a:defRPr/>
-              </a:pPr>
-              <a:r>
-                <a:rPr kumimoji="0" lang="en-US" sz="1400" b="1" i="0" u="none" strike="noStrike" kern="0" cap="none" spc="0" normalizeH="0" baseline="0" noProof="0" dirty="0">
-                  <a:ln>
-                    <a:noFill/>
-                  </a:ln>
-                  <a:gradFill>
-                    <a:gsLst>
-                      <a:gs pos="0">
-                        <a:srgbClr val="FFFFFF"/>
-                      </a:gs>
-                      <a:gs pos="100000">
-                        <a:srgbClr val="FFFFFF"/>
-                      </a:gs>
-                    </a:gsLst>
-                    <a:lin ang="5400000" scaled="0"/>
-                  </a:gradFill>
-                  <a:effectLst/>
-                  <a:uLnTx/>
-                  <a:uFillTx/>
-                  <a:latin typeface="Segoe UI Light"/>
-                  <a:ea typeface="Segoe UI" pitchFamily="34" charset="0"/>
-                  <a:cs typeface="Segoe UI" pitchFamily="34" charset="0"/>
-                </a:rPr>
-                <a:t>PACKAGE</a:t>
-              </a:r>
-            </a:p>
-          </p:txBody>
-        </p:sp>
-        <p:sp>
-          <p:nvSpPr>
-            <p:cNvPr id="103" name="Rectangle 102">
-              <a:extLst>
-                <a:ext uri="{FF2B5EF4-FFF2-40B4-BE49-F238E27FC236}">
-                  <a16:creationId xmlns:a16="http://schemas.microsoft.com/office/drawing/2014/main" id="{C43ED478-8C63-4543-93C0-28F25717B8CF}"/>
-                </a:ext>
-              </a:extLst>
-            </p:cNvPr>
-            <p:cNvSpPr/>
-            <p:nvPr/>
-          </p:nvSpPr>
-          <p:spPr bwMode="auto">
-            <a:xfrm>
-              <a:off x="7584318" y="4071130"/>
-              <a:ext cx="1680961" cy="787277"/>
-            </a:xfrm>
-            <a:prstGeom prst="rect">
-              <a:avLst/>
-            </a:prstGeom>
-            <a:solidFill>
-              <a:srgbClr val="002060"/>
-            </a:solidFill>
-            <a:ln>
-              <a:noFill/>
-              <a:headEnd type="none" w="med" len="med"/>
-              <a:tailEnd type="none" w="med" len="med"/>
-            </a:ln>
-            <a:effectLst/>
-          </p:spPr>
-          <p:style>
-            <a:lnRef idx="1">
-              <a:schemeClr val="accent2"/>
-            </a:lnRef>
-            <a:fillRef idx="3">
-              <a:schemeClr val="accent2"/>
-            </a:fillRef>
-            <a:effectRef idx="2">
-              <a:schemeClr val="accent2"/>
-            </a:effectRef>
-            <a:fontRef idx="minor">
-              <a:schemeClr val="lt1"/>
-            </a:fontRef>
-          </p:style>
-          <p:txBody>
-            <a:bodyPr rot="0" spcFirstLastPara="0" vertOverflow="overflow" horzOverflow="overflow" vert="horz" wrap="square" lIns="182857" tIns="146285" rIns="182857" bIns="146285" numCol="1" spcCol="0" rtlCol="0" fromWordArt="0" anchor="t" anchorCtr="0" forceAA="0" compatLnSpc="1">
-              <a:prstTxWarp prst="textNoShape">
-                <a:avLst/>
-              </a:prstTxWarp>
-              <a:noAutofit/>
-            </a:bodyPr>
-            <a:lstStyle/>
-            <a:p>
-              <a:pPr marL="0" marR="0" lvl="0" indent="0" algn="ctr" defTabSz="932021" rtl="0" eaLnBrk="1" fontAlgn="auto" latinLnBrk="0" hangingPunct="1">
-                <a:lnSpc>
-                  <a:spcPct val="90000"/>
-                </a:lnSpc>
-                <a:spcBef>
-                  <a:spcPts val="0"/>
-                </a:spcBef>
-                <a:spcAft>
-                  <a:spcPts val="0"/>
-                </a:spcAft>
-                <a:buClrTx/>
-                <a:buSzTx/>
-                <a:buFontTx/>
-                <a:buNone/>
-                <a:tabLst/>
-                <a:defRPr/>
-              </a:pPr>
-              <a:r>
-                <a:rPr kumimoji="0" lang="en-US" sz="1400" b="1" i="0" u="none" strike="noStrike" kern="0" cap="none" spc="0" normalizeH="0" baseline="0" noProof="0" dirty="0">
-                  <a:ln>
-                    <a:noFill/>
-                  </a:ln>
-                  <a:gradFill>
-                    <a:gsLst>
-                      <a:gs pos="0">
-                        <a:srgbClr val="FFFFFF"/>
-                      </a:gs>
-                      <a:gs pos="100000">
-                        <a:srgbClr val="FFFFFF"/>
-                      </a:gs>
-                    </a:gsLst>
-                    <a:lin ang="5400000" scaled="0"/>
-                  </a:gradFill>
-                  <a:effectLst/>
-                  <a:uLnTx/>
-                  <a:uFillTx/>
-                  <a:latin typeface="Segoe UI Light"/>
-                  <a:ea typeface="Segoe UI" pitchFamily="34" charset="0"/>
-                  <a:cs typeface="Segoe UI" pitchFamily="34" charset="0"/>
-                </a:rPr>
-                <a:t>PIPELINE</a:t>
-              </a:r>
-            </a:p>
-          </p:txBody>
-        </p:sp>
-        <p:sp>
-          <p:nvSpPr>
-            <p:cNvPr id="104" name="Rectangle 103">
-              <a:extLst>
-                <a:ext uri="{FF2B5EF4-FFF2-40B4-BE49-F238E27FC236}">
-                  <a16:creationId xmlns:a16="http://schemas.microsoft.com/office/drawing/2014/main" id="{73DAE83E-EDA8-F94C-B4D7-6A4394E24EDF}"/>
-                </a:ext>
-              </a:extLst>
-            </p:cNvPr>
-            <p:cNvSpPr/>
-            <p:nvPr/>
-          </p:nvSpPr>
-          <p:spPr bwMode="auto">
-            <a:xfrm>
-              <a:off x="9730973" y="4071130"/>
-              <a:ext cx="1680961" cy="787277"/>
-            </a:xfrm>
-            <a:prstGeom prst="rect">
-              <a:avLst/>
-            </a:prstGeom>
-            <a:solidFill>
-              <a:srgbClr val="002060"/>
-            </a:solidFill>
-            <a:ln>
-              <a:noFill/>
-              <a:headEnd type="none" w="med" len="med"/>
-              <a:tailEnd type="none" w="med" len="med"/>
-            </a:ln>
-            <a:effectLst/>
-          </p:spPr>
-          <p:style>
-            <a:lnRef idx="1">
-              <a:schemeClr val="accent2"/>
-            </a:lnRef>
-            <a:fillRef idx="3">
-              <a:schemeClr val="accent2"/>
-            </a:fillRef>
-            <a:effectRef idx="2">
-              <a:schemeClr val="accent2"/>
-            </a:effectRef>
-            <a:fontRef idx="minor">
-              <a:schemeClr val="lt1"/>
-            </a:fontRef>
-          </p:style>
-          <p:txBody>
-            <a:bodyPr rot="0" spcFirstLastPara="0" vertOverflow="overflow" horzOverflow="overflow" vert="horz" wrap="square" lIns="182857" tIns="146285" rIns="182857" bIns="146285" numCol="1" spcCol="0" rtlCol="0" fromWordArt="0" anchor="t" anchorCtr="0" forceAA="0" compatLnSpc="1">
-              <a:prstTxWarp prst="textNoShape">
-                <a:avLst/>
-              </a:prstTxWarp>
-              <a:noAutofit/>
-            </a:bodyPr>
-            <a:lstStyle/>
-            <a:p>
-              <a:pPr marL="0" marR="0" lvl="0" indent="0" algn="ctr" defTabSz="932021" rtl="0" eaLnBrk="1" fontAlgn="auto" latinLnBrk="0" hangingPunct="1">
-                <a:lnSpc>
-                  <a:spcPct val="90000"/>
-                </a:lnSpc>
-                <a:spcBef>
-                  <a:spcPts val="0"/>
-                </a:spcBef>
-                <a:spcAft>
-                  <a:spcPts val="0"/>
-                </a:spcAft>
-                <a:buClrTx/>
-                <a:buSzTx/>
-                <a:buFontTx/>
-                <a:buNone/>
-                <a:tabLst/>
-                <a:defRPr/>
-              </a:pPr>
-              <a:r>
-                <a:rPr kumimoji="0" lang="en-US" sz="1400" b="1" i="0" u="none" strike="noStrike" kern="0" cap="none" spc="0" normalizeH="0" baseline="0" noProof="0" dirty="0">
-                  <a:ln>
-                    <a:noFill/>
-                  </a:ln>
-                  <a:gradFill>
-                    <a:gsLst>
-                      <a:gs pos="0">
-                        <a:srgbClr val="FFFFFF"/>
-                      </a:gs>
-                      <a:gs pos="100000">
-                        <a:srgbClr val="FFFFFF"/>
-                      </a:gs>
-                    </a:gsLst>
-                    <a:lin ang="5400000" scaled="0"/>
-                  </a:gradFill>
-                  <a:effectLst/>
-                  <a:uLnTx/>
-                  <a:uFillTx/>
-                  <a:latin typeface="Segoe UI Light"/>
-                  <a:ea typeface="Segoe UI" pitchFamily="34" charset="0"/>
-                  <a:cs typeface="Segoe UI" pitchFamily="34" charset="0"/>
-                </a:rPr>
-                <a:t>DEPLOYMENT</a:t>
-              </a:r>
-            </a:p>
-          </p:txBody>
-        </p:sp>
-        <p:pic>
-          <p:nvPicPr>
-            <p:cNvPr id="105" name="Picture 104">
-              <a:extLst>
-                <a:ext uri="{FF2B5EF4-FFF2-40B4-BE49-F238E27FC236}">
-                  <a16:creationId xmlns:a16="http://schemas.microsoft.com/office/drawing/2014/main" id="{BCB726B6-7291-E342-8FD5-DEED6C776B1A}"/>
-                </a:ext>
-              </a:extLst>
-            </p:cNvPr>
-            <p:cNvPicPr>
-              <a:picLocks noChangeAspect="1"/>
-            </p:cNvPicPr>
-            <p:nvPr/>
-          </p:nvPicPr>
-          <p:blipFill>
-            <a:blip r:embed="rId5"/>
-            <a:stretch>
-              <a:fillRect/>
-            </a:stretch>
-          </p:blipFill>
-          <p:spPr>
-            <a:xfrm>
-              <a:off x="427878" y="2403332"/>
-              <a:ext cx="508000" cy="508000"/>
-            </a:xfrm>
-            <a:prstGeom prst="rect">
-              <a:avLst/>
-            </a:prstGeom>
-          </p:spPr>
-        </p:pic>
-        <p:pic>
-          <p:nvPicPr>
-            <p:cNvPr id="106" name="Picture 105">
-              <a:extLst>
-                <a:ext uri="{FF2B5EF4-FFF2-40B4-BE49-F238E27FC236}">
-                  <a16:creationId xmlns:a16="http://schemas.microsoft.com/office/drawing/2014/main" id="{AE06475A-4E4E-A942-AA53-7ABC22F78264}"/>
-                </a:ext>
-              </a:extLst>
-            </p:cNvPr>
-            <p:cNvPicPr>
-              <a:picLocks noChangeAspect="1"/>
-            </p:cNvPicPr>
-            <p:nvPr/>
-          </p:nvPicPr>
-          <p:blipFill>
-            <a:blip r:embed="rId6"/>
-            <a:stretch>
-              <a:fillRect/>
-            </a:stretch>
-          </p:blipFill>
-          <p:spPr>
-            <a:xfrm>
-              <a:off x="426262" y="1747556"/>
-              <a:ext cx="508000" cy="508000"/>
-            </a:xfrm>
-            <a:prstGeom prst="rect">
-              <a:avLst/>
-            </a:prstGeom>
-          </p:spPr>
-        </p:pic>
-      </p:grpSp>
+          <a:prstGeom prst="rect">
+            <a:avLst/>
+          </a:prstGeom>
+        </p:spPr>
+      </p:pic>
       <p:pic>
         <p:nvPicPr>
           <p:cNvPr id="107" name="Graphic 106">
@@ -19156,7 +19129,7 @@
         <p:spPr>
           <a:xfrm>
             <a:off x="1242711" y="2631699"/>
-            <a:ext cx="5725280" cy="400110"/>
+            <a:ext cx="4807265" cy="400110"/>
           </a:xfrm>
           <a:prstGeom prst="rect">
             <a:avLst/>
@@ -19297,6 +19270,36 @@
           </a:p>
         </p:txBody>
       </p:sp>
+      <p:pic>
+        <p:nvPicPr>
+          <p:cNvPr id="5" name="Picture 4">
+            <a:extLst>
+              <a:ext uri="{FF2B5EF4-FFF2-40B4-BE49-F238E27FC236}">
+                <a16:creationId xmlns:a16="http://schemas.microsoft.com/office/drawing/2014/main" id="{20F4A304-3D88-48B1-86B1-09A467C36F9E}"/>
+              </a:ext>
+            </a:extLst>
+          </p:cNvPr>
+          <p:cNvPicPr>
+            <a:picLocks noChangeAspect="1"/>
+          </p:cNvPicPr>
+          <p:nvPr/>
+        </p:nvPicPr>
+        <p:blipFill>
+          <a:blip r:embed="rId9"/>
+          <a:stretch>
+            <a:fillRect/>
+          </a:stretch>
+        </p:blipFill>
+        <p:spPr>
+          <a:xfrm>
+            <a:off x="6184618" y="3212940"/>
+            <a:ext cx="482855" cy="616327"/>
+          </a:xfrm>
+          <a:prstGeom prst="rect">
+            <a:avLst/>
+          </a:prstGeom>
+        </p:spPr>
+      </p:pic>
     </p:spTree>
     <p:extLst>
       <p:ext uri="{BB962C8B-B14F-4D97-AF65-F5344CB8AC3E}">
@@ -20736,10 +20739,10 @@
       </p:sp>
       <p:grpSp>
         <p:nvGrpSpPr>
-          <p:cNvPr id="106" name="Group 105">
+          <p:cNvPr id="2" name="Group 1">
             <a:extLst>
               <a:ext uri="{FF2B5EF4-FFF2-40B4-BE49-F238E27FC236}">
-                <a16:creationId xmlns:a16="http://schemas.microsoft.com/office/drawing/2014/main" id="{1EBEBB7F-5E39-EC4D-B80C-012AB563942D}"/>
+                <a16:creationId xmlns:a16="http://schemas.microsoft.com/office/drawing/2014/main" id="{D32D0071-4F8B-43B1-9012-8D41CAD828D8}"/>
               </a:ext>
             </a:extLst>
           </p:cNvPr>
@@ -21673,13 +21676,12 @@
                   <a:avLst/>
                 </a:prstGeom>
                 <a:solidFill>
-                  <a:schemeClr val="bg2">
-                    <a:lumMod val="60000"/>
-                    <a:lumOff val="40000"/>
-                  </a:schemeClr>
+                  <a:schemeClr val="tx1"/>
                 </a:solidFill>
                 <a:ln>
-                  <a:noFill/>
+                  <a:solidFill>
+                    <a:schemeClr val="accent1"/>
+                  </a:solidFill>
                   <a:headEnd type="none" w="med" len="med"/>
                   <a:tailEnd type="none" w="med" len="med"/>
                 </a:ln>
@@ -21721,17 +21723,9 @@
                   </a:pPr>
                   <a:r>
                     <a:rPr lang="en-US" sz="900" dirty="0">
-                      <a:gradFill>
-                        <a:gsLst>
-                          <a:gs pos="0">
-                            <a:srgbClr val="FFFFFF"/>
-                          </a:gs>
-                          <a:gs pos="100000">
-                            <a:srgbClr val="FFFFFF"/>
-                          </a:gs>
-                        </a:gsLst>
-                        <a:lin ang="5400000" scaled="0"/>
-                      </a:gradFill>
+                      <a:solidFill>
+                        <a:schemeClr val="bg1"/>
+                      </a:solidFill>
                       <a:latin typeface="Arial" panose="020B0604020202020204" pitchFamily="34" charset="0"/>
                       <a:ea typeface="Segoe UI" pitchFamily="34" charset="0"/>
                       <a:cs typeface="Arial" panose="020B0604020202020204" pitchFamily="34" charset="0"/>
@@ -21897,13 +21891,12 @@
                 <a:avLst/>
               </a:prstGeom>
               <a:solidFill>
-                <a:schemeClr val="bg2">
-                  <a:lumMod val="60000"/>
-                  <a:lumOff val="40000"/>
-                </a:schemeClr>
+                <a:schemeClr val="tx1"/>
               </a:solidFill>
               <a:ln>
-                <a:noFill/>
+                <a:solidFill>
+                  <a:schemeClr val="accent1"/>
+                </a:solidFill>
                 <a:headEnd type="none" w="med" len="med"/>
                 <a:tailEnd type="none" w="med" len="med"/>
               </a:ln>
@@ -21945,17 +21938,9 @@
                 </a:pPr>
                 <a:r>
                   <a:rPr lang="en-US" sz="900" dirty="0">
-                    <a:gradFill>
-                      <a:gsLst>
-                        <a:gs pos="0">
-                          <a:srgbClr val="FFFFFF"/>
-                        </a:gs>
-                        <a:gs pos="100000">
-                          <a:srgbClr val="FFFFFF"/>
-                        </a:gs>
-                      </a:gsLst>
-                      <a:lin ang="5400000" scaled="0"/>
-                    </a:gradFill>
+                    <a:solidFill>
+                      <a:schemeClr val="bg1"/>
+                    </a:solidFill>
                     <a:latin typeface="Arial" panose="020B0604020202020204" pitchFamily="34" charset="0"/>
                     <a:ea typeface="Segoe UI" pitchFamily="34" charset="0"/>
                     <a:cs typeface="Arial" panose="020B0604020202020204" pitchFamily="34" charset="0"/>
@@ -21986,13 +21971,12 @@
                 <a:avLst/>
               </a:prstGeom>
               <a:solidFill>
-                <a:schemeClr val="bg2">
-                  <a:lumMod val="60000"/>
-                  <a:lumOff val="40000"/>
-                </a:schemeClr>
+                <a:schemeClr val="tx1"/>
               </a:solidFill>
               <a:ln>
-                <a:noFill/>
+                <a:solidFill>
+                  <a:schemeClr val="accent1"/>
+                </a:solidFill>
                 <a:headEnd type="none" w="med" len="med"/>
                 <a:tailEnd type="none" w="med" len="med"/>
               </a:ln>
@@ -22034,17 +22018,9 @@
                 </a:pPr>
                 <a:r>
                   <a:rPr lang="en-US" sz="900" dirty="0">
-                    <a:gradFill>
-                      <a:gsLst>
-                        <a:gs pos="0">
-                          <a:srgbClr val="FFFFFF"/>
-                        </a:gs>
-                        <a:gs pos="100000">
-                          <a:srgbClr val="FFFFFF"/>
-                        </a:gs>
-                      </a:gsLst>
-                      <a:lin ang="5400000" scaled="0"/>
-                    </a:gradFill>
+                    <a:solidFill>
+                      <a:schemeClr val="bg1"/>
+                    </a:solidFill>
                     <a:latin typeface="Arial" panose="020B0604020202020204" pitchFamily="34" charset="0"/>
                     <a:ea typeface="Segoe UI" pitchFamily="34" charset="0"/>
                     <a:cs typeface="Arial" panose="020B0604020202020204" pitchFamily="34" charset="0"/>
@@ -22537,392 +22513,606 @@
             </a:prstGeom>
           </p:spPr>
         </p:pic>
+        <p:pic>
+          <p:nvPicPr>
+            <p:cNvPr id="142" name="Graphic 141">
+              <a:extLst>
+                <a:ext uri="{FF2B5EF4-FFF2-40B4-BE49-F238E27FC236}">
+                  <a16:creationId xmlns:a16="http://schemas.microsoft.com/office/drawing/2014/main" id="{26DBC607-57B7-144F-AA32-C301DEF1C98B}"/>
+                </a:ext>
+              </a:extLst>
+            </p:cNvPr>
+            <p:cNvPicPr>
+              <a:picLocks noChangeAspect="1"/>
+            </p:cNvPicPr>
+            <p:nvPr/>
+          </p:nvPicPr>
+          <p:blipFill>
+            <a:blip r:embed="rId8" cstate="print">
+              <a:extLst>
+                <a:ext uri="{28A0092B-C50C-407E-A947-70E740481C1C}">
+                  <a14:useLocalDpi xmlns:a14="http://schemas.microsoft.com/office/drawing/2010/main" val="0"/>
+                </a:ext>
+                <a:ext uri="{96DAC541-7B7A-43D3-8B79-37D633B846F1}">
+                  <asvg:svgBlip xmlns:asvg="http://schemas.microsoft.com/office/drawing/2016/SVG/main" r:embed="rId9"/>
+                </a:ext>
+              </a:extLst>
+            </a:blip>
+            <a:stretch>
+              <a:fillRect/>
+            </a:stretch>
+          </p:blipFill>
+          <p:spPr>
+            <a:xfrm>
+              <a:off x="9350740" y="2887663"/>
+              <a:ext cx="131621" cy="177866"/>
+            </a:xfrm>
+            <a:prstGeom prst="rect">
+              <a:avLst/>
+            </a:prstGeom>
+          </p:spPr>
+        </p:pic>
+        <p:sp>
+          <p:nvSpPr>
+            <p:cNvPr id="143" name="TextBox 142">
+              <a:extLst>
+                <a:ext uri="{FF2B5EF4-FFF2-40B4-BE49-F238E27FC236}">
+                  <a16:creationId xmlns:a16="http://schemas.microsoft.com/office/drawing/2014/main" id="{36865193-B50F-8847-9878-5B44BFBB44CE}"/>
+                </a:ext>
+              </a:extLst>
+            </p:cNvPr>
+            <p:cNvSpPr txBox="1"/>
+            <p:nvPr/>
+          </p:nvSpPr>
+          <p:spPr>
+            <a:xfrm>
+              <a:off x="8931273" y="4012959"/>
+              <a:ext cx="966298" cy="517065"/>
+            </a:xfrm>
+            <a:prstGeom prst="rect">
+              <a:avLst/>
+            </a:prstGeom>
+            <a:noFill/>
+          </p:spPr>
+          <p:txBody>
+            <a:bodyPr wrap="square" lIns="182880" tIns="146304" rIns="182880" bIns="146304" rtlCol="0">
+              <a:spAutoFit/>
+            </a:bodyPr>
+            <a:lstStyle/>
+            <a:p>
+              <a:pPr algn="ctr">
+                <a:lnSpc>
+                  <a:spcPct val="90000"/>
+                </a:lnSpc>
+                <a:spcAft>
+                  <a:spcPts val="600"/>
+                </a:spcAft>
+              </a:pPr>
+              <a:r>
+                <a:rPr lang="en-US" sz="800" dirty="0">
+                  <a:solidFill>
+                    <a:schemeClr val="bg1"/>
+                  </a:solidFill>
+                  <a:latin typeface="Arial" panose="020B0604020202020204" pitchFamily="34" charset="0"/>
+                  <a:cs typeface="Arial" panose="020B0604020202020204" pitchFamily="34" charset="0"/>
+                </a:rPr>
+                <a:t>Azure PostgreSQL</a:t>
+              </a:r>
+            </a:p>
+          </p:txBody>
+        </p:sp>
+        <p:sp>
+          <p:nvSpPr>
+            <p:cNvPr id="144" name="TextBox 143">
+              <a:extLst>
+                <a:ext uri="{FF2B5EF4-FFF2-40B4-BE49-F238E27FC236}">
+                  <a16:creationId xmlns:a16="http://schemas.microsoft.com/office/drawing/2014/main" id="{F46E0045-A5E1-6B41-8826-A38C67B47DAE}"/>
+                </a:ext>
+              </a:extLst>
+            </p:cNvPr>
+            <p:cNvSpPr txBox="1"/>
+            <p:nvPr/>
+          </p:nvSpPr>
+          <p:spPr>
+            <a:xfrm>
+              <a:off x="8529682" y="4025488"/>
+              <a:ext cx="739729" cy="517065"/>
+            </a:xfrm>
+            <a:prstGeom prst="rect">
+              <a:avLst/>
+            </a:prstGeom>
+            <a:noFill/>
+          </p:spPr>
+          <p:txBody>
+            <a:bodyPr wrap="square" lIns="182880" tIns="146304" rIns="182880" bIns="146304" rtlCol="0">
+              <a:spAutoFit/>
+            </a:bodyPr>
+            <a:lstStyle/>
+            <a:p>
+              <a:pPr algn="ctr">
+                <a:lnSpc>
+                  <a:spcPct val="90000"/>
+                </a:lnSpc>
+                <a:spcAft>
+                  <a:spcPts val="600"/>
+                </a:spcAft>
+              </a:pPr>
+              <a:r>
+                <a:rPr lang="en-US" sz="800" dirty="0">
+                  <a:solidFill>
+                    <a:schemeClr val="bg1"/>
+                  </a:solidFill>
+                  <a:latin typeface="Arial" panose="020B0604020202020204" pitchFamily="34" charset="0"/>
+                  <a:cs typeface="Arial" panose="020B0604020202020204" pitchFamily="34" charset="0"/>
+                </a:rPr>
+                <a:t>App Service</a:t>
+              </a:r>
+            </a:p>
+          </p:txBody>
+        </p:sp>
+        <p:pic>
+          <p:nvPicPr>
+            <p:cNvPr id="145" name="Picture 144">
+              <a:extLst>
+                <a:ext uri="{FF2B5EF4-FFF2-40B4-BE49-F238E27FC236}">
+                  <a16:creationId xmlns:a16="http://schemas.microsoft.com/office/drawing/2014/main" id="{4B963048-4005-FD42-9651-4D375A555B16}"/>
+                </a:ext>
+              </a:extLst>
+            </p:cNvPr>
+            <p:cNvPicPr>
+              <a:picLocks noChangeAspect="1"/>
+            </p:cNvPicPr>
+            <p:nvPr/>
+          </p:nvPicPr>
+          <p:blipFill>
+            <a:blip r:embed="rId6" cstate="print">
+              <a:extLst>
+                <a:ext uri="{28A0092B-C50C-407E-A947-70E740481C1C}">
+                  <a14:useLocalDpi xmlns:a14="http://schemas.microsoft.com/office/drawing/2010/main" val="0"/>
+                </a:ext>
+              </a:extLst>
+            </a:blip>
+            <a:stretch>
+              <a:fillRect/>
+            </a:stretch>
+          </p:blipFill>
+          <p:spPr>
+            <a:xfrm>
+              <a:off x="8821295" y="3956979"/>
+              <a:ext cx="193592" cy="193592"/>
+            </a:xfrm>
+            <a:prstGeom prst="rect">
+              <a:avLst/>
+            </a:prstGeom>
+          </p:spPr>
+        </p:pic>
+        <p:pic>
+          <p:nvPicPr>
+            <p:cNvPr id="146" name="Graphic 145">
+              <a:extLst>
+                <a:ext uri="{FF2B5EF4-FFF2-40B4-BE49-F238E27FC236}">
+                  <a16:creationId xmlns:a16="http://schemas.microsoft.com/office/drawing/2014/main" id="{A29A7840-1936-A445-A6F5-CFBFF1C93CAD}"/>
+                </a:ext>
+              </a:extLst>
+            </p:cNvPr>
+            <p:cNvPicPr>
+              <a:picLocks noChangeAspect="1"/>
+            </p:cNvPicPr>
+            <p:nvPr/>
+          </p:nvPicPr>
+          <p:blipFill>
+            <a:blip r:embed="rId8" cstate="print">
+              <a:extLst>
+                <a:ext uri="{28A0092B-C50C-407E-A947-70E740481C1C}">
+                  <a14:useLocalDpi xmlns:a14="http://schemas.microsoft.com/office/drawing/2010/main" val="0"/>
+                </a:ext>
+                <a:ext uri="{96DAC541-7B7A-43D3-8B79-37D633B846F1}">
+                  <asvg:svgBlip xmlns:asvg="http://schemas.microsoft.com/office/drawing/2016/SVG/main" r:embed="rId9"/>
+                </a:ext>
+              </a:extLst>
+            </a:blip>
+            <a:stretch>
+              <a:fillRect/>
+            </a:stretch>
+          </p:blipFill>
+          <p:spPr>
+            <a:xfrm>
+              <a:off x="9365330" y="3949315"/>
+              <a:ext cx="131621" cy="177866"/>
+            </a:xfrm>
+            <a:prstGeom prst="rect">
+              <a:avLst/>
+            </a:prstGeom>
+          </p:spPr>
+        </p:pic>
+        <p:sp>
+          <p:nvSpPr>
+            <p:cNvPr id="147" name="TextBox 146">
+              <a:extLst>
+                <a:ext uri="{FF2B5EF4-FFF2-40B4-BE49-F238E27FC236}">
+                  <a16:creationId xmlns:a16="http://schemas.microsoft.com/office/drawing/2014/main" id="{3112BBED-1814-E44E-AFBA-379210019284}"/>
+                </a:ext>
+              </a:extLst>
+            </p:cNvPr>
+            <p:cNvSpPr txBox="1"/>
+            <p:nvPr/>
+          </p:nvSpPr>
+          <p:spPr>
+            <a:xfrm>
+              <a:off x="10324867" y="3464056"/>
+              <a:ext cx="1049333" cy="517065"/>
+            </a:xfrm>
+            <a:prstGeom prst="rect">
+              <a:avLst/>
+            </a:prstGeom>
+            <a:noFill/>
+          </p:spPr>
+          <p:txBody>
+            <a:bodyPr wrap="square" lIns="182880" tIns="146304" rIns="182880" bIns="146304" rtlCol="0">
+              <a:spAutoFit/>
+            </a:bodyPr>
+            <a:lstStyle/>
+            <a:p>
+              <a:pPr algn="ctr">
+                <a:lnSpc>
+                  <a:spcPct val="90000"/>
+                </a:lnSpc>
+                <a:spcAft>
+                  <a:spcPts val="600"/>
+                </a:spcAft>
+              </a:pPr>
+              <a:r>
+                <a:rPr lang="en-US" sz="800" dirty="0">
+                  <a:solidFill>
+                    <a:schemeClr val="bg1"/>
+                  </a:solidFill>
+                  <a:latin typeface="Arial" panose="020B0604020202020204" pitchFamily="34" charset="0"/>
+                  <a:cs typeface="Arial" panose="020B0604020202020204" pitchFamily="34" charset="0"/>
+                </a:rPr>
+                <a:t>Azure PostgreSQL</a:t>
+              </a:r>
+            </a:p>
+          </p:txBody>
+        </p:sp>
+        <p:sp>
+          <p:nvSpPr>
+            <p:cNvPr id="148" name="TextBox 147">
+              <a:extLst>
+                <a:ext uri="{FF2B5EF4-FFF2-40B4-BE49-F238E27FC236}">
+                  <a16:creationId xmlns:a16="http://schemas.microsoft.com/office/drawing/2014/main" id="{7CEA8FCB-32F3-EA4A-93E8-E7CCA68D947B}"/>
+                </a:ext>
+              </a:extLst>
+            </p:cNvPr>
+            <p:cNvSpPr txBox="1"/>
+            <p:nvPr/>
+          </p:nvSpPr>
+          <p:spPr>
+            <a:xfrm>
+              <a:off x="9971179" y="3470529"/>
+              <a:ext cx="739729" cy="517065"/>
+            </a:xfrm>
+            <a:prstGeom prst="rect">
+              <a:avLst/>
+            </a:prstGeom>
+            <a:noFill/>
+          </p:spPr>
+          <p:txBody>
+            <a:bodyPr wrap="square" lIns="182880" tIns="146304" rIns="182880" bIns="146304" rtlCol="0">
+              <a:spAutoFit/>
+            </a:bodyPr>
+            <a:lstStyle/>
+            <a:p>
+              <a:pPr algn="ctr">
+                <a:lnSpc>
+                  <a:spcPct val="90000"/>
+                </a:lnSpc>
+                <a:spcAft>
+                  <a:spcPts val="600"/>
+                </a:spcAft>
+              </a:pPr>
+              <a:r>
+                <a:rPr lang="en-US" sz="800" dirty="0">
+                  <a:solidFill>
+                    <a:schemeClr val="bg1"/>
+                  </a:solidFill>
+                  <a:latin typeface="Arial" panose="020B0604020202020204" pitchFamily="34" charset="0"/>
+                  <a:cs typeface="Arial" panose="020B0604020202020204" pitchFamily="34" charset="0"/>
+                </a:rPr>
+                <a:t>App Service</a:t>
+              </a:r>
+            </a:p>
+          </p:txBody>
+        </p:sp>
+        <p:pic>
+          <p:nvPicPr>
+            <p:cNvPr id="149" name="Picture 148">
+              <a:extLst>
+                <a:ext uri="{FF2B5EF4-FFF2-40B4-BE49-F238E27FC236}">
+                  <a16:creationId xmlns:a16="http://schemas.microsoft.com/office/drawing/2014/main" id="{7092B6CE-B30F-D946-8CB9-21195B2A938E}"/>
+                </a:ext>
+              </a:extLst>
+            </p:cNvPr>
+            <p:cNvPicPr>
+              <a:picLocks noChangeAspect="1"/>
+            </p:cNvPicPr>
+            <p:nvPr/>
+          </p:nvPicPr>
+          <p:blipFill>
+            <a:blip r:embed="rId6" cstate="print">
+              <a:extLst>
+                <a:ext uri="{28A0092B-C50C-407E-A947-70E740481C1C}">
+                  <a14:useLocalDpi xmlns:a14="http://schemas.microsoft.com/office/drawing/2010/main" val="0"/>
+                </a:ext>
+              </a:extLst>
+            </a:blip>
+            <a:stretch>
+              <a:fillRect/>
+            </a:stretch>
+          </p:blipFill>
+          <p:spPr>
+            <a:xfrm>
+              <a:off x="10251882" y="3400082"/>
+              <a:ext cx="193592" cy="193592"/>
+            </a:xfrm>
+            <a:prstGeom prst="rect">
+              <a:avLst/>
+            </a:prstGeom>
+          </p:spPr>
+        </p:pic>
+        <p:pic>
+          <p:nvPicPr>
+            <p:cNvPr id="150" name="Graphic 149">
+              <a:extLst>
+                <a:ext uri="{FF2B5EF4-FFF2-40B4-BE49-F238E27FC236}">
+                  <a16:creationId xmlns:a16="http://schemas.microsoft.com/office/drawing/2014/main" id="{905B2035-5D37-FD4D-BDF3-83D98664314A}"/>
+                </a:ext>
+              </a:extLst>
+            </p:cNvPr>
+            <p:cNvPicPr>
+              <a:picLocks noChangeAspect="1"/>
+            </p:cNvPicPr>
+            <p:nvPr/>
+          </p:nvPicPr>
+          <p:blipFill>
+            <a:blip r:embed="rId8" cstate="print">
+              <a:extLst>
+                <a:ext uri="{28A0092B-C50C-407E-A947-70E740481C1C}">
+                  <a14:useLocalDpi xmlns:a14="http://schemas.microsoft.com/office/drawing/2010/main" val="0"/>
+                </a:ext>
+                <a:ext uri="{96DAC541-7B7A-43D3-8B79-37D633B846F1}">
+                  <asvg:svgBlip xmlns:asvg="http://schemas.microsoft.com/office/drawing/2016/SVG/main" r:embed="rId9"/>
+                </a:ext>
+              </a:extLst>
+            </a:blip>
+            <a:stretch>
+              <a:fillRect/>
+            </a:stretch>
+          </p:blipFill>
+          <p:spPr>
+            <a:xfrm>
+              <a:off x="10790321" y="3410680"/>
+              <a:ext cx="131621" cy="177866"/>
+            </a:xfrm>
+            <a:prstGeom prst="rect">
+              <a:avLst/>
+            </a:prstGeom>
+          </p:spPr>
+        </p:pic>
+        <p:pic>
+          <p:nvPicPr>
+            <p:cNvPr id="48" name="Picture 47">
+              <a:extLst>
+                <a:ext uri="{FF2B5EF4-FFF2-40B4-BE49-F238E27FC236}">
+                  <a16:creationId xmlns:a16="http://schemas.microsoft.com/office/drawing/2014/main" id="{A6F2AD7D-41E6-4AA4-9E4F-F10307A8CF87}"/>
+                </a:ext>
+              </a:extLst>
+            </p:cNvPr>
+            <p:cNvPicPr>
+              <a:picLocks noChangeAspect="1"/>
+            </p:cNvPicPr>
+            <p:nvPr/>
+          </p:nvPicPr>
+          <p:blipFill rotWithShape="1">
+            <a:blip r:embed="rId10"/>
+            <a:srcRect l="3302" t="6466" r="5732" b="6346"/>
+            <a:stretch/>
+          </p:blipFill>
+          <p:spPr>
+            <a:xfrm>
+              <a:off x="8786711" y="2875298"/>
+              <a:ext cx="191958" cy="190661"/>
+            </a:xfrm>
+            <a:prstGeom prst="rect">
+              <a:avLst/>
+            </a:prstGeom>
+          </p:spPr>
+        </p:pic>
+        <p:pic>
+          <p:nvPicPr>
+            <p:cNvPr id="49" name="Picture 48">
+              <a:extLst>
+                <a:ext uri="{FF2B5EF4-FFF2-40B4-BE49-F238E27FC236}">
+                  <a16:creationId xmlns:a16="http://schemas.microsoft.com/office/drawing/2014/main" id="{4BD78F7D-9809-4AAF-839B-23FD97DE071C}"/>
+                </a:ext>
+              </a:extLst>
+            </p:cNvPr>
+            <p:cNvPicPr>
+              <a:picLocks noChangeAspect="1"/>
+            </p:cNvPicPr>
+            <p:nvPr/>
+          </p:nvPicPr>
+          <p:blipFill rotWithShape="1">
+            <a:blip r:embed="rId11"/>
+            <a:srcRect l="8063" t="5692" r="7576" b="4929"/>
+            <a:stretch/>
+          </p:blipFill>
+          <p:spPr>
+            <a:xfrm>
+              <a:off x="9350740" y="2887663"/>
+              <a:ext cx="131524" cy="177866"/>
+            </a:xfrm>
+            <a:prstGeom prst="rect">
+              <a:avLst/>
+            </a:prstGeom>
+          </p:spPr>
+        </p:pic>
+        <p:pic>
+          <p:nvPicPr>
+            <p:cNvPr id="52" name="Picture 51">
+              <a:extLst>
+                <a:ext uri="{FF2B5EF4-FFF2-40B4-BE49-F238E27FC236}">
+                  <a16:creationId xmlns:a16="http://schemas.microsoft.com/office/drawing/2014/main" id="{790AB284-ADDC-4395-8C49-DFE732D1A9B0}"/>
+                </a:ext>
+              </a:extLst>
+            </p:cNvPr>
+            <p:cNvPicPr>
+              <a:picLocks noChangeAspect="1"/>
+            </p:cNvPicPr>
+            <p:nvPr/>
+          </p:nvPicPr>
+          <p:blipFill rotWithShape="1">
+            <a:blip r:embed="rId10"/>
+            <a:srcRect l="3302" t="6466" r="5732" b="6346"/>
+            <a:stretch/>
+          </p:blipFill>
+          <p:spPr>
+            <a:xfrm>
+              <a:off x="8821198" y="3956686"/>
+              <a:ext cx="191958" cy="190661"/>
+            </a:xfrm>
+            <a:prstGeom prst="rect">
+              <a:avLst/>
+            </a:prstGeom>
+          </p:spPr>
+        </p:pic>
+        <p:pic>
+          <p:nvPicPr>
+            <p:cNvPr id="53" name="Picture 52">
+              <a:extLst>
+                <a:ext uri="{FF2B5EF4-FFF2-40B4-BE49-F238E27FC236}">
+                  <a16:creationId xmlns:a16="http://schemas.microsoft.com/office/drawing/2014/main" id="{6F61E858-D378-4ADB-B73F-7002CA4114B6}"/>
+                </a:ext>
+              </a:extLst>
+            </p:cNvPr>
+            <p:cNvPicPr>
+              <a:picLocks noChangeAspect="1"/>
+            </p:cNvPicPr>
+            <p:nvPr/>
+          </p:nvPicPr>
+          <p:blipFill rotWithShape="1">
+            <a:blip r:embed="rId11"/>
+            <a:srcRect l="8063" t="5692" r="7576" b="4929"/>
+            <a:stretch/>
+          </p:blipFill>
+          <p:spPr>
+            <a:xfrm>
+              <a:off x="9365330" y="3956979"/>
+              <a:ext cx="131524" cy="177866"/>
+            </a:xfrm>
+            <a:prstGeom prst="rect">
+              <a:avLst/>
+            </a:prstGeom>
+          </p:spPr>
+        </p:pic>
+        <p:pic>
+          <p:nvPicPr>
+            <p:cNvPr id="54" name="Picture 53">
+              <a:extLst>
+                <a:ext uri="{FF2B5EF4-FFF2-40B4-BE49-F238E27FC236}">
+                  <a16:creationId xmlns:a16="http://schemas.microsoft.com/office/drawing/2014/main" id="{F22B5599-72D3-4BB3-9F6F-DDA77B3DB932}"/>
+                </a:ext>
+              </a:extLst>
+            </p:cNvPr>
+            <p:cNvPicPr>
+              <a:picLocks noChangeAspect="1"/>
+            </p:cNvPicPr>
+            <p:nvPr/>
+          </p:nvPicPr>
+          <p:blipFill rotWithShape="1">
+            <a:blip r:embed="rId10"/>
+            <a:srcRect l="3302" t="6466" r="5732" b="6346"/>
+            <a:stretch/>
+          </p:blipFill>
+          <p:spPr>
+            <a:xfrm>
+              <a:off x="10254430" y="3401547"/>
+              <a:ext cx="191958" cy="190661"/>
+            </a:xfrm>
+            <a:prstGeom prst="rect">
+              <a:avLst/>
+            </a:prstGeom>
+          </p:spPr>
+        </p:pic>
+        <p:pic>
+          <p:nvPicPr>
+            <p:cNvPr id="55" name="Picture 54">
+              <a:extLst>
+                <a:ext uri="{FF2B5EF4-FFF2-40B4-BE49-F238E27FC236}">
+                  <a16:creationId xmlns:a16="http://schemas.microsoft.com/office/drawing/2014/main" id="{8CBA2556-4EC4-4D18-AB5A-2B7B4622FF86}"/>
+                </a:ext>
+              </a:extLst>
+            </p:cNvPr>
+            <p:cNvPicPr>
+              <a:picLocks noChangeAspect="1"/>
+            </p:cNvPicPr>
+            <p:nvPr/>
+          </p:nvPicPr>
+          <p:blipFill rotWithShape="1">
+            <a:blip r:embed="rId11"/>
+            <a:srcRect l="8063" t="5692" r="7576" b="4929"/>
+            <a:stretch/>
+          </p:blipFill>
+          <p:spPr>
+            <a:xfrm>
+              <a:off x="10791081" y="3411868"/>
+              <a:ext cx="131524" cy="177866"/>
+            </a:xfrm>
+            <a:prstGeom prst="rect">
+              <a:avLst/>
+            </a:prstGeom>
+          </p:spPr>
+        </p:pic>
+        <p:pic>
+          <p:nvPicPr>
+            <p:cNvPr id="1026" name="Picture 2" descr="See the source image">
+              <a:extLst>
+                <a:ext uri="{FF2B5EF4-FFF2-40B4-BE49-F238E27FC236}">
+                  <a16:creationId xmlns:a16="http://schemas.microsoft.com/office/drawing/2014/main" id="{3F43361F-CBBE-4CFD-BF1A-EF55A3BF6BB0}"/>
+                </a:ext>
+              </a:extLst>
+            </p:cNvPr>
+            <p:cNvPicPr>
+              <a:picLocks noChangeAspect="1" noChangeArrowheads="1"/>
+            </p:cNvPicPr>
+            <p:nvPr/>
+          </p:nvPicPr>
+          <p:blipFill>
+            <a:blip r:embed="rId12" cstate="print">
+              <a:extLst>
+                <a:ext uri="{28A0092B-C50C-407E-A947-70E740481C1C}">
+                  <a14:useLocalDpi xmlns:a14="http://schemas.microsoft.com/office/drawing/2010/main" val="0"/>
+                </a:ext>
+              </a:extLst>
+            </a:blip>
+            <a:srcRect/>
+            <a:stretch>
+              <a:fillRect/>
+            </a:stretch>
+          </p:blipFill>
+          <p:spPr bwMode="auto">
+            <a:xfrm>
+              <a:off x="9291041" y="2015732"/>
+              <a:ext cx="1292270" cy="373547"/>
+            </a:xfrm>
+            <a:prstGeom prst="rect">
+              <a:avLst/>
+            </a:prstGeom>
+            <a:solidFill>
+              <a:schemeClr val="tx1"/>
+            </a:solidFill>
+          </p:spPr>
+        </p:pic>
       </p:grpSp>
-      <p:pic>
-        <p:nvPicPr>
-          <p:cNvPr id="142" name="Graphic 141">
-            <a:extLst>
-              <a:ext uri="{FF2B5EF4-FFF2-40B4-BE49-F238E27FC236}">
-                <a16:creationId xmlns:a16="http://schemas.microsoft.com/office/drawing/2014/main" id="{26DBC607-57B7-144F-AA32-C301DEF1C98B}"/>
-              </a:ext>
-            </a:extLst>
-          </p:cNvPr>
-          <p:cNvPicPr>
-            <a:picLocks noChangeAspect="1"/>
-          </p:cNvPicPr>
-          <p:nvPr/>
-        </p:nvPicPr>
-        <p:blipFill>
-          <a:blip r:embed="rId8">
-            <a:extLst>
-              <a:ext uri="{28A0092B-C50C-407E-A947-70E740481C1C}">
-                <a14:useLocalDpi xmlns:a14="http://schemas.microsoft.com/office/drawing/2010/main" val="0"/>
-              </a:ext>
-              <a:ext uri="{96DAC541-7B7A-43D3-8B79-37D633B846F1}">
-                <asvg:svgBlip xmlns:asvg="http://schemas.microsoft.com/office/drawing/2016/SVG/main" r:embed="rId9"/>
-              </a:ext>
-            </a:extLst>
-          </a:blip>
-          <a:stretch>
-            <a:fillRect/>
-          </a:stretch>
-        </p:blipFill>
-        <p:spPr>
-          <a:xfrm>
-            <a:off x="9350740" y="2887663"/>
-            <a:ext cx="131621" cy="177866"/>
-          </a:xfrm>
-          <a:prstGeom prst="rect">
-            <a:avLst/>
-          </a:prstGeom>
-        </p:spPr>
-      </p:pic>
-      <p:sp>
-        <p:nvSpPr>
-          <p:cNvPr id="143" name="TextBox 142">
-            <a:extLst>
-              <a:ext uri="{FF2B5EF4-FFF2-40B4-BE49-F238E27FC236}">
-                <a16:creationId xmlns:a16="http://schemas.microsoft.com/office/drawing/2014/main" id="{36865193-B50F-8847-9878-5B44BFBB44CE}"/>
-              </a:ext>
-            </a:extLst>
-          </p:cNvPr>
-          <p:cNvSpPr txBox="1"/>
-          <p:nvPr/>
-        </p:nvSpPr>
-        <p:spPr>
-          <a:xfrm>
-            <a:off x="8931273" y="4012959"/>
-            <a:ext cx="966298" cy="517065"/>
-          </a:xfrm>
-          <a:prstGeom prst="rect">
-            <a:avLst/>
-          </a:prstGeom>
-          <a:noFill/>
-        </p:spPr>
-        <p:txBody>
-          <a:bodyPr wrap="square" lIns="182880" tIns="146304" rIns="182880" bIns="146304" rtlCol="0">
-            <a:spAutoFit/>
-          </a:bodyPr>
-          <a:lstStyle/>
-          <a:p>
-            <a:pPr algn="ctr">
-              <a:lnSpc>
-                <a:spcPct val="90000"/>
-              </a:lnSpc>
-              <a:spcAft>
-                <a:spcPts val="600"/>
-              </a:spcAft>
-            </a:pPr>
-            <a:r>
-              <a:rPr lang="en-US" sz="800" dirty="0">
-                <a:solidFill>
-                  <a:schemeClr val="bg1"/>
-                </a:solidFill>
-                <a:latin typeface="Arial" panose="020B0604020202020204" pitchFamily="34" charset="0"/>
-                <a:cs typeface="Arial" panose="020B0604020202020204" pitchFamily="34" charset="0"/>
-              </a:rPr>
-              <a:t>Azure PostgreSQL</a:t>
-            </a:r>
-          </a:p>
-        </p:txBody>
-      </p:sp>
-      <p:sp>
-        <p:nvSpPr>
-          <p:cNvPr id="144" name="TextBox 143">
-            <a:extLst>
-              <a:ext uri="{FF2B5EF4-FFF2-40B4-BE49-F238E27FC236}">
-                <a16:creationId xmlns:a16="http://schemas.microsoft.com/office/drawing/2014/main" id="{F46E0045-A5E1-6B41-8826-A38C67B47DAE}"/>
-              </a:ext>
-            </a:extLst>
-          </p:cNvPr>
-          <p:cNvSpPr txBox="1"/>
-          <p:nvPr/>
-        </p:nvSpPr>
-        <p:spPr>
-          <a:xfrm>
-            <a:off x="8529682" y="4025488"/>
-            <a:ext cx="739729" cy="517065"/>
-          </a:xfrm>
-          <a:prstGeom prst="rect">
-            <a:avLst/>
-          </a:prstGeom>
-          <a:noFill/>
-        </p:spPr>
-        <p:txBody>
-          <a:bodyPr wrap="square" lIns="182880" tIns="146304" rIns="182880" bIns="146304" rtlCol="0">
-            <a:spAutoFit/>
-          </a:bodyPr>
-          <a:lstStyle/>
-          <a:p>
-            <a:pPr algn="ctr">
-              <a:lnSpc>
-                <a:spcPct val="90000"/>
-              </a:lnSpc>
-              <a:spcAft>
-                <a:spcPts val="600"/>
-              </a:spcAft>
-            </a:pPr>
-            <a:r>
-              <a:rPr lang="en-US" sz="800" dirty="0">
-                <a:solidFill>
-                  <a:schemeClr val="bg1"/>
-                </a:solidFill>
-                <a:latin typeface="Arial" panose="020B0604020202020204" pitchFamily="34" charset="0"/>
-                <a:cs typeface="Arial" panose="020B0604020202020204" pitchFamily="34" charset="0"/>
-              </a:rPr>
-              <a:t>App Service</a:t>
-            </a:r>
-          </a:p>
-        </p:txBody>
-      </p:sp>
-      <p:pic>
-        <p:nvPicPr>
-          <p:cNvPr id="145" name="Picture 144">
-            <a:extLst>
-              <a:ext uri="{FF2B5EF4-FFF2-40B4-BE49-F238E27FC236}">
-                <a16:creationId xmlns:a16="http://schemas.microsoft.com/office/drawing/2014/main" id="{4B963048-4005-FD42-9651-4D375A555B16}"/>
-              </a:ext>
-            </a:extLst>
-          </p:cNvPr>
-          <p:cNvPicPr>
-            <a:picLocks noChangeAspect="1"/>
-          </p:cNvPicPr>
-          <p:nvPr/>
-        </p:nvPicPr>
-        <p:blipFill>
-          <a:blip r:embed="rId6" cstate="print">
-            <a:extLst>
-              <a:ext uri="{28A0092B-C50C-407E-A947-70E740481C1C}">
-                <a14:useLocalDpi xmlns:a14="http://schemas.microsoft.com/office/drawing/2010/main" val="0"/>
-              </a:ext>
-            </a:extLst>
-          </a:blip>
-          <a:stretch>
-            <a:fillRect/>
-          </a:stretch>
-        </p:blipFill>
-        <p:spPr>
-          <a:xfrm>
-            <a:off x="8821295" y="3956979"/>
-            <a:ext cx="193592" cy="193592"/>
-          </a:xfrm>
-          <a:prstGeom prst="rect">
-            <a:avLst/>
-          </a:prstGeom>
-        </p:spPr>
-      </p:pic>
-      <p:pic>
-        <p:nvPicPr>
-          <p:cNvPr id="146" name="Graphic 145">
-            <a:extLst>
-              <a:ext uri="{FF2B5EF4-FFF2-40B4-BE49-F238E27FC236}">
-                <a16:creationId xmlns:a16="http://schemas.microsoft.com/office/drawing/2014/main" id="{A29A7840-1936-A445-A6F5-CFBFF1C93CAD}"/>
-              </a:ext>
-            </a:extLst>
-          </p:cNvPr>
-          <p:cNvPicPr>
-            <a:picLocks noChangeAspect="1"/>
-          </p:cNvPicPr>
-          <p:nvPr/>
-        </p:nvPicPr>
-        <p:blipFill>
-          <a:blip r:embed="rId8">
-            <a:extLst>
-              <a:ext uri="{28A0092B-C50C-407E-A947-70E740481C1C}">
-                <a14:useLocalDpi xmlns:a14="http://schemas.microsoft.com/office/drawing/2010/main" val="0"/>
-              </a:ext>
-              <a:ext uri="{96DAC541-7B7A-43D3-8B79-37D633B846F1}">
-                <asvg:svgBlip xmlns:asvg="http://schemas.microsoft.com/office/drawing/2016/SVG/main" r:embed="rId9"/>
-              </a:ext>
-            </a:extLst>
-          </a:blip>
-          <a:stretch>
-            <a:fillRect/>
-          </a:stretch>
-        </p:blipFill>
-        <p:spPr>
-          <a:xfrm>
-            <a:off x="9365330" y="3949315"/>
-            <a:ext cx="131621" cy="177866"/>
-          </a:xfrm>
-          <a:prstGeom prst="rect">
-            <a:avLst/>
-          </a:prstGeom>
-        </p:spPr>
-      </p:pic>
-      <p:sp>
-        <p:nvSpPr>
-          <p:cNvPr id="147" name="TextBox 146">
-            <a:extLst>
-              <a:ext uri="{FF2B5EF4-FFF2-40B4-BE49-F238E27FC236}">
-                <a16:creationId xmlns:a16="http://schemas.microsoft.com/office/drawing/2014/main" id="{3112BBED-1814-E44E-AFBA-379210019284}"/>
-              </a:ext>
-            </a:extLst>
-          </p:cNvPr>
-          <p:cNvSpPr txBox="1"/>
-          <p:nvPr/>
-        </p:nvSpPr>
-        <p:spPr>
-          <a:xfrm>
-            <a:off x="10324867" y="3464056"/>
-            <a:ext cx="1049333" cy="517065"/>
-          </a:xfrm>
-          <a:prstGeom prst="rect">
-            <a:avLst/>
-          </a:prstGeom>
-          <a:noFill/>
-        </p:spPr>
-        <p:txBody>
-          <a:bodyPr wrap="square" lIns="182880" tIns="146304" rIns="182880" bIns="146304" rtlCol="0">
-            <a:spAutoFit/>
-          </a:bodyPr>
-          <a:lstStyle/>
-          <a:p>
-            <a:pPr algn="ctr">
-              <a:lnSpc>
-                <a:spcPct val="90000"/>
-              </a:lnSpc>
-              <a:spcAft>
-                <a:spcPts val="600"/>
-              </a:spcAft>
-            </a:pPr>
-            <a:r>
-              <a:rPr lang="en-US" sz="800" dirty="0">
-                <a:solidFill>
-                  <a:schemeClr val="bg1"/>
-                </a:solidFill>
-                <a:latin typeface="Arial" panose="020B0604020202020204" pitchFamily="34" charset="0"/>
-                <a:cs typeface="Arial" panose="020B0604020202020204" pitchFamily="34" charset="0"/>
-              </a:rPr>
-              <a:t>Azure PostgreSQL</a:t>
-            </a:r>
-          </a:p>
-        </p:txBody>
-      </p:sp>
-      <p:sp>
-        <p:nvSpPr>
-          <p:cNvPr id="148" name="TextBox 147">
-            <a:extLst>
-              <a:ext uri="{FF2B5EF4-FFF2-40B4-BE49-F238E27FC236}">
-                <a16:creationId xmlns:a16="http://schemas.microsoft.com/office/drawing/2014/main" id="{7CEA8FCB-32F3-EA4A-93E8-E7CCA68D947B}"/>
-              </a:ext>
-            </a:extLst>
-          </p:cNvPr>
-          <p:cNvSpPr txBox="1"/>
-          <p:nvPr/>
-        </p:nvSpPr>
-        <p:spPr>
-          <a:xfrm>
-            <a:off x="9971179" y="3470529"/>
-            <a:ext cx="739729" cy="517065"/>
-          </a:xfrm>
-          <a:prstGeom prst="rect">
-            <a:avLst/>
-          </a:prstGeom>
-          <a:noFill/>
-        </p:spPr>
-        <p:txBody>
-          <a:bodyPr wrap="square" lIns="182880" tIns="146304" rIns="182880" bIns="146304" rtlCol="0">
-            <a:spAutoFit/>
-          </a:bodyPr>
-          <a:lstStyle/>
-          <a:p>
-            <a:pPr algn="ctr">
-              <a:lnSpc>
-                <a:spcPct val="90000"/>
-              </a:lnSpc>
-              <a:spcAft>
-                <a:spcPts val="600"/>
-              </a:spcAft>
-            </a:pPr>
-            <a:r>
-              <a:rPr lang="en-US" sz="800" dirty="0">
-                <a:solidFill>
-                  <a:schemeClr val="bg1"/>
-                </a:solidFill>
-                <a:latin typeface="Arial" panose="020B0604020202020204" pitchFamily="34" charset="0"/>
-                <a:cs typeface="Arial" panose="020B0604020202020204" pitchFamily="34" charset="0"/>
-              </a:rPr>
-              <a:t>App Service</a:t>
-            </a:r>
-          </a:p>
-        </p:txBody>
-      </p:sp>
-      <p:pic>
-        <p:nvPicPr>
-          <p:cNvPr id="149" name="Picture 148">
-            <a:extLst>
-              <a:ext uri="{FF2B5EF4-FFF2-40B4-BE49-F238E27FC236}">
-                <a16:creationId xmlns:a16="http://schemas.microsoft.com/office/drawing/2014/main" id="{7092B6CE-B30F-D946-8CB9-21195B2A938E}"/>
-              </a:ext>
-            </a:extLst>
-          </p:cNvPr>
-          <p:cNvPicPr>
-            <a:picLocks noChangeAspect="1"/>
-          </p:cNvPicPr>
-          <p:nvPr/>
-        </p:nvPicPr>
-        <p:blipFill>
-          <a:blip r:embed="rId6" cstate="print">
-            <a:extLst>
-              <a:ext uri="{28A0092B-C50C-407E-A947-70E740481C1C}">
-                <a14:useLocalDpi xmlns:a14="http://schemas.microsoft.com/office/drawing/2010/main" val="0"/>
-              </a:ext>
-            </a:extLst>
-          </a:blip>
-          <a:stretch>
-            <a:fillRect/>
-          </a:stretch>
-        </p:blipFill>
-        <p:spPr>
-          <a:xfrm>
-            <a:off x="10251882" y="3400082"/>
-            <a:ext cx="193592" cy="193592"/>
-          </a:xfrm>
-          <a:prstGeom prst="rect">
-            <a:avLst/>
-          </a:prstGeom>
-        </p:spPr>
-      </p:pic>
-      <p:pic>
-        <p:nvPicPr>
-          <p:cNvPr id="150" name="Graphic 149">
-            <a:extLst>
-              <a:ext uri="{FF2B5EF4-FFF2-40B4-BE49-F238E27FC236}">
-                <a16:creationId xmlns:a16="http://schemas.microsoft.com/office/drawing/2014/main" id="{905B2035-5D37-FD4D-BDF3-83D98664314A}"/>
-              </a:ext>
-            </a:extLst>
-          </p:cNvPr>
-          <p:cNvPicPr>
-            <a:picLocks noChangeAspect="1"/>
-          </p:cNvPicPr>
-          <p:nvPr/>
-        </p:nvPicPr>
-        <p:blipFill>
-          <a:blip r:embed="rId8">
-            <a:extLst>
-              <a:ext uri="{28A0092B-C50C-407E-A947-70E740481C1C}">
-                <a14:useLocalDpi xmlns:a14="http://schemas.microsoft.com/office/drawing/2010/main" val="0"/>
-              </a:ext>
-              <a:ext uri="{96DAC541-7B7A-43D3-8B79-37D633B846F1}">
-                <asvg:svgBlip xmlns:asvg="http://schemas.microsoft.com/office/drawing/2016/SVG/main" r:embed="rId9"/>
-              </a:ext>
-            </a:extLst>
-          </a:blip>
-          <a:stretch>
-            <a:fillRect/>
-          </a:stretch>
-        </p:blipFill>
-        <p:spPr>
-          <a:xfrm>
-            <a:off x="10790321" y="3410680"/>
-            <a:ext cx="131621" cy="177866"/>
-          </a:xfrm>
-          <a:prstGeom prst="rect">
-            <a:avLst/>
-          </a:prstGeom>
-        </p:spPr>
-      </p:pic>
     </p:spTree>
     <p:extLst>
       <p:ext uri="{BB962C8B-B14F-4D97-AF65-F5344CB8AC3E}">
@@ -23133,7 +23323,7 @@
           <a:p>
             <a:r>
               <a:rPr lang="en-US" sz="3200" dirty="0"/>
-              <a:t>Setup approval steps as quality gates to control the flow of each release .</a:t>
+              <a:t>Setup approval steps as quality gates to control the flow of each release.</a:t>
             </a:r>
           </a:p>
         </p:txBody>

</xml_diff>

<commit_message>
Updated icons and the application insights install
</commit_message>
<xml_diff>
--- a/Whiteboard design session/WDS trainer presentation - Continuous delivery in Azure DevOps.pptx
+++ b/Whiteboard design session/WDS trainer presentation - Continuous delivery in Azure DevOps.pptx
@@ -3237,7 +3237,7 @@
                   <a:prstClr val="black"/>
                 </a:solidFill>
               </a:rPr>
-              <a:t>12/6/2019 1:20 AM</a:t>
+              <a:t>12/6/2019 2:20 AM</a:t>
             </a:fld>
             <a:endParaRPr lang="en-US" dirty="0">
               <a:solidFill>
@@ -16058,7 +16058,7 @@
           <p:cNvPr id="3" name="Group 2">
             <a:extLst>
               <a:ext uri="{FF2B5EF4-FFF2-40B4-BE49-F238E27FC236}">
-                <a16:creationId xmlns:a16="http://schemas.microsoft.com/office/drawing/2014/main" id="{8C99E4B3-CA1D-4B4E-B526-E6E8E985D963}"/>
+                <a16:creationId xmlns:a16="http://schemas.microsoft.com/office/drawing/2014/main" id="{A964E156-46A3-4EE9-9A62-3CE6D8EA7823}"/>
               </a:ext>
             </a:extLst>
           </p:cNvPr>
@@ -16180,42 +16180,6 @@
               </a:p>
             </p:txBody>
           </p:sp>
-          <p:pic>
-            <p:nvPicPr>
-              <p:cNvPr id="5" name="Picture 4">
-                <a:extLst>
-                  <a:ext uri="{FF2B5EF4-FFF2-40B4-BE49-F238E27FC236}">
-                    <a16:creationId xmlns:a16="http://schemas.microsoft.com/office/drawing/2014/main" id="{99C9F7AE-362B-4DD4-9004-223EA1DDD41E}"/>
-                  </a:ext>
-                </a:extLst>
-              </p:cNvPr>
-              <p:cNvPicPr>
-                <a:picLocks noChangeAspect="1"/>
-              </p:cNvPicPr>
-              <p:nvPr/>
-            </p:nvPicPr>
-            <p:blipFill>
-              <a:blip r:embed="rId3" cstate="print">
-                <a:extLst>
-                  <a:ext uri="{28A0092B-C50C-407E-A947-70E740481C1C}">
-                    <a14:useLocalDpi xmlns:a14="http://schemas.microsoft.com/office/drawing/2010/main" val="0"/>
-                  </a:ext>
-                </a:extLst>
-              </a:blip>
-              <a:stretch>
-                <a:fillRect/>
-              </a:stretch>
-            </p:blipFill>
-            <p:spPr>
-              <a:xfrm>
-                <a:off x="10666811" y="2592643"/>
-                <a:ext cx="412994" cy="412994"/>
-              </a:xfrm>
-              <a:prstGeom prst="rect">
-                <a:avLst/>
-              </a:prstGeom>
-            </p:spPr>
-          </p:pic>
           <p:sp>
             <p:nvSpPr>
               <p:cNvPr id="12" name="TextBox 11">
@@ -16496,7 +16460,7 @@
                 <p:nvPr/>
               </p:nvPicPr>
               <p:blipFill>
-                <a:blip r:embed="rId4" cstate="print">
+                <a:blip r:embed="rId3" cstate="print">
                   <a:extLst>
                     <a:ext uri="{28A0092B-C50C-407E-A947-70E740481C1C}">
                       <a14:useLocalDpi xmlns:a14="http://schemas.microsoft.com/office/drawing/2010/main" val="0"/>
@@ -16618,7 +16582,7 @@
                 <p:nvPr/>
               </p:nvPicPr>
               <p:blipFill>
-                <a:blip r:embed="rId5" cstate="print">
+                <a:blip r:embed="rId4" cstate="print">
                   <a:extLst>
                     <a:ext uri="{28A0092B-C50C-407E-A947-70E740481C1C}">
                       <a14:useLocalDpi xmlns:a14="http://schemas.microsoft.com/office/drawing/2010/main" val="0"/>
@@ -16912,7 +16876,7 @@
                       <p:nvPr/>
                     </p:nvPicPr>
                     <p:blipFill>
-                      <a:blip r:embed="rId6" cstate="print">
+                      <a:blip r:embed="rId5" cstate="print">
                         <a:extLst>
                           <a:ext uri="{28A0092B-C50C-407E-A947-70E740481C1C}">
                             <a14:useLocalDpi xmlns:a14="http://schemas.microsoft.com/office/drawing/2010/main" val="0"/>
@@ -17558,10 +17522,48 @@
         </p:grpSp>
         <p:pic>
           <p:nvPicPr>
-            <p:cNvPr id="38" name="Picture 37">
+            <p:cNvPr id="7" name="Picture 6" descr="A picture containing airplane, fence&#10;&#10;Description automatically generated">
               <a:extLst>
                 <a:ext uri="{FF2B5EF4-FFF2-40B4-BE49-F238E27FC236}">
-                  <a16:creationId xmlns:a16="http://schemas.microsoft.com/office/drawing/2014/main" id="{C6DA6E5A-6E33-C541-BA30-EE98EB86F5A4}"/>
+                  <a16:creationId xmlns:a16="http://schemas.microsoft.com/office/drawing/2014/main" id="{EF96E283-23B7-49D8-910E-60A2283F3CF3}"/>
+                </a:ext>
+              </a:extLst>
+            </p:cNvPr>
+            <p:cNvPicPr>
+              <a:picLocks noChangeAspect="1"/>
+            </p:cNvPicPr>
+            <p:nvPr/>
+          </p:nvPicPr>
+          <p:blipFill rotWithShape="1">
+            <a:blip r:embed="rId6" cstate="print">
+              <a:extLst>
+                <a:ext uri="{28A0092B-C50C-407E-A947-70E740481C1C}">
+                  <a14:useLocalDpi xmlns:a14="http://schemas.microsoft.com/office/drawing/2010/main" val="0"/>
+                </a:ext>
+              </a:extLst>
+            </a:blip>
+            <a:srcRect t="17195" r="18366"/>
+            <a:stretch/>
+          </p:blipFill>
+          <p:spPr>
+            <a:xfrm>
+              <a:off x="7076341" y="3966401"/>
+              <a:ext cx="1262013" cy="1000085"/>
+            </a:xfrm>
+            <a:prstGeom prst="rect">
+              <a:avLst/>
+            </a:prstGeom>
+            <a:solidFill>
+              <a:schemeClr val="tx1"/>
+            </a:solidFill>
+          </p:spPr>
+        </p:pic>
+        <p:pic>
+          <p:nvPicPr>
+            <p:cNvPr id="43" name="Graphic 42">
+              <a:extLst>
+                <a:ext uri="{FF2B5EF4-FFF2-40B4-BE49-F238E27FC236}">
+                  <a16:creationId xmlns:a16="http://schemas.microsoft.com/office/drawing/2014/main" id="{AA557610-2944-4A67-B221-C448F2738E8B}"/>
                 </a:ext>
               </a:extLst>
             </p:cNvPr>
@@ -17571,15 +17573,84 @@
             <p:nvPr/>
           </p:nvPicPr>
           <p:blipFill>
-            <a:blip r:embed="rId7"/>
+            <a:blip r:embed="rId7">
+              <a:extLst>
+                <a:ext uri="{28A0092B-C50C-407E-A947-70E740481C1C}">
+                  <a14:useLocalDpi xmlns:a14="http://schemas.microsoft.com/office/drawing/2010/main" val="0"/>
+                </a:ext>
+                <a:ext uri="{96DAC541-7B7A-43D3-8B79-37D633B846F1}">
+                  <asvg:svgBlip xmlns:asvg="http://schemas.microsoft.com/office/drawing/2016/SVG/main" r:embed="rId8"/>
+                </a:ext>
+              </a:extLst>
+            </a:blip>
             <a:stretch>
               <a:fillRect/>
             </a:stretch>
           </p:blipFill>
           <p:spPr>
             <a:xfrm>
-              <a:off x="1247806" y="3702759"/>
-              <a:ext cx="615218" cy="615218"/>
+              <a:off x="1234168" y="3675594"/>
+              <a:ext cx="662009" cy="662009"/>
+            </a:xfrm>
+            <a:prstGeom prst="rect">
+              <a:avLst/>
+            </a:prstGeom>
+          </p:spPr>
+        </p:pic>
+        <p:pic>
+          <p:nvPicPr>
+            <p:cNvPr id="44" name="Picture 43">
+              <a:extLst>
+                <a:ext uri="{FF2B5EF4-FFF2-40B4-BE49-F238E27FC236}">
+                  <a16:creationId xmlns:a16="http://schemas.microsoft.com/office/drawing/2014/main" id="{EFB52FA1-17AB-42BD-B76D-31330FABB4C0}"/>
+                </a:ext>
+              </a:extLst>
+            </p:cNvPr>
+            <p:cNvPicPr>
+              <a:picLocks noChangeAspect="1"/>
+            </p:cNvPicPr>
+            <p:nvPr/>
+          </p:nvPicPr>
+          <p:blipFill>
+            <a:blip r:embed="rId9"/>
+            <a:stretch>
+              <a:fillRect/>
+            </a:stretch>
+          </p:blipFill>
+          <p:spPr>
+            <a:xfrm>
+              <a:off x="10417681" y="2459667"/>
+              <a:ext cx="490204" cy="508000"/>
+            </a:xfrm>
+            <a:prstGeom prst="rect">
+              <a:avLst/>
+            </a:prstGeom>
+          </p:spPr>
+        </p:pic>
+        <p:pic>
+          <p:nvPicPr>
+            <p:cNvPr id="45" name="Picture 44">
+              <a:extLst>
+                <a:ext uri="{FF2B5EF4-FFF2-40B4-BE49-F238E27FC236}">
+                  <a16:creationId xmlns:a16="http://schemas.microsoft.com/office/drawing/2014/main" id="{A55D0812-CA7B-4C54-B681-074E1A6F8B31}"/>
+                </a:ext>
+              </a:extLst>
+            </p:cNvPr>
+            <p:cNvPicPr>
+              <a:picLocks noChangeAspect="1"/>
+            </p:cNvPicPr>
+            <p:nvPr/>
+          </p:nvPicPr>
+          <p:blipFill>
+            <a:blip r:embed="rId10"/>
+            <a:stretch>
+              <a:fillRect/>
+            </a:stretch>
+          </p:blipFill>
+          <p:spPr>
+            <a:xfrm>
+              <a:off x="10422330" y="4691187"/>
+              <a:ext cx="482855" cy="616327"/>
             </a:xfrm>
             <a:prstGeom prst="rect">
               <a:avLst/>
@@ -17587,45 +17658,6 @@
           </p:spPr>
         </p:pic>
       </p:grpSp>
-      <p:pic>
-        <p:nvPicPr>
-          <p:cNvPr id="42" name="Graphic 41">
-            <a:extLst>
-              <a:ext uri="{FF2B5EF4-FFF2-40B4-BE49-F238E27FC236}">
-                <a16:creationId xmlns:a16="http://schemas.microsoft.com/office/drawing/2014/main" id="{5AD105B8-7589-5445-9FBB-D4E80C14DC01}"/>
-              </a:ext>
-            </a:extLst>
-          </p:cNvPr>
-          <p:cNvPicPr>
-            <a:picLocks noChangeAspect="1"/>
-          </p:cNvPicPr>
-          <p:nvPr/>
-        </p:nvPicPr>
-        <p:blipFill>
-          <a:blip r:embed="rId8">
-            <a:extLst>
-              <a:ext uri="{28A0092B-C50C-407E-A947-70E740481C1C}">
-                <a14:useLocalDpi xmlns:a14="http://schemas.microsoft.com/office/drawing/2010/main" val="0"/>
-              </a:ext>
-              <a:ext uri="{96DAC541-7B7A-43D3-8B79-37D633B846F1}">
-                <asvg:svgBlip xmlns:asvg="http://schemas.microsoft.com/office/drawing/2016/SVG/main" r:embed="rId9"/>
-              </a:ext>
-            </a:extLst>
-          </a:blip>
-          <a:stretch>
-            <a:fillRect/>
-          </a:stretch>
-        </p:blipFill>
-        <p:spPr>
-          <a:xfrm>
-            <a:off x="10447936" y="4675452"/>
-            <a:ext cx="414427" cy="560036"/>
-          </a:xfrm>
-          <a:prstGeom prst="rect">
-            <a:avLst/>
-          </a:prstGeom>
-        </p:spPr>
-      </p:pic>
     </p:spTree>
     <p:extLst>
       <p:ext uri="{BB962C8B-B14F-4D97-AF65-F5344CB8AC3E}">
@@ -17941,118 +17973,6 @@
       </p:grpSpPr>
       <p:sp>
         <p:nvSpPr>
-          <p:cNvPr id="2" name="Rectangle 1">
-            <a:extLst>
-              <a:ext uri="{FF2B5EF4-FFF2-40B4-BE49-F238E27FC236}">
-                <a16:creationId xmlns:a16="http://schemas.microsoft.com/office/drawing/2014/main" id="{F7CF495D-4076-D847-BE52-831CAF03DC08}"/>
-              </a:ext>
-            </a:extLst>
-          </p:cNvPr>
-          <p:cNvSpPr/>
-          <p:nvPr/>
-        </p:nvSpPr>
-        <p:spPr bwMode="auto">
-          <a:xfrm>
-            <a:off x="412120" y="1500189"/>
-            <a:ext cx="11346498" cy="3671888"/>
-          </a:xfrm>
-          <a:prstGeom prst="rect">
-            <a:avLst/>
-          </a:prstGeom>
-          <a:solidFill>
-            <a:schemeClr val="tx1"/>
-          </a:solidFill>
-          <a:ln>
-            <a:noFill/>
-            <a:headEnd type="none" w="med" len="med"/>
-            <a:tailEnd type="none" w="med" len="med"/>
-          </a:ln>
-          <a:effectLst/>
-        </p:spPr>
-        <p:style>
-          <a:lnRef idx="1">
-            <a:schemeClr val="accent2"/>
-          </a:lnRef>
-          <a:fillRef idx="3">
-            <a:schemeClr val="accent2"/>
-          </a:fillRef>
-          <a:effectRef idx="2">
-            <a:schemeClr val="accent2"/>
-          </a:effectRef>
-          <a:fontRef idx="minor">
-            <a:schemeClr val="lt1"/>
-          </a:fontRef>
-        </p:style>
-        <p:txBody>
-          <a:bodyPr rot="0" spcFirstLastPara="0" vertOverflow="overflow" horzOverflow="overflow" vert="horz" wrap="square" lIns="182880" tIns="146304" rIns="182880" bIns="146304" numCol="1" spcCol="0" rtlCol="0" fromWordArt="0" anchor="t" anchorCtr="0" forceAA="0" compatLnSpc="1">
-            <a:prstTxWarp prst="textNoShape">
-              <a:avLst/>
-            </a:prstTxWarp>
-            <a:noAutofit/>
-          </a:bodyPr>
-          <a:lstStyle/>
-          <a:p>
-            <a:pPr algn="ctr" defTabSz="932472" fontAlgn="base">
-              <a:lnSpc>
-                <a:spcPct val="90000"/>
-              </a:lnSpc>
-              <a:spcBef>
-                <a:spcPct val="0"/>
-              </a:spcBef>
-              <a:spcAft>
-                <a:spcPct val="0"/>
-              </a:spcAft>
-            </a:pPr>
-            <a:endParaRPr lang="en-US" sz="2400" dirty="0" err="1">
-              <a:gradFill>
-                <a:gsLst>
-                  <a:gs pos="0">
-                    <a:srgbClr val="FFFFFF"/>
-                  </a:gs>
-                  <a:gs pos="100000">
-                    <a:srgbClr val="FFFFFF"/>
-                  </a:gs>
-                </a:gsLst>
-                <a:lin ang="5400000" scaled="0"/>
-              </a:gradFill>
-              <a:ea typeface="Segoe UI" pitchFamily="34" charset="0"/>
-              <a:cs typeface="Segoe UI" pitchFamily="34" charset="0"/>
-            </a:endParaRPr>
-          </a:p>
-        </p:txBody>
-      </p:sp>
-      <p:pic>
-        <p:nvPicPr>
-          <p:cNvPr id="4" name="Picture 3">
-            <a:extLst>
-              <a:ext uri="{FF2B5EF4-FFF2-40B4-BE49-F238E27FC236}">
-                <a16:creationId xmlns:a16="http://schemas.microsoft.com/office/drawing/2014/main" id="{04695CDB-6CA5-48B4-B109-1296E4768E99}"/>
-              </a:ext>
-            </a:extLst>
-          </p:cNvPr>
-          <p:cNvPicPr>
-            <a:picLocks noChangeAspect="1"/>
-          </p:cNvPicPr>
-          <p:nvPr/>
-        </p:nvPicPr>
-        <p:blipFill>
-          <a:blip r:embed="rId3"/>
-          <a:stretch>
-            <a:fillRect/>
-          </a:stretch>
-        </p:blipFill>
-        <p:spPr>
-          <a:xfrm>
-            <a:off x="6186331" y="2604806"/>
-            <a:ext cx="490204" cy="508000"/>
-          </a:xfrm>
-          <a:prstGeom prst="rect">
-            <a:avLst/>
-          </a:prstGeom>
-        </p:spPr>
-      </p:pic>
-      <p:sp>
-        <p:nvSpPr>
           <p:cNvPr id="3" name="Title 2">
             <a:extLst>
               <a:ext uri="{FF2B5EF4-FFF2-40B4-BE49-F238E27FC236}">
@@ -18067,7 +17987,12 @@
             <p:ph type="title"/>
           </p:nvPr>
         </p:nvSpPr>
-        <p:spPr/>
+        <p:spPr>
+          <a:xfrm>
+            <a:off x="269240" y="267740"/>
+            <a:ext cx="11655840" cy="899665"/>
+          </a:xfrm>
+        </p:spPr>
         <p:txBody>
           <a:bodyPr/>
           <a:lstStyle/>
@@ -18075,147 +18000,6 @@
             <a:r>
               <a:rPr lang="en-US" dirty="0"/>
               <a:t>Common scenarios</a:t>
-            </a:r>
-          </a:p>
-        </p:txBody>
-      </p:sp>
-      <p:pic>
-        <p:nvPicPr>
-          <p:cNvPr id="89" name="Picture 88">
-            <a:extLst>
-              <a:ext uri="{FF2B5EF4-FFF2-40B4-BE49-F238E27FC236}">
-                <a16:creationId xmlns:a16="http://schemas.microsoft.com/office/drawing/2014/main" id="{6276561F-EBC2-0A45-B589-1BBFEF85A9DA}"/>
-              </a:ext>
-            </a:extLst>
-          </p:cNvPr>
-          <p:cNvPicPr>
-            <a:picLocks noChangeAspect="1"/>
-          </p:cNvPicPr>
-          <p:nvPr/>
-        </p:nvPicPr>
-        <p:blipFill>
-          <a:blip r:embed="rId4" cstate="print">
-            <a:extLst>
-              <a:ext uri="{28A0092B-C50C-407E-A947-70E740481C1C}">
-                <a14:useLocalDpi xmlns:a14="http://schemas.microsoft.com/office/drawing/2010/main" val="0"/>
-              </a:ext>
-            </a:extLst>
-          </a:blip>
-          <a:stretch>
-            <a:fillRect/>
-          </a:stretch>
-        </p:blipFill>
-        <p:spPr>
-          <a:xfrm>
-            <a:off x="596740" y="3269471"/>
-            <a:ext cx="481585" cy="481585"/>
-          </a:xfrm>
-          <a:prstGeom prst="rect">
-            <a:avLst/>
-          </a:prstGeom>
-        </p:spPr>
-      </p:pic>
-      <p:sp>
-        <p:nvSpPr>
-          <p:cNvPr id="90" name="TextBox 89">
-            <a:extLst>
-              <a:ext uri="{FF2B5EF4-FFF2-40B4-BE49-F238E27FC236}">
-                <a16:creationId xmlns:a16="http://schemas.microsoft.com/office/drawing/2014/main" id="{F5107D4E-FDF7-5144-9B0B-67BC47016A7A}"/>
-              </a:ext>
-            </a:extLst>
-          </p:cNvPr>
-          <p:cNvSpPr txBox="1"/>
-          <p:nvPr/>
-        </p:nvSpPr>
-        <p:spPr>
-          <a:xfrm>
-            <a:off x="1240469" y="2021875"/>
-            <a:ext cx="4363720" cy="400110"/>
-          </a:xfrm>
-          <a:prstGeom prst="rect">
-            <a:avLst/>
-          </a:prstGeom>
-          <a:noFill/>
-        </p:spPr>
-        <p:txBody>
-          <a:bodyPr wrap="square" rtlCol="0">
-            <a:spAutoFit/>
-          </a:bodyPr>
-          <a:lstStyle/>
-          <a:p>
-            <a:r>
-              <a:rPr lang="en-US" sz="2000" dirty="0"/>
-              <a:t>Azure DevOps</a:t>
-            </a:r>
-          </a:p>
-        </p:txBody>
-      </p:sp>
-      <p:sp>
-        <p:nvSpPr>
-          <p:cNvPr id="91" name="TextBox 90">
-            <a:extLst>
-              <a:ext uri="{FF2B5EF4-FFF2-40B4-BE49-F238E27FC236}">
-                <a16:creationId xmlns:a16="http://schemas.microsoft.com/office/drawing/2014/main" id="{2551AD69-BCF9-234C-A556-8243E7EBC1B7}"/>
-              </a:ext>
-            </a:extLst>
-          </p:cNvPr>
-          <p:cNvSpPr txBox="1"/>
-          <p:nvPr/>
-        </p:nvSpPr>
-        <p:spPr>
-          <a:xfrm>
-            <a:off x="1260789" y="2680773"/>
-            <a:ext cx="4751697" cy="400110"/>
-          </a:xfrm>
-          <a:prstGeom prst="rect">
-            <a:avLst/>
-          </a:prstGeom>
-          <a:noFill/>
-        </p:spPr>
-        <p:txBody>
-          <a:bodyPr wrap="square" rtlCol="0">
-            <a:spAutoFit/>
-          </a:bodyPr>
-          <a:lstStyle/>
-          <a:p>
-            <a:r>
-              <a:rPr lang="en-US" sz="2000" dirty="0"/>
-              <a:t>Azure Repos</a:t>
-            </a:r>
-          </a:p>
-        </p:txBody>
-      </p:sp>
-      <p:sp>
-        <p:nvSpPr>
-          <p:cNvPr id="92" name="TextBox 91">
-            <a:extLst>
-              <a:ext uri="{FF2B5EF4-FFF2-40B4-BE49-F238E27FC236}">
-                <a16:creationId xmlns:a16="http://schemas.microsoft.com/office/drawing/2014/main" id="{3E3E1ADB-2DB6-784D-9B2A-1E82D13A8507}"/>
-              </a:ext>
-            </a:extLst>
-          </p:cNvPr>
-          <p:cNvSpPr txBox="1"/>
-          <p:nvPr/>
-        </p:nvSpPr>
-        <p:spPr>
-          <a:xfrm>
-            <a:off x="1260789" y="3351655"/>
-            <a:ext cx="5725280" cy="400110"/>
-          </a:xfrm>
-          <a:prstGeom prst="rect">
-            <a:avLst/>
-          </a:prstGeom>
-          <a:noFill/>
-        </p:spPr>
-        <p:txBody>
-          <a:bodyPr wrap="square" rtlCol="0">
-            <a:spAutoFit/>
-          </a:bodyPr>
-          <a:lstStyle/>
-          <a:p>
-            <a:r>
-              <a:rPr lang="en-US" sz="2000" dirty="0"/>
-              <a:t>Azure DevOps with GitHub</a:t>
             </a:r>
           </a:p>
         </p:txBody>
@@ -18290,277 +18074,91 @@
           </a:p>
         </p:txBody>
       </p:sp>
-      <p:cxnSp>
-        <p:nvCxnSpPr>
-          <p:cNvPr id="96" name="Straight Arrow Connector 95">
+      <p:grpSp>
+        <p:nvGrpSpPr>
+          <p:cNvPr id="7" name="Group 6">
             <a:extLst>
               <a:ext uri="{FF2B5EF4-FFF2-40B4-BE49-F238E27FC236}">
-                <a16:creationId xmlns:a16="http://schemas.microsoft.com/office/drawing/2014/main" id="{D3A0320F-285E-B344-9A30-657BFD4A5593}"/>
+                <a16:creationId xmlns:a16="http://schemas.microsoft.com/office/drawing/2014/main" id="{377B3715-8CFC-4EB2-A14F-76121ED7861F}"/>
               </a:ext>
             </a:extLst>
           </p:cNvPr>
-          <p:cNvCxnSpPr>
-            <a:cxnSpLocks/>
-            <a:stCxn id="100" idx="3"/>
-            <a:endCxn id="101" idx="1"/>
-          </p:cNvCxnSpPr>
+          <p:cNvGrpSpPr/>
           <p:nvPr/>
-        </p:nvCxnSpPr>
-        <p:spPr>
+        </p:nvGrpSpPr>
+        <p:grpSpPr>
           <a:xfrm>
-            <a:off x="2995792" y="4666243"/>
-            <a:ext cx="465694" cy="0"/>
+            <a:off x="412120" y="1500189"/>
+            <a:ext cx="12163540" cy="3671888"/>
+            <a:chOff x="412120" y="1500189"/>
+            <a:chExt cx="12163540" cy="3671888"/>
           </a:xfrm>
-          <a:prstGeom prst="straightConnector1">
-            <a:avLst/>
-          </a:prstGeom>
-          <a:ln w="9525" cap="flat" cmpd="sng" algn="ctr">
+        </p:grpSpPr>
+        <p:sp>
+          <p:nvSpPr>
+            <p:cNvPr id="2" name="Rectangle 1">
+              <a:extLst>
+                <a:ext uri="{FF2B5EF4-FFF2-40B4-BE49-F238E27FC236}">
+                  <a16:creationId xmlns:a16="http://schemas.microsoft.com/office/drawing/2014/main" id="{F7CF495D-4076-D847-BE52-831CAF03DC08}"/>
+                </a:ext>
+              </a:extLst>
+            </p:cNvPr>
+            <p:cNvSpPr/>
+            <p:nvPr/>
+          </p:nvSpPr>
+          <p:spPr bwMode="auto">
+            <a:xfrm>
+              <a:off x="412120" y="1500189"/>
+              <a:ext cx="11346498" cy="3671888"/>
+            </a:xfrm>
+            <a:prstGeom prst="rect">
+              <a:avLst/>
+            </a:prstGeom>
             <a:solidFill>
-              <a:schemeClr val="accent6"/>
+              <a:schemeClr val="tx1"/>
             </a:solidFill>
-            <a:prstDash val="solid"/>
-            <a:round/>
-            <a:headEnd type="none" w="med" len="med"/>
-            <a:tailEnd type="arrow" w="med" len="med"/>
-          </a:ln>
-        </p:spPr>
-        <p:style>
-          <a:lnRef idx="0">
-            <a:scrgbClr r="0" g="0" b="0"/>
-          </a:lnRef>
-          <a:fillRef idx="0">
-            <a:scrgbClr r="0" g="0" b="0"/>
-          </a:fillRef>
-          <a:effectRef idx="0">
-            <a:scrgbClr r="0" g="0" b="0"/>
-          </a:effectRef>
-          <a:fontRef idx="minor">
-            <a:schemeClr val="tx1"/>
-          </a:fontRef>
-        </p:style>
-      </p:cxnSp>
-      <p:cxnSp>
-        <p:nvCxnSpPr>
-          <p:cNvPr id="97" name="Straight Arrow Connector 96">
-            <a:extLst>
-              <a:ext uri="{FF2B5EF4-FFF2-40B4-BE49-F238E27FC236}">
-                <a16:creationId xmlns:a16="http://schemas.microsoft.com/office/drawing/2014/main" id="{BC4BAE5C-7CBB-2645-B693-B5918A80E60A}"/>
-              </a:ext>
-            </a:extLst>
-          </p:cNvPr>
-          <p:cNvCxnSpPr>
-            <a:cxnSpLocks/>
-            <a:stCxn id="101" idx="3"/>
-            <a:endCxn id="102" idx="1"/>
-          </p:cNvCxnSpPr>
-          <p:nvPr/>
-        </p:nvCxnSpPr>
-        <p:spPr>
-          <a:xfrm>
-            <a:off x="5142447" y="4666243"/>
-            <a:ext cx="465694" cy="0"/>
-          </a:xfrm>
-          <a:prstGeom prst="straightConnector1">
-            <a:avLst/>
-          </a:prstGeom>
-          <a:ln w="9525" cap="flat" cmpd="sng" algn="ctr">
-            <a:solidFill>
-              <a:schemeClr val="accent6"/>
-            </a:solidFill>
-            <a:prstDash val="solid"/>
-            <a:round/>
-            <a:headEnd type="none" w="med" len="med"/>
-            <a:tailEnd type="arrow" w="med" len="med"/>
-          </a:ln>
-        </p:spPr>
-        <p:style>
-          <a:lnRef idx="0">
-            <a:scrgbClr r="0" g="0" b="0"/>
-          </a:lnRef>
-          <a:fillRef idx="0">
-            <a:scrgbClr r="0" g="0" b="0"/>
-          </a:fillRef>
-          <a:effectRef idx="0">
-            <a:scrgbClr r="0" g="0" b="0"/>
-          </a:effectRef>
-          <a:fontRef idx="minor">
-            <a:schemeClr val="tx1"/>
-          </a:fontRef>
-        </p:style>
-      </p:cxnSp>
-      <p:cxnSp>
-        <p:nvCxnSpPr>
-          <p:cNvPr id="98" name="Straight Arrow Connector 97">
-            <a:extLst>
-              <a:ext uri="{FF2B5EF4-FFF2-40B4-BE49-F238E27FC236}">
-                <a16:creationId xmlns:a16="http://schemas.microsoft.com/office/drawing/2014/main" id="{D0D3FAA1-451B-144B-A568-5F736357D4EC}"/>
-              </a:ext>
-            </a:extLst>
-          </p:cNvPr>
-          <p:cNvCxnSpPr>
-            <a:cxnSpLocks/>
-            <a:stCxn id="102" idx="3"/>
-            <a:endCxn id="103" idx="1"/>
-          </p:cNvCxnSpPr>
-          <p:nvPr/>
-        </p:nvCxnSpPr>
-        <p:spPr>
-          <a:xfrm>
-            <a:off x="7289102" y="4666243"/>
-            <a:ext cx="465694" cy="0"/>
-          </a:xfrm>
-          <a:prstGeom prst="straightConnector1">
-            <a:avLst/>
-          </a:prstGeom>
-          <a:ln w="9525" cap="flat" cmpd="sng" algn="ctr">
-            <a:solidFill>
-              <a:schemeClr val="accent6"/>
-            </a:solidFill>
-            <a:prstDash val="solid"/>
-            <a:round/>
-            <a:headEnd type="none" w="med" len="med"/>
-            <a:tailEnd type="arrow" w="med" len="med"/>
-          </a:ln>
-        </p:spPr>
-        <p:style>
-          <a:lnRef idx="0">
-            <a:scrgbClr r="0" g="0" b="0"/>
-          </a:lnRef>
-          <a:fillRef idx="0">
-            <a:scrgbClr r="0" g="0" b="0"/>
-          </a:fillRef>
-          <a:effectRef idx="0">
-            <a:scrgbClr r="0" g="0" b="0"/>
-          </a:effectRef>
-          <a:fontRef idx="minor">
-            <a:schemeClr val="tx1"/>
-          </a:fontRef>
-        </p:style>
-      </p:cxnSp>
-      <p:cxnSp>
-        <p:nvCxnSpPr>
-          <p:cNvPr id="99" name="Straight Arrow Connector 98">
-            <a:extLst>
-              <a:ext uri="{FF2B5EF4-FFF2-40B4-BE49-F238E27FC236}">
-                <a16:creationId xmlns:a16="http://schemas.microsoft.com/office/drawing/2014/main" id="{30435B2B-6826-7842-B0FF-05D2012A05FD}"/>
-              </a:ext>
-            </a:extLst>
-          </p:cNvPr>
-          <p:cNvCxnSpPr>
-            <a:cxnSpLocks/>
-            <a:stCxn id="103" idx="3"/>
-            <a:endCxn id="104" idx="1"/>
-          </p:cNvCxnSpPr>
-          <p:nvPr/>
-        </p:nvCxnSpPr>
-        <p:spPr>
-          <a:xfrm>
-            <a:off x="9435757" y="4666243"/>
-            <a:ext cx="465694" cy="0"/>
-          </a:xfrm>
-          <a:prstGeom prst="straightConnector1">
-            <a:avLst/>
-          </a:prstGeom>
-          <a:ln w="9525" cap="flat" cmpd="sng" algn="ctr">
-            <a:solidFill>
-              <a:schemeClr val="accent6"/>
-            </a:solidFill>
-            <a:prstDash val="solid"/>
-            <a:round/>
-            <a:headEnd type="none" w="med" len="med"/>
-            <a:tailEnd type="arrow" w="med" len="med"/>
-          </a:ln>
-        </p:spPr>
-        <p:style>
-          <a:lnRef idx="0">
-            <a:scrgbClr r="0" g="0" b="0"/>
-          </a:lnRef>
-          <a:fillRef idx="0">
-            <a:scrgbClr r="0" g="0" b="0"/>
-          </a:fillRef>
-          <a:effectRef idx="0">
-            <a:scrgbClr r="0" g="0" b="0"/>
-          </a:effectRef>
-          <a:fontRef idx="minor">
-            <a:schemeClr val="tx1"/>
-          </a:fontRef>
-        </p:style>
-      </p:cxnSp>
-      <p:sp>
-        <p:nvSpPr>
-          <p:cNvPr id="100" name="Rectangle 99">
-            <a:extLst>
-              <a:ext uri="{FF2B5EF4-FFF2-40B4-BE49-F238E27FC236}">
-                <a16:creationId xmlns:a16="http://schemas.microsoft.com/office/drawing/2014/main" id="{576729F6-E197-FA4C-8E9D-DCE4120B2FEE}"/>
-              </a:ext>
-            </a:extLst>
-          </p:cNvPr>
-          <p:cNvSpPr/>
-          <p:nvPr/>
-        </p:nvSpPr>
-        <p:spPr bwMode="auto">
-          <a:xfrm>
-            <a:off x="611564" y="4272604"/>
-            <a:ext cx="2384228" cy="787277"/>
-          </a:xfrm>
-          <a:prstGeom prst="rect">
-            <a:avLst/>
-          </a:prstGeom>
-          <a:solidFill>
-            <a:srgbClr val="002060"/>
-          </a:solidFill>
-          <a:ln>
-            <a:noFill/>
-            <a:headEnd type="none" w="med" len="med"/>
-            <a:tailEnd type="none" w="med" len="med"/>
-          </a:ln>
-          <a:effectLst/>
-        </p:spPr>
-        <p:style>
-          <a:lnRef idx="1">
-            <a:schemeClr val="accent2"/>
-          </a:lnRef>
-          <a:fillRef idx="3">
-            <a:schemeClr val="accent2"/>
-          </a:fillRef>
-          <a:effectRef idx="2">
-            <a:schemeClr val="accent2"/>
-          </a:effectRef>
-          <a:fontRef idx="minor">
-            <a:schemeClr val="lt1"/>
-          </a:fontRef>
-        </p:style>
-        <p:txBody>
-          <a:bodyPr rot="0" spcFirstLastPara="0" vertOverflow="overflow" horzOverflow="overflow" vert="horz" wrap="square" lIns="182857" tIns="146285" rIns="182857" bIns="146285" numCol="1" spcCol="0" rtlCol="0" fromWordArt="0" anchor="t" anchorCtr="0" forceAA="0" compatLnSpc="1">
-            <a:prstTxWarp prst="textNoShape">
-              <a:avLst/>
-            </a:prstTxWarp>
-            <a:noAutofit/>
-          </a:bodyPr>
-          <a:lstStyle/>
-          <a:p>
-            <a:pPr marL="0" marR="0" lvl="0" indent="0" algn="ctr" defTabSz="932021" rtl="0" eaLnBrk="1" fontAlgn="auto" latinLnBrk="0" hangingPunct="1">
-              <a:lnSpc>
-                <a:spcPct val="90000"/>
-              </a:lnSpc>
-              <a:spcBef>
-                <a:spcPts val="0"/>
-              </a:spcBef>
-              <a:spcAft>
-                <a:spcPts val="0"/>
-              </a:spcAft>
-              <a:buClrTx/>
-              <a:buSzTx/>
-              <a:buFontTx/>
-              <a:buNone/>
-              <a:tabLst/>
-              <a:defRPr/>
-            </a:pPr>
-            <a:r>
-              <a:rPr kumimoji="0" lang="en-US" sz="1400" b="1" i="0" u="none" strike="noStrike" kern="0" cap="none" spc="0" normalizeH="0" baseline="0" noProof="0" dirty="0">
-                <a:ln>
-                  <a:noFill/>
-                </a:ln>
+            <a:ln>
+              <a:noFill/>
+              <a:headEnd type="none" w="med" len="med"/>
+              <a:tailEnd type="none" w="med" len="med"/>
+            </a:ln>
+            <a:effectLst/>
+          </p:spPr>
+          <p:style>
+            <a:lnRef idx="1">
+              <a:schemeClr val="accent2"/>
+            </a:lnRef>
+            <a:fillRef idx="3">
+              <a:schemeClr val="accent2"/>
+            </a:fillRef>
+            <a:effectRef idx="2">
+              <a:schemeClr val="accent2"/>
+            </a:effectRef>
+            <a:fontRef idx="minor">
+              <a:schemeClr val="lt1"/>
+            </a:fontRef>
+          </p:style>
+          <p:txBody>
+            <a:bodyPr rot="0" spcFirstLastPara="0" vertOverflow="overflow" horzOverflow="overflow" vert="horz" wrap="square" lIns="182880" tIns="146304" rIns="182880" bIns="146304" numCol="1" spcCol="0" rtlCol="0" fromWordArt="0" anchor="t" anchorCtr="0" forceAA="0" compatLnSpc="1">
+              <a:prstTxWarp prst="textNoShape">
+                <a:avLst/>
+              </a:prstTxWarp>
+              <a:noAutofit/>
+            </a:bodyPr>
+            <a:lstStyle/>
+            <a:p>
+              <a:pPr algn="ctr" defTabSz="932472" fontAlgn="base">
+                <a:lnSpc>
+                  <a:spcPct val="90000"/>
+                </a:lnSpc>
+                <a:spcBef>
+                  <a:spcPct val="0"/>
+                </a:spcBef>
+                <a:spcAft>
+                  <a:spcPct val="0"/>
+                </a:spcAft>
+              </a:pPr>
+              <a:endParaRPr lang="en-US" sz="2400" dirty="0" err="1">
                 <a:gradFill>
                   <a:gsLst>
                     <a:gs pos="0">
@@ -18572,734 +18170,1203 @@
                   </a:gsLst>
                   <a:lin ang="5400000" scaled="0"/>
                 </a:gradFill>
-                <a:effectLst/>
-                <a:uLnTx/>
-                <a:uFillTx/>
-                <a:latin typeface="Segoe UI Light"/>
                 <a:ea typeface="Segoe UI" pitchFamily="34" charset="0"/>
                 <a:cs typeface="Segoe UI" pitchFamily="34" charset="0"/>
-              </a:rPr>
-              <a:t>SOURCE CONTROL</a:t>
-            </a:r>
-          </a:p>
-        </p:txBody>
-      </p:sp>
-      <p:sp>
-        <p:nvSpPr>
-          <p:cNvPr id="101" name="Rectangle 100">
-            <a:extLst>
-              <a:ext uri="{FF2B5EF4-FFF2-40B4-BE49-F238E27FC236}">
-                <a16:creationId xmlns:a16="http://schemas.microsoft.com/office/drawing/2014/main" id="{6938DFFB-2E41-6B44-ABA0-FF6C35412EFF}"/>
-              </a:ext>
-            </a:extLst>
-          </p:cNvPr>
-          <p:cNvSpPr/>
-          <p:nvPr/>
-        </p:nvSpPr>
-        <p:spPr bwMode="auto">
-          <a:xfrm>
-            <a:off x="3461486" y="4272604"/>
-            <a:ext cx="1680961" cy="787277"/>
-          </a:xfrm>
-          <a:prstGeom prst="rect">
-            <a:avLst/>
-          </a:prstGeom>
-          <a:solidFill>
-            <a:srgbClr val="002060"/>
-          </a:solidFill>
-          <a:ln>
+              </a:endParaRPr>
+            </a:p>
+          </p:txBody>
+        </p:sp>
+        <p:pic>
+          <p:nvPicPr>
+            <p:cNvPr id="4" name="Picture 3">
+              <a:extLst>
+                <a:ext uri="{FF2B5EF4-FFF2-40B4-BE49-F238E27FC236}">
+                  <a16:creationId xmlns:a16="http://schemas.microsoft.com/office/drawing/2014/main" id="{04695CDB-6CA5-48B4-B109-1296E4768E99}"/>
+                </a:ext>
+              </a:extLst>
+            </p:cNvPr>
+            <p:cNvPicPr>
+              <a:picLocks noChangeAspect="1"/>
+            </p:cNvPicPr>
+            <p:nvPr/>
+          </p:nvPicPr>
+          <p:blipFill>
+            <a:blip r:embed="rId3"/>
+            <a:stretch>
+              <a:fillRect/>
+            </a:stretch>
+          </p:blipFill>
+          <p:spPr>
+            <a:xfrm>
+              <a:off x="6186331" y="2604806"/>
+              <a:ext cx="490204" cy="508000"/>
+            </a:xfrm>
+            <a:prstGeom prst="rect">
+              <a:avLst/>
+            </a:prstGeom>
+          </p:spPr>
+        </p:pic>
+        <p:pic>
+          <p:nvPicPr>
+            <p:cNvPr id="89" name="Picture 88">
+              <a:extLst>
+                <a:ext uri="{FF2B5EF4-FFF2-40B4-BE49-F238E27FC236}">
+                  <a16:creationId xmlns:a16="http://schemas.microsoft.com/office/drawing/2014/main" id="{6276561F-EBC2-0A45-B589-1BBFEF85A9DA}"/>
+                </a:ext>
+              </a:extLst>
+            </p:cNvPr>
+            <p:cNvPicPr>
+              <a:picLocks noChangeAspect="1"/>
+            </p:cNvPicPr>
+            <p:nvPr/>
+          </p:nvPicPr>
+          <p:blipFill>
+            <a:blip r:embed="rId4" cstate="print">
+              <a:extLst>
+                <a:ext uri="{28A0092B-C50C-407E-A947-70E740481C1C}">
+                  <a14:useLocalDpi xmlns:a14="http://schemas.microsoft.com/office/drawing/2010/main" val="0"/>
+                </a:ext>
+              </a:extLst>
+            </a:blip>
+            <a:stretch>
+              <a:fillRect/>
+            </a:stretch>
+          </p:blipFill>
+          <p:spPr>
+            <a:xfrm>
+              <a:off x="596740" y="3269471"/>
+              <a:ext cx="481585" cy="481585"/>
+            </a:xfrm>
+            <a:prstGeom prst="rect">
+              <a:avLst/>
+            </a:prstGeom>
+          </p:spPr>
+        </p:pic>
+        <p:sp>
+          <p:nvSpPr>
+            <p:cNvPr id="90" name="TextBox 89">
+              <a:extLst>
+                <a:ext uri="{FF2B5EF4-FFF2-40B4-BE49-F238E27FC236}">
+                  <a16:creationId xmlns:a16="http://schemas.microsoft.com/office/drawing/2014/main" id="{F5107D4E-FDF7-5144-9B0B-67BC47016A7A}"/>
+                </a:ext>
+              </a:extLst>
+            </p:cNvPr>
+            <p:cNvSpPr txBox="1"/>
+            <p:nvPr/>
+          </p:nvSpPr>
+          <p:spPr>
+            <a:xfrm>
+              <a:off x="1240469" y="2021875"/>
+              <a:ext cx="4363720" cy="400110"/>
+            </a:xfrm>
+            <a:prstGeom prst="rect">
+              <a:avLst/>
+            </a:prstGeom>
             <a:noFill/>
-            <a:headEnd type="none" w="med" len="med"/>
-            <a:tailEnd type="none" w="med" len="med"/>
-          </a:ln>
-          <a:effectLst/>
-        </p:spPr>
-        <p:style>
-          <a:lnRef idx="1">
-            <a:schemeClr val="accent2"/>
-          </a:lnRef>
-          <a:fillRef idx="3">
-            <a:schemeClr val="accent2"/>
-          </a:fillRef>
-          <a:effectRef idx="2">
-            <a:schemeClr val="accent2"/>
-          </a:effectRef>
-          <a:fontRef idx="minor">
-            <a:schemeClr val="lt1"/>
-          </a:fontRef>
-        </p:style>
-        <p:txBody>
-          <a:bodyPr rot="0" spcFirstLastPara="0" vertOverflow="overflow" horzOverflow="overflow" vert="horz" wrap="square" lIns="182857" tIns="146285" rIns="182857" bIns="146285" numCol="1" spcCol="0" rtlCol="0" fromWordArt="0" anchor="t" anchorCtr="0" forceAA="0" compatLnSpc="1">
-            <a:prstTxWarp prst="textNoShape">
+          </p:spPr>
+          <p:txBody>
+            <a:bodyPr wrap="square" rtlCol="0">
+              <a:spAutoFit/>
+            </a:bodyPr>
+            <a:lstStyle/>
+            <a:p>
+              <a:r>
+                <a:rPr lang="en-US" sz="2000" dirty="0"/>
+                <a:t>Azure DevOps</a:t>
+              </a:r>
+            </a:p>
+          </p:txBody>
+        </p:sp>
+        <p:sp>
+          <p:nvSpPr>
+            <p:cNvPr id="91" name="TextBox 90">
+              <a:extLst>
+                <a:ext uri="{FF2B5EF4-FFF2-40B4-BE49-F238E27FC236}">
+                  <a16:creationId xmlns:a16="http://schemas.microsoft.com/office/drawing/2014/main" id="{2551AD69-BCF9-234C-A556-8243E7EBC1B7}"/>
+                </a:ext>
+              </a:extLst>
+            </p:cNvPr>
+            <p:cNvSpPr txBox="1"/>
+            <p:nvPr/>
+          </p:nvSpPr>
+          <p:spPr>
+            <a:xfrm>
+              <a:off x="1260789" y="2680773"/>
+              <a:ext cx="4751697" cy="400110"/>
+            </a:xfrm>
+            <a:prstGeom prst="rect">
               <a:avLst/>
-            </a:prstTxWarp>
-            <a:noAutofit/>
-          </a:bodyPr>
-          <a:lstStyle/>
-          <a:p>
-            <a:pPr marL="0" marR="0" lvl="0" indent="0" algn="ctr" defTabSz="932021" rtl="0" eaLnBrk="1" fontAlgn="auto" latinLnBrk="0" hangingPunct="1">
-              <a:lnSpc>
-                <a:spcPct val="90000"/>
-              </a:lnSpc>
-              <a:spcBef>
-                <a:spcPts val="0"/>
-              </a:spcBef>
-              <a:spcAft>
-                <a:spcPts val="0"/>
-              </a:spcAft>
-              <a:buClrTx/>
-              <a:buSzTx/>
-              <a:buFontTx/>
-              <a:buNone/>
-              <a:tabLst/>
-              <a:defRPr/>
-            </a:pPr>
-            <a:r>
-              <a:rPr kumimoji="0" lang="en-US" sz="1400" b="1" i="0" u="none" strike="noStrike" kern="0" cap="none" spc="0" normalizeH="0" baseline="0" noProof="0" dirty="0">
-                <a:ln>
-                  <a:noFill/>
-                </a:ln>
-                <a:gradFill>
-                  <a:gsLst>
-                    <a:gs pos="0">
-                      <a:srgbClr val="FFFFFF"/>
-                    </a:gs>
-                    <a:gs pos="100000">
-                      <a:srgbClr val="FFFFFF"/>
-                    </a:gs>
-                  </a:gsLst>
-                  <a:lin ang="5400000" scaled="0"/>
-                </a:gradFill>
-                <a:effectLst/>
-                <a:uLnTx/>
-                <a:uFillTx/>
-                <a:latin typeface="Segoe UI Light"/>
-                <a:ea typeface="Segoe UI" pitchFamily="34" charset="0"/>
-                <a:cs typeface="Segoe UI" pitchFamily="34" charset="0"/>
-              </a:rPr>
-              <a:t>CI</a:t>
-            </a:r>
-          </a:p>
-        </p:txBody>
-      </p:sp>
-      <p:sp>
-        <p:nvSpPr>
-          <p:cNvPr id="102" name="Rectangle 101">
-            <a:extLst>
-              <a:ext uri="{FF2B5EF4-FFF2-40B4-BE49-F238E27FC236}">
-                <a16:creationId xmlns:a16="http://schemas.microsoft.com/office/drawing/2014/main" id="{79C21FAA-E266-0745-A345-C8F9B36EE244}"/>
-              </a:ext>
-            </a:extLst>
-          </p:cNvPr>
-          <p:cNvSpPr/>
-          <p:nvPr/>
-        </p:nvSpPr>
-        <p:spPr bwMode="auto">
-          <a:xfrm>
-            <a:off x="5608141" y="4272604"/>
-            <a:ext cx="1680961" cy="787277"/>
-          </a:xfrm>
-          <a:prstGeom prst="rect">
-            <a:avLst/>
-          </a:prstGeom>
-          <a:solidFill>
-            <a:srgbClr val="002060"/>
-          </a:solidFill>
-          <a:ln>
+            </a:prstGeom>
             <a:noFill/>
-            <a:headEnd type="none" w="med" len="med"/>
-            <a:tailEnd type="none" w="med" len="med"/>
-          </a:ln>
-          <a:effectLst/>
-        </p:spPr>
-        <p:style>
-          <a:lnRef idx="1">
-            <a:schemeClr val="accent2"/>
-          </a:lnRef>
-          <a:fillRef idx="3">
-            <a:schemeClr val="accent2"/>
-          </a:fillRef>
-          <a:effectRef idx="2">
-            <a:schemeClr val="accent2"/>
-          </a:effectRef>
-          <a:fontRef idx="minor">
-            <a:schemeClr val="lt1"/>
-          </a:fontRef>
-        </p:style>
-        <p:txBody>
-          <a:bodyPr rot="0" spcFirstLastPara="0" vertOverflow="overflow" horzOverflow="overflow" vert="horz" wrap="square" lIns="182857" tIns="146285" rIns="182857" bIns="146285" numCol="1" spcCol="0" rtlCol="0" fromWordArt="0" anchor="t" anchorCtr="0" forceAA="0" compatLnSpc="1">
-            <a:prstTxWarp prst="textNoShape">
+          </p:spPr>
+          <p:txBody>
+            <a:bodyPr wrap="square" rtlCol="0">
+              <a:spAutoFit/>
+            </a:bodyPr>
+            <a:lstStyle/>
+            <a:p>
+              <a:r>
+                <a:rPr lang="en-US" sz="2000" dirty="0"/>
+                <a:t>Azure Repos</a:t>
+              </a:r>
+            </a:p>
+          </p:txBody>
+        </p:sp>
+        <p:sp>
+          <p:nvSpPr>
+            <p:cNvPr id="92" name="TextBox 91">
+              <a:extLst>
+                <a:ext uri="{FF2B5EF4-FFF2-40B4-BE49-F238E27FC236}">
+                  <a16:creationId xmlns:a16="http://schemas.microsoft.com/office/drawing/2014/main" id="{3E3E1ADB-2DB6-784D-9B2A-1E82D13A8507}"/>
+                </a:ext>
+              </a:extLst>
+            </p:cNvPr>
+            <p:cNvSpPr txBox="1"/>
+            <p:nvPr/>
+          </p:nvSpPr>
+          <p:spPr>
+            <a:xfrm>
+              <a:off x="1260789" y="3351655"/>
+              <a:ext cx="5725280" cy="400110"/>
+            </a:xfrm>
+            <a:prstGeom prst="rect">
               <a:avLst/>
-            </a:prstTxWarp>
-            <a:noAutofit/>
-          </a:bodyPr>
-          <a:lstStyle/>
-          <a:p>
-            <a:pPr marL="0" marR="0" lvl="0" indent="0" algn="ctr" defTabSz="932021" rtl="0" eaLnBrk="1" fontAlgn="auto" latinLnBrk="0" hangingPunct="1">
-              <a:lnSpc>
-                <a:spcPct val="90000"/>
-              </a:lnSpc>
-              <a:spcBef>
-                <a:spcPts val="0"/>
-              </a:spcBef>
-              <a:spcAft>
-                <a:spcPts val="0"/>
-              </a:spcAft>
-              <a:buClrTx/>
-              <a:buSzTx/>
-              <a:buFontTx/>
-              <a:buNone/>
-              <a:tabLst/>
-              <a:defRPr/>
-            </a:pPr>
-            <a:r>
-              <a:rPr kumimoji="0" lang="en-US" sz="1400" b="1" i="0" u="none" strike="noStrike" kern="0" cap="none" spc="0" normalizeH="0" baseline="0" noProof="0" dirty="0">
-                <a:ln>
-                  <a:noFill/>
-                </a:ln>
-                <a:gradFill>
-                  <a:gsLst>
-                    <a:gs pos="0">
-                      <a:srgbClr val="FFFFFF"/>
-                    </a:gs>
-                    <a:gs pos="100000">
-                      <a:srgbClr val="FFFFFF"/>
-                    </a:gs>
-                  </a:gsLst>
-                  <a:lin ang="5400000" scaled="0"/>
-                </a:gradFill>
-                <a:effectLst/>
-                <a:uLnTx/>
-                <a:uFillTx/>
-                <a:latin typeface="Segoe UI Light"/>
-                <a:ea typeface="Segoe UI" pitchFamily="34" charset="0"/>
-                <a:cs typeface="Segoe UI" pitchFamily="34" charset="0"/>
-              </a:rPr>
-              <a:t>PACKAGE</a:t>
-            </a:r>
-          </a:p>
-        </p:txBody>
-      </p:sp>
-      <p:sp>
-        <p:nvSpPr>
-          <p:cNvPr id="103" name="Rectangle 102">
-            <a:extLst>
-              <a:ext uri="{FF2B5EF4-FFF2-40B4-BE49-F238E27FC236}">
-                <a16:creationId xmlns:a16="http://schemas.microsoft.com/office/drawing/2014/main" id="{C43ED478-8C63-4543-93C0-28F25717B8CF}"/>
-              </a:ext>
-            </a:extLst>
-          </p:cNvPr>
-          <p:cNvSpPr/>
-          <p:nvPr/>
-        </p:nvSpPr>
-        <p:spPr bwMode="auto">
-          <a:xfrm>
-            <a:off x="7754796" y="4272604"/>
-            <a:ext cx="1680961" cy="787277"/>
-          </a:xfrm>
-          <a:prstGeom prst="rect">
-            <a:avLst/>
-          </a:prstGeom>
-          <a:solidFill>
-            <a:srgbClr val="002060"/>
-          </a:solidFill>
-          <a:ln>
+            </a:prstGeom>
             <a:noFill/>
-            <a:headEnd type="none" w="med" len="med"/>
-            <a:tailEnd type="none" w="med" len="med"/>
-          </a:ln>
-          <a:effectLst/>
-        </p:spPr>
-        <p:style>
-          <a:lnRef idx="1">
-            <a:schemeClr val="accent2"/>
-          </a:lnRef>
-          <a:fillRef idx="3">
-            <a:schemeClr val="accent2"/>
-          </a:fillRef>
-          <a:effectRef idx="2">
-            <a:schemeClr val="accent2"/>
-          </a:effectRef>
-          <a:fontRef idx="minor">
-            <a:schemeClr val="lt1"/>
-          </a:fontRef>
-        </p:style>
-        <p:txBody>
-          <a:bodyPr rot="0" spcFirstLastPara="0" vertOverflow="overflow" horzOverflow="overflow" vert="horz" wrap="square" lIns="182857" tIns="146285" rIns="182857" bIns="146285" numCol="1" spcCol="0" rtlCol="0" fromWordArt="0" anchor="t" anchorCtr="0" forceAA="0" compatLnSpc="1">
-            <a:prstTxWarp prst="textNoShape">
+          </p:spPr>
+          <p:txBody>
+            <a:bodyPr wrap="square" rtlCol="0">
+              <a:spAutoFit/>
+            </a:bodyPr>
+            <a:lstStyle/>
+            <a:p>
+              <a:r>
+                <a:rPr lang="en-US" sz="2000" dirty="0"/>
+                <a:t>Azure DevOps with GitHub</a:t>
+              </a:r>
+            </a:p>
+          </p:txBody>
+        </p:sp>
+        <p:cxnSp>
+          <p:nvCxnSpPr>
+            <p:cNvPr id="96" name="Straight Arrow Connector 95">
+              <a:extLst>
+                <a:ext uri="{FF2B5EF4-FFF2-40B4-BE49-F238E27FC236}">
+                  <a16:creationId xmlns:a16="http://schemas.microsoft.com/office/drawing/2014/main" id="{D3A0320F-285E-B344-9A30-657BFD4A5593}"/>
+                </a:ext>
+              </a:extLst>
+            </p:cNvPr>
+            <p:cNvCxnSpPr>
+              <a:cxnSpLocks/>
+              <a:stCxn id="100" idx="3"/>
+              <a:endCxn id="101" idx="1"/>
+            </p:cNvCxnSpPr>
+            <p:nvPr/>
+          </p:nvCxnSpPr>
+          <p:spPr>
+            <a:xfrm>
+              <a:off x="2995792" y="4666243"/>
+              <a:ext cx="465694" cy="0"/>
+            </a:xfrm>
+            <a:prstGeom prst="straightConnector1">
               <a:avLst/>
-            </a:prstTxWarp>
-            <a:noAutofit/>
-          </a:bodyPr>
-          <a:lstStyle/>
-          <a:p>
-            <a:pPr marL="0" marR="0" lvl="0" indent="0" algn="ctr" defTabSz="932021" rtl="0" eaLnBrk="1" fontAlgn="auto" latinLnBrk="0" hangingPunct="1">
-              <a:lnSpc>
-                <a:spcPct val="90000"/>
-              </a:lnSpc>
-              <a:spcBef>
-                <a:spcPts val="0"/>
-              </a:spcBef>
-              <a:spcAft>
-                <a:spcPts val="0"/>
-              </a:spcAft>
-              <a:buClrTx/>
-              <a:buSzTx/>
-              <a:buFontTx/>
-              <a:buNone/>
-              <a:tabLst/>
-              <a:defRPr/>
-            </a:pPr>
-            <a:r>
-              <a:rPr kumimoji="0" lang="en-US" sz="1400" b="1" i="0" u="none" strike="noStrike" kern="0" cap="none" spc="0" normalizeH="0" baseline="0" noProof="0" dirty="0">
-                <a:ln>
-                  <a:noFill/>
-                </a:ln>
-                <a:gradFill>
-                  <a:gsLst>
-                    <a:gs pos="0">
-                      <a:srgbClr val="FFFFFF"/>
-                    </a:gs>
-                    <a:gs pos="100000">
-                      <a:srgbClr val="FFFFFF"/>
-                    </a:gs>
-                  </a:gsLst>
-                  <a:lin ang="5400000" scaled="0"/>
-                </a:gradFill>
-                <a:effectLst/>
-                <a:uLnTx/>
-                <a:uFillTx/>
-                <a:latin typeface="Segoe UI Light"/>
-                <a:ea typeface="Segoe UI" pitchFamily="34" charset="0"/>
-                <a:cs typeface="Segoe UI" pitchFamily="34" charset="0"/>
-              </a:rPr>
-              <a:t>PIPELINE</a:t>
-            </a:r>
-          </a:p>
-        </p:txBody>
-      </p:sp>
-      <p:sp>
-        <p:nvSpPr>
-          <p:cNvPr id="104" name="Rectangle 103">
-            <a:extLst>
-              <a:ext uri="{FF2B5EF4-FFF2-40B4-BE49-F238E27FC236}">
-                <a16:creationId xmlns:a16="http://schemas.microsoft.com/office/drawing/2014/main" id="{73DAE83E-EDA8-F94C-B4D7-6A4394E24EDF}"/>
-              </a:ext>
-            </a:extLst>
-          </p:cNvPr>
-          <p:cNvSpPr/>
-          <p:nvPr/>
-        </p:nvSpPr>
-        <p:spPr bwMode="auto">
-          <a:xfrm>
-            <a:off x="9901451" y="4272604"/>
-            <a:ext cx="1680961" cy="787277"/>
-          </a:xfrm>
-          <a:prstGeom prst="rect">
-            <a:avLst/>
-          </a:prstGeom>
-          <a:solidFill>
-            <a:srgbClr val="002060"/>
-          </a:solidFill>
-          <a:ln>
+            </a:prstGeom>
+            <a:ln w="9525" cap="flat" cmpd="sng" algn="ctr">
+              <a:solidFill>
+                <a:schemeClr val="accent6"/>
+              </a:solidFill>
+              <a:prstDash val="solid"/>
+              <a:round/>
+              <a:headEnd type="none" w="med" len="med"/>
+              <a:tailEnd type="arrow" w="med" len="med"/>
+            </a:ln>
+          </p:spPr>
+          <p:style>
+            <a:lnRef idx="0">
+              <a:scrgbClr r="0" g="0" b="0"/>
+            </a:lnRef>
+            <a:fillRef idx="0">
+              <a:scrgbClr r="0" g="0" b="0"/>
+            </a:fillRef>
+            <a:effectRef idx="0">
+              <a:scrgbClr r="0" g="0" b="0"/>
+            </a:effectRef>
+            <a:fontRef idx="minor">
+              <a:schemeClr val="tx1"/>
+            </a:fontRef>
+          </p:style>
+        </p:cxnSp>
+        <p:cxnSp>
+          <p:nvCxnSpPr>
+            <p:cNvPr id="97" name="Straight Arrow Connector 96">
+              <a:extLst>
+                <a:ext uri="{FF2B5EF4-FFF2-40B4-BE49-F238E27FC236}">
+                  <a16:creationId xmlns:a16="http://schemas.microsoft.com/office/drawing/2014/main" id="{BC4BAE5C-7CBB-2645-B693-B5918A80E60A}"/>
+                </a:ext>
+              </a:extLst>
+            </p:cNvPr>
+            <p:cNvCxnSpPr>
+              <a:cxnSpLocks/>
+              <a:stCxn id="101" idx="3"/>
+              <a:endCxn id="102" idx="1"/>
+            </p:cNvCxnSpPr>
+            <p:nvPr/>
+          </p:nvCxnSpPr>
+          <p:spPr>
+            <a:xfrm>
+              <a:off x="5142447" y="4666243"/>
+              <a:ext cx="465694" cy="0"/>
+            </a:xfrm>
+            <a:prstGeom prst="straightConnector1">
+              <a:avLst/>
+            </a:prstGeom>
+            <a:ln w="9525" cap="flat" cmpd="sng" algn="ctr">
+              <a:solidFill>
+                <a:schemeClr val="accent6"/>
+              </a:solidFill>
+              <a:prstDash val="solid"/>
+              <a:round/>
+              <a:headEnd type="none" w="med" len="med"/>
+              <a:tailEnd type="arrow" w="med" len="med"/>
+            </a:ln>
+          </p:spPr>
+          <p:style>
+            <a:lnRef idx="0">
+              <a:scrgbClr r="0" g="0" b="0"/>
+            </a:lnRef>
+            <a:fillRef idx="0">
+              <a:scrgbClr r="0" g="0" b="0"/>
+            </a:fillRef>
+            <a:effectRef idx="0">
+              <a:scrgbClr r="0" g="0" b="0"/>
+            </a:effectRef>
+            <a:fontRef idx="minor">
+              <a:schemeClr val="tx1"/>
+            </a:fontRef>
+          </p:style>
+        </p:cxnSp>
+        <p:cxnSp>
+          <p:nvCxnSpPr>
+            <p:cNvPr id="98" name="Straight Arrow Connector 97">
+              <a:extLst>
+                <a:ext uri="{FF2B5EF4-FFF2-40B4-BE49-F238E27FC236}">
+                  <a16:creationId xmlns:a16="http://schemas.microsoft.com/office/drawing/2014/main" id="{D0D3FAA1-451B-144B-A568-5F736357D4EC}"/>
+                </a:ext>
+              </a:extLst>
+            </p:cNvPr>
+            <p:cNvCxnSpPr>
+              <a:cxnSpLocks/>
+              <a:stCxn id="102" idx="3"/>
+              <a:endCxn id="103" idx="1"/>
+            </p:cNvCxnSpPr>
+            <p:nvPr/>
+          </p:nvCxnSpPr>
+          <p:spPr>
+            <a:xfrm>
+              <a:off x="7289102" y="4666243"/>
+              <a:ext cx="465694" cy="0"/>
+            </a:xfrm>
+            <a:prstGeom prst="straightConnector1">
+              <a:avLst/>
+            </a:prstGeom>
+            <a:ln w="9525" cap="flat" cmpd="sng" algn="ctr">
+              <a:solidFill>
+                <a:schemeClr val="accent6"/>
+              </a:solidFill>
+              <a:prstDash val="solid"/>
+              <a:round/>
+              <a:headEnd type="none" w="med" len="med"/>
+              <a:tailEnd type="arrow" w="med" len="med"/>
+            </a:ln>
+          </p:spPr>
+          <p:style>
+            <a:lnRef idx="0">
+              <a:scrgbClr r="0" g="0" b="0"/>
+            </a:lnRef>
+            <a:fillRef idx="0">
+              <a:scrgbClr r="0" g="0" b="0"/>
+            </a:fillRef>
+            <a:effectRef idx="0">
+              <a:scrgbClr r="0" g="0" b="0"/>
+            </a:effectRef>
+            <a:fontRef idx="minor">
+              <a:schemeClr val="tx1"/>
+            </a:fontRef>
+          </p:style>
+        </p:cxnSp>
+        <p:cxnSp>
+          <p:nvCxnSpPr>
+            <p:cNvPr id="99" name="Straight Arrow Connector 98">
+              <a:extLst>
+                <a:ext uri="{FF2B5EF4-FFF2-40B4-BE49-F238E27FC236}">
+                  <a16:creationId xmlns:a16="http://schemas.microsoft.com/office/drawing/2014/main" id="{30435B2B-6826-7842-B0FF-05D2012A05FD}"/>
+                </a:ext>
+              </a:extLst>
+            </p:cNvPr>
+            <p:cNvCxnSpPr>
+              <a:cxnSpLocks/>
+              <a:stCxn id="103" idx="3"/>
+              <a:endCxn id="104" idx="1"/>
+            </p:cNvCxnSpPr>
+            <p:nvPr/>
+          </p:nvCxnSpPr>
+          <p:spPr>
+            <a:xfrm>
+              <a:off x="9435757" y="4666243"/>
+              <a:ext cx="465694" cy="0"/>
+            </a:xfrm>
+            <a:prstGeom prst="straightConnector1">
+              <a:avLst/>
+            </a:prstGeom>
+            <a:ln w="9525" cap="flat" cmpd="sng" algn="ctr">
+              <a:solidFill>
+                <a:schemeClr val="accent6"/>
+              </a:solidFill>
+              <a:prstDash val="solid"/>
+              <a:round/>
+              <a:headEnd type="none" w="med" len="med"/>
+              <a:tailEnd type="arrow" w="med" len="med"/>
+            </a:ln>
+          </p:spPr>
+          <p:style>
+            <a:lnRef idx="0">
+              <a:scrgbClr r="0" g="0" b="0"/>
+            </a:lnRef>
+            <a:fillRef idx="0">
+              <a:scrgbClr r="0" g="0" b="0"/>
+            </a:fillRef>
+            <a:effectRef idx="0">
+              <a:scrgbClr r="0" g="0" b="0"/>
+            </a:effectRef>
+            <a:fontRef idx="minor">
+              <a:schemeClr val="tx1"/>
+            </a:fontRef>
+          </p:style>
+        </p:cxnSp>
+        <p:sp>
+          <p:nvSpPr>
+            <p:cNvPr id="100" name="Rectangle 99">
+              <a:extLst>
+                <a:ext uri="{FF2B5EF4-FFF2-40B4-BE49-F238E27FC236}">
+                  <a16:creationId xmlns:a16="http://schemas.microsoft.com/office/drawing/2014/main" id="{576729F6-E197-FA4C-8E9D-DCE4120B2FEE}"/>
+                </a:ext>
+              </a:extLst>
+            </p:cNvPr>
+            <p:cNvSpPr/>
+            <p:nvPr/>
+          </p:nvSpPr>
+          <p:spPr bwMode="auto">
+            <a:xfrm>
+              <a:off x="611564" y="4272604"/>
+              <a:ext cx="2384228" cy="787277"/>
+            </a:xfrm>
+            <a:prstGeom prst="rect">
+              <a:avLst/>
+            </a:prstGeom>
+            <a:solidFill>
+              <a:srgbClr val="002060"/>
+            </a:solidFill>
+            <a:ln>
+              <a:noFill/>
+              <a:headEnd type="none" w="med" len="med"/>
+              <a:tailEnd type="none" w="med" len="med"/>
+            </a:ln>
+            <a:effectLst/>
+          </p:spPr>
+          <p:style>
+            <a:lnRef idx="1">
+              <a:schemeClr val="accent2"/>
+            </a:lnRef>
+            <a:fillRef idx="3">
+              <a:schemeClr val="accent2"/>
+            </a:fillRef>
+            <a:effectRef idx="2">
+              <a:schemeClr val="accent2"/>
+            </a:effectRef>
+            <a:fontRef idx="minor">
+              <a:schemeClr val="lt1"/>
+            </a:fontRef>
+          </p:style>
+          <p:txBody>
+            <a:bodyPr rot="0" spcFirstLastPara="0" vertOverflow="overflow" horzOverflow="overflow" vert="horz" wrap="square" lIns="182857" tIns="146285" rIns="182857" bIns="146285" numCol="1" spcCol="0" rtlCol="0" fromWordArt="0" anchor="t" anchorCtr="0" forceAA="0" compatLnSpc="1">
+              <a:prstTxWarp prst="textNoShape">
+                <a:avLst/>
+              </a:prstTxWarp>
+              <a:noAutofit/>
+            </a:bodyPr>
+            <a:lstStyle/>
+            <a:p>
+              <a:pPr marL="0" marR="0" lvl="0" indent="0" algn="ctr" defTabSz="932021" rtl="0" eaLnBrk="1" fontAlgn="auto" latinLnBrk="0" hangingPunct="1">
+                <a:lnSpc>
+                  <a:spcPct val="90000"/>
+                </a:lnSpc>
+                <a:spcBef>
+                  <a:spcPts val="0"/>
+                </a:spcBef>
+                <a:spcAft>
+                  <a:spcPts val="0"/>
+                </a:spcAft>
+                <a:buClrTx/>
+                <a:buSzTx/>
+                <a:buFontTx/>
+                <a:buNone/>
+                <a:tabLst/>
+                <a:defRPr/>
+              </a:pPr>
+              <a:r>
+                <a:rPr kumimoji="0" lang="en-US" sz="1400" b="1" i="0" u="none" strike="noStrike" kern="0" cap="none" spc="0" normalizeH="0" baseline="0" noProof="0" dirty="0">
+                  <a:ln>
+                    <a:noFill/>
+                  </a:ln>
+                  <a:gradFill>
+                    <a:gsLst>
+                      <a:gs pos="0">
+                        <a:srgbClr val="FFFFFF"/>
+                      </a:gs>
+                      <a:gs pos="100000">
+                        <a:srgbClr val="FFFFFF"/>
+                      </a:gs>
+                    </a:gsLst>
+                    <a:lin ang="5400000" scaled="0"/>
+                  </a:gradFill>
+                  <a:effectLst/>
+                  <a:uLnTx/>
+                  <a:uFillTx/>
+                  <a:latin typeface="Segoe UI Light"/>
+                  <a:ea typeface="Segoe UI" pitchFamily="34" charset="0"/>
+                  <a:cs typeface="Segoe UI" pitchFamily="34" charset="0"/>
+                </a:rPr>
+                <a:t>SOURCE CONTROL</a:t>
+              </a:r>
+            </a:p>
+          </p:txBody>
+        </p:sp>
+        <p:sp>
+          <p:nvSpPr>
+            <p:cNvPr id="101" name="Rectangle 100">
+              <a:extLst>
+                <a:ext uri="{FF2B5EF4-FFF2-40B4-BE49-F238E27FC236}">
+                  <a16:creationId xmlns:a16="http://schemas.microsoft.com/office/drawing/2014/main" id="{6938DFFB-2E41-6B44-ABA0-FF6C35412EFF}"/>
+                </a:ext>
+              </a:extLst>
+            </p:cNvPr>
+            <p:cNvSpPr/>
+            <p:nvPr/>
+          </p:nvSpPr>
+          <p:spPr bwMode="auto">
+            <a:xfrm>
+              <a:off x="3461486" y="4272604"/>
+              <a:ext cx="1680961" cy="787277"/>
+            </a:xfrm>
+            <a:prstGeom prst="rect">
+              <a:avLst/>
+            </a:prstGeom>
+            <a:solidFill>
+              <a:srgbClr val="002060"/>
+            </a:solidFill>
+            <a:ln>
+              <a:noFill/>
+              <a:headEnd type="none" w="med" len="med"/>
+              <a:tailEnd type="none" w="med" len="med"/>
+            </a:ln>
+            <a:effectLst/>
+          </p:spPr>
+          <p:style>
+            <a:lnRef idx="1">
+              <a:schemeClr val="accent2"/>
+            </a:lnRef>
+            <a:fillRef idx="3">
+              <a:schemeClr val="accent2"/>
+            </a:fillRef>
+            <a:effectRef idx="2">
+              <a:schemeClr val="accent2"/>
+            </a:effectRef>
+            <a:fontRef idx="minor">
+              <a:schemeClr val="lt1"/>
+            </a:fontRef>
+          </p:style>
+          <p:txBody>
+            <a:bodyPr rot="0" spcFirstLastPara="0" vertOverflow="overflow" horzOverflow="overflow" vert="horz" wrap="square" lIns="182857" tIns="146285" rIns="182857" bIns="146285" numCol="1" spcCol="0" rtlCol="0" fromWordArt="0" anchor="t" anchorCtr="0" forceAA="0" compatLnSpc="1">
+              <a:prstTxWarp prst="textNoShape">
+                <a:avLst/>
+              </a:prstTxWarp>
+              <a:noAutofit/>
+            </a:bodyPr>
+            <a:lstStyle/>
+            <a:p>
+              <a:pPr marL="0" marR="0" lvl="0" indent="0" algn="ctr" defTabSz="932021" rtl="0" eaLnBrk="1" fontAlgn="auto" latinLnBrk="0" hangingPunct="1">
+                <a:lnSpc>
+                  <a:spcPct val="90000"/>
+                </a:lnSpc>
+                <a:spcBef>
+                  <a:spcPts val="0"/>
+                </a:spcBef>
+                <a:spcAft>
+                  <a:spcPts val="0"/>
+                </a:spcAft>
+                <a:buClrTx/>
+                <a:buSzTx/>
+                <a:buFontTx/>
+                <a:buNone/>
+                <a:tabLst/>
+                <a:defRPr/>
+              </a:pPr>
+              <a:r>
+                <a:rPr kumimoji="0" lang="en-US" sz="1400" b="1" i="0" u="none" strike="noStrike" kern="0" cap="none" spc="0" normalizeH="0" baseline="0" noProof="0" dirty="0">
+                  <a:ln>
+                    <a:noFill/>
+                  </a:ln>
+                  <a:gradFill>
+                    <a:gsLst>
+                      <a:gs pos="0">
+                        <a:srgbClr val="FFFFFF"/>
+                      </a:gs>
+                      <a:gs pos="100000">
+                        <a:srgbClr val="FFFFFF"/>
+                      </a:gs>
+                    </a:gsLst>
+                    <a:lin ang="5400000" scaled="0"/>
+                  </a:gradFill>
+                  <a:effectLst/>
+                  <a:uLnTx/>
+                  <a:uFillTx/>
+                  <a:latin typeface="Segoe UI Light"/>
+                  <a:ea typeface="Segoe UI" pitchFamily="34" charset="0"/>
+                  <a:cs typeface="Segoe UI" pitchFamily="34" charset="0"/>
+                </a:rPr>
+                <a:t>CI</a:t>
+              </a:r>
+            </a:p>
+          </p:txBody>
+        </p:sp>
+        <p:sp>
+          <p:nvSpPr>
+            <p:cNvPr id="102" name="Rectangle 101">
+              <a:extLst>
+                <a:ext uri="{FF2B5EF4-FFF2-40B4-BE49-F238E27FC236}">
+                  <a16:creationId xmlns:a16="http://schemas.microsoft.com/office/drawing/2014/main" id="{79C21FAA-E266-0745-A345-C8F9B36EE244}"/>
+                </a:ext>
+              </a:extLst>
+            </p:cNvPr>
+            <p:cNvSpPr/>
+            <p:nvPr/>
+          </p:nvSpPr>
+          <p:spPr bwMode="auto">
+            <a:xfrm>
+              <a:off x="5608141" y="4272604"/>
+              <a:ext cx="1680961" cy="787277"/>
+            </a:xfrm>
+            <a:prstGeom prst="rect">
+              <a:avLst/>
+            </a:prstGeom>
+            <a:solidFill>
+              <a:srgbClr val="002060"/>
+            </a:solidFill>
+            <a:ln>
+              <a:noFill/>
+              <a:headEnd type="none" w="med" len="med"/>
+              <a:tailEnd type="none" w="med" len="med"/>
+            </a:ln>
+            <a:effectLst/>
+          </p:spPr>
+          <p:style>
+            <a:lnRef idx="1">
+              <a:schemeClr val="accent2"/>
+            </a:lnRef>
+            <a:fillRef idx="3">
+              <a:schemeClr val="accent2"/>
+            </a:fillRef>
+            <a:effectRef idx="2">
+              <a:schemeClr val="accent2"/>
+            </a:effectRef>
+            <a:fontRef idx="minor">
+              <a:schemeClr val="lt1"/>
+            </a:fontRef>
+          </p:style>
+          <p:txBody>
+            <a:bodyPr rot="0" spcFirstLastPara="0" vertOverflow="overflow" horzOverflow="overflow" vert="horz" wrap="square" lIns="182857" tIns="146285" rIns="182857" bIns="146285" numCol="1" spcCol="0" rtlCol="0" fromWordArt="0" anchor="t" anchorCtr="0" forceAA="0" compatLnSpc="1">
+              <a:prstTxWarp prst="textNoShape">
+                <a:avLst/>
+              </a:prstTxWarp>
+              <a:noAutofit/>
+            </a:bodyPr>
+            <a:lstStyle/>
+            <a:p>
+              <a:pPr marL="0" marR="0" lvl="0" indent="0" algn="ctr" defTabSz="932021" rtl="0" eaLnBrk="1" fontAlgn="auto" latinLnBrk="0" hangingPunct="1">
+                <a:lnSpc>
+                  <a:spcPct val="90000"/>
+                </a:lnSpc>
+                <a:spcBef>
+                  <a:spcPts val="0"/>
+                </a:spcBef>
+                <a:spcAft>
+                  <a:spcPts val="0"/>
+                </a:spcAft>
+                <a:buClrTx/>
+                <a:buSzTx/>
+                <a:buFontTx/>
+                <a:buNone/>
+                <a:tabLst/>
+                <a:defRPr/>
+              </a:pPr>
+              <a:r>
+                <a:rPr kumimoji="0" lang="en-US" sz="1400" b="1" i="0" u="none" strike="noStrike" kern="0" cap="none" spc="0" normalizeH="0" baseline="0" noProof="0" dirty="0">
+                  <a:ln>
+                    <a:noFill/>
+                  </a:ln>
+                  <a:gradFill>
+                    <a:gsLst>
+                      <a:gs pos="0">
+                        <a:srgbClr val="FFFFFF"/>
+                      </a:gs>
+                      <a:gs pos="100000">
+                        <a:srgbClr val="FFFFFF"/>
+                      </a:gs>
+                    </a:gsLst>
+                    <a:lin ang="5400000" scaled="0"/>
+                  </a:gradFill>
+                  <a:effectLst/>
+                  <a:uLnTx/>
+                  <a:uFillTx/>
+                  <a:latin typeface="Segoe UI Light"/>
+                  <a:ea typeface="Segoe UI" pitchFamily="34" charset="0"/>
+                  <a:cs typeface="Segoe UI" pitchFamily="34" charset="0"/>
+                </a:rPr>
+                <a:t>PACKAGE</a:t>
+              </a:r>
+            </a:p>
+          </p:txBody>
+        </p:sp>
+        <p:sp>
+          <p:nvSpPr>
+            <p:cNvPr id="103" name="Rectangle 102">
+              <a:extLst>
+                <a:ext uri="{FF2B5EF4-FFF2-40B4-BE49-F238E27FC236}">
+                  <a16:creationId xmlns:a16="http://schemas.microsoft.com/office/drawing/2014/main" id="{C43ED478-8C63-4543-93C0-28F25717B8CF}"/>
+                </a:ext>
+              </a:extLst>
+            </p:cNvPr>
+            <p:cNvSpPr/>
+            <p:nvPr/>
+          </p:nvSpPr>
+          <p:spPr bwMode="auto">
+            <a:xfrm>
+              <a:off x="7754796" y="4272604"/>
+              <a:ext cx="1680961" cy="787277"/>
+            </a:xfrm>
+            <a:prstGeom prst="rect">
+              <a:avLst/>
+            </a:prstGeom>
+            <a:solidFill>
+              <a:srgbClr val="002060"/>
+            </a:solidFill>
+            <a:ln>
+              <a:noFill/>
+              <a:headEnd type="none" w="med" len="med"/>
+              <a:tailEnd type="none" w="med" len="med"/>
+            </a:ln>
+            <a:effectLst/>
+          </p:spPr>
+          <p:style>
+            <a:lnRef idx="1">
+              <a:schemeClr val="accent2"/>
+            </a:lnRef>
+            <a:fillRef idx="3">
+              <a:schemeClr val="accent2"/>
+            </a:fillRef>
+            <a:effectRef idx="2">
+              <a:schemeClr val="accent2"/>
+            </a:effectRef>
+            <a:fontRef idx="minor">
+              <a:schemeClr val="lt1"/>
+            </a:fontRef>
+          </p:style>
+          <p:txBody>
+            <a:bodyPr rot="0" spcFirstLastPara="0" vertOverflow="overflow" horzOverflow="overflow" vert="horz" wrap="square" lIns="182857" tIns="146285" rIns="182857" bIns="146285" numCol="1" spcCol="0" rtlCol="0" fromWordArt="0" anchor="t" anchorCtr="0" forceAA="0" compatLnSpc="1">
+              <a:prstTxWarp prst="textNoShape">
+                <a:avLst/>
+              </a:prstTxWarp>
+              <a:noAutofit/>
+            </a:bodyPr>
+            <a:lstStyle/>
+            <a:p>
+              <a:pPr marL="0" marR="0" lvl="0" indent="0" algn="ctr" defTabSz="932021" rtl="0" eaLnBrk="1" fontAlgn="auto" latinLnBrk="0" hangingPunct="1">
+                <a:lnSpc>
+                  <a:spcPct val="90000"/>
+                </a:lnSpc>
+                <a:spcBef>
+                  <a:spcPts val="0"/>
+                </a:spcBef>
+                <a:spcAft>
+                  <a:spcPts val="0"/>
+                </a:spcAft>
+                <a:buClrTx/>
+                <a:buSzTx/>
+                <a:buFontTx/>
+                <a:buNone/>
+                <a:tabLst/>
+                <a:defRPr/>
+              </a:pPr>
+              <a:r>
+                <a:rPr kumimoji="0" lang="en-US" sz="1400" b="1" i="0" u="none" strike="noStrike" kern="0" cap="none" spc="0" normalizeH="0" baseline="0" noProof="0" dirty="0">
+                  <a:ln>
+                    <a:noFill/>
+                  </a:ln>
+                  <a:gradFill>
+                    <a:gsLst>
+                      <a:gs pos="0">
+                        <a:srgbClr val="FFFFFF"/>
+                      </a:gs>
+                      <a:gs pos="100000">
+                        <a:srgbClr val="FFFFFF"/>
+                      </a:gs>
+                    </a:gsLst>
+                    <a:lin ang="5400000" scaled="0"/>
+                  </a:gradFill>
+                  <a:effectLst/>
+                  <a:uLnTx/>
+                  <a:uFillTx/>
+                  <a:latin typeface="Segoe UI Light"/>
+                  <a:ea typeface="Segoe UI" pitchFamily="34" charset="0"/>
+                  <a:cs typeface="Segoe UI" pitchFamily="34" charset="0"/>
+                </a:rPr>
+                <a:t>PIPELINE</a:t>
+              </a:r>
+            </a:p>
+          </p:txBody>
+        </p:sp>
+        <p:sp>
+          <p:nvSpPr>
+            <p:cNvPr id="104" name="Rectangle 103">
+              <a:extLst>
+                <a:ext uri="{FF2B5EF4-FFF2-40B4-BE49-F238E27FC236}">
+                  <a16:creationId xmlns:a16="http://schemas.microsoft.com/office/drawing/2014/main" id="{73DAE83E-EDA8-F94C-B4D7-6A4394E24EDF}"/>
+                </a:ext>
+              </a:extLst>
+            </p:cNvPr>
+            <p:cNvSpPr/>
+            <p:nvPr/>
+          </p:nvSpPr>
+          <p:spPr bwMode="auto">
+            <a:xfrm>
+              <a:off x="9901451" y="4272604"/>
+              <a:ext cx="1680961" cy="787277"/>
+            </a:xfrm>
+            <a:prstGeom prst="rect">
+              <a:avLst/>
+            </a:prstGeom>
+            <a:solidFill>
+              <a:srgbClr val="002060"/>
+            </a:solidFill>
+            <a:ln>
+              <a:noFill/>
+              <a:headEnd type="none" w="med" len="med"/>
+              <a:tailEnd type="none" w="med" len="med"/>
+            </a:ln>
+            <a:effectLst/>
+          </p:spPr>
+          <p:style>
+            <a:lnRef idx="1">
+              <a:schemeClr val="accent2"/>
+            </a:lnRef>
+            <a:fillRef idx="3">
+              <a:schemeClr val="accent2"/>
+            </a:fillRef>
+            <a:effectRef idx="2">
+              <a:schemeClr val="accent2"/>
+            </a:effectRef>
+            <a:fontRef idx="minor">
+              <a:schemeClr val="lt1"/>
+            </a:fontRef>
+          </p:style>
+          <p:txBody>
+            <a:bodyPr rot="0" spcFirstLastPara="0" vertOverflow="overflow" horzOverflow="overflow" vert="horz" wrap="square" lIns="182857" tIns="146285" rIns="182857" bIns="146285" numCol="1" spcCol="0" rtlCol="0" fromWordArt="0" anchor="t" anchorCtr="0" forceAA="0" compatLnSpc="1">
+              <a:prstTxWarp prst="textNoShape">
+                <a:avLst/>
+              </a:prstTxWarp>
+              <a:noAutofit/>
+            </a:bodyPr>
+            <a:lstStyle/>
+            <a:p>
+              <a:pPr marL="0" marR="0" lvl="0" indent="0" algn="ctr" defTabSz="932021" rtl="0" eaLnBrk="1" fontAlgn="auto" latinLnBrk="0" hangingPunct="1">
+                <a:lnSpc>
+                  <a:spcPct val="90000"/>
+                </a:lnSpc>
+                <a:spcBef>
+                  <a:spcPts val="0"/>
+                </a:spcBef>
+                <a:spcAft>
+                  <a:spcPts val="0"/>
+                </a:spcAft>
+                <a:buClrTx/>
+                <a:buSzTx/>
+                <a:buFontTx/>
+                <a:buNone/>
+                <a:tabLst/>
+                <a:defRPr/>
+              </a:pPr>
+              <a:r>
+                <a:rPr kumimoji="0" lang="en-US" sz="1400" b="1" i="0" u="none" strike="noStrike" kern="0" cap="none" spc="0" normalizeH="0" baseline="0" noProof="0" dirty="0">
+                  <a:ln>
+                    <a:noFill/>
+                  </a:ln>
+                  <a:gradFill>
+                    <a:gsLst>
+                      <a:gs pos="0">
+                        <a:srgbClr val="FFFFFF"/>
+                      </a:gs>
+                      <a:gs pos="100000">
+                        <a:srgbClr val="FFFFFF"/>
+                      </a:gs>
+                    </a:gsLst>
+                    <a:lin ang="5400000" scaled="0"/>
+                  </a:gradFill>
+                  <a:effectLst/>
+                  <a:uLnTx/>
+                  <a:uFillTx/>
+                  <a:latin typeface="Segoe UI Light"/>
+                  <a:ea typeface="Segoe UI" pitchFamily="34" charset="0"/>
+                  <a:cs typeface="Segoe UI" pitchFamily="34" charset="0"/>
+                </a:rPr>
+                <a:t>DEPLOYMENT</a:t>
+              </a:r>
+            </a:p>
+          </p:txBody>
+        </p:sp>
+        <p:pic>
+          <p:nvPicPr>
+            <p:cNvPr id="105" name="Picture 104">
+              <a:extLst>
+                <a:ext uri="{FF2B5EF4-FFF2-40B4-BE49-F238E27FC236}">
+                  <a16:creationId xmlns:a16="http://schemas.microsoft.com/office/drawing/2014/main" id="{BCB726B6-7291-E342-8FD5-DEED6C776B1A}"/>
+                </a:ext>
+              </a:extLst>
+            </p:cNvPr>
+            <p:cNvPicPr>
+              <a:picLocks noChangeAspect="1"/>
+            </p:cNvPicPr>
+            <p:nvPr/>
+          </p:nvPicPr>
+          <p:blipFill>
+            <a:blip r:embed="rId5"/>
+            <a:stretch>
+              <a:fillRect/>
+            </a:stretch>
+          </p:blipFill>
+          <p:spPr>
+            <a:xfrm>
+              <a:off x="598356" y="2604806"/>
+              <a:ext cx="508000" cy="508000"/>
+            </a:xfrm>
+            <a:prstGeom prst="rect">
+              <a:avLst/>
+            </a:prstGeom>
+          </p:spPr>
+        </p:pic>
+        <p:pic>
+          <p:nvPicPr>
+            <p:cNvPr id="107" name="Graphic 106">
+              <a:extLst>
+                <a:ext uri="{FF2B5EF4-FFF2-40B4-BE49-F238E27FC236}">
+                  <a16:creationId xmlns:a16="http://schemas.microsoft.com/office/drawing/2014/main" id="{BD091D20-4BD0-E144-881E-CFF31FBF5AE4}"/>
+                </a:ext>
+              </a:extLst>
+            </p:cNvPr>
+            <p:cNvPicPr>
+              <a:picLocks noChangeAspect="1"/>
+            </p:cNvPicPr>
+            <p:nvPr/>
+          </p:nvPicPr>
+          <p:blipFill>
+            <a:blip r:embed="rId6">
+              <a:extLst>
+                <a:ext uri="{28A0092B-C50C-407E-A947-70E740481C1C}">
+                  <a14:useLocalDpi xmlns:a14="http://schemas.microsoft.com/office/drawing/2010/main" val="0"/>
+                </a:ext>
+                <a:ext uri="{96DAC541-7B7A-43D3-8B79-37D633B846F1}">
+                  <asvg:svgBlip xmlns:asvg="http://schemas.microsoft.com/office/drawing/2016/SVG/main" r:embed="rId7"/>
+                </a:ext>
+              </a:extLst>
+            </a:blip>
+            <a:stretch>
+              <a:fillRect/>
+            </a:stretch>
+          </p:blipFill>
+          <p:spPr>
+            <a:xfrm>
+              <a:off x="6219910" y="3212940"/>
+              <a:ext cx="414427" cy="560036"/>
+            </a:xfrm>
+            <a:prstGeom prst="rect">
+              <a:avLst/>
+            </a:prstGeom>
+          </p:spPr>
+        </p:pic>
+        <p:sp>
+          <p:nvSpPr>
+            <p:cNvPr id="108" name="TextBox 107">
+              <a:extLst>
+                <a:ext uri="{FF2B5EF4-FFF2-40B4-BE49-F238E27FC236}">
+                  <a16:creationId xmlns:a16="http://schemas.microsoft.com/office/drawing/2014/main" id="{3EAE9738-6906-6E41-8021-F437458C873A}"/>
+                </a:ext>
+              </a:extLst>
+            </p:cNvPr>
+            <p:cNvSpPr txBox="1"/>
+            <p:nvPr/>
+          </p:nvSpPr>
+          <p:spPr>
+            <a:xfrm>
+              <a:off x="1222391" y="1972801"/>
+              <a:ext cx="4363720" cy="400110"/>
+            </a:xfrm>
+            <a:prstGeom prst="rect">
+              <a:avLst/>
+            </a:prstGeom>
             <a:noFill/>
-            <a:headEnd type="none" w="med" len="med"/>
-            <a:tailEnd type="none" w="med" len="med"/>
-          </a:ln>
-          <a:effectLst/>
-        </p:spPr>
-        <p:style>
-          <a:lnRef idx="1">
-            <a:schemeClr val="accent2"/>
-          </a:lnRef>
-          <a:fillRef idx="3">
-            <a:schemeClr val="accent2"/>
-          </a:fillRef>
-          <a:effectRef idx="2">
-            <a:schemeClr val="accent2"/>
-          </a:effectRef>
-          <a:fontRef idx="minor">
-            <a:schemeClr val="lt1"/>
-          </a:fontRef>
-        </p:style>
-        <p:txBody>
-          <a:bodyPr rot="0" spcFirstLastPara="0" vertOverflow="overflow" horzOverflow="overflow" vert="horz" wrap="square" lIns="182857" tIns="146285" rIns="182857" bIns="146285" numCol="1" spcCol="0" rtlCol="0" fromWordArt="0" anchor="t" anchorCtr="0" forceAA="0" compatLnSpc="1">
-            <a:prstTxWarp prst="textNoShape">
+          </p:spPr>
+          <p:txBody>
+            <a:bodyPr wrap="square" rtlCol="0">
+              <a:spAutoFit/>
+            </a:bodyPr>
+            <a:lstStyle/>
+            <a:p>
+              <a:r>
+                <a:rPr lang="en-US" sz="2000" dirty="0">
+                  <a:solidFill>
+                    <a:schemeClr val="bg1"/>
+                  </a:solidFill>
+                </a:rPr>
+                <a:t>Azure DevOps</a:t>
+              </a:r>
+            </a:p>
+          </p:txBody>
+        </p:sp>
+        <p:sp>
+          <p:nvSpPr>
+            <p:cNvPr id="109" name="TextBox 108">
+              <a:extLst>
+                <a:ext uri="{FF2B5EF4-FFF2-40B4-BE49-F238E27FC236}">
+                  <a16:creationId xmlns:a16="http://schemas.microsoft.com/office/drawing/2014/main" id="{FABC9352-B884-EF47-956D-E75340C7ABB0}"/>
+                </a:ext>
+              </a:extLst>
+            </p:cNvPr>
+            <p:cNvSpPr txBox="1"/>
+            <p:nvPr/>
+          </p:nvSpPr>
+          <p:spPr>
+            <a:xfrm>
+              <a:off x="1242711" y="2631699"/>
+              <a:ext cx="4807265" cy="400110"/>
+            </a:xfrm>
+            <a:prstGeom prst="rect">
               <a:avLst/>
-            </a:prstTxWarp>
-            <a:noAutofit/>
-          </a:bodyPr>
-          <a:lstStyle/>
-          <a:p>
-            <a:pPr marL="0" marR="0" lvl="0" indent="0" algn="ctr" defTabSz="932021" rtl="0" eaLnBrk="1" fontAlgn="auto" latinLnBrk="0" hangingPunct="1">
-              <a:lnSpc>
-                <a:spcPct val="90000"/>
-              </a:lnSpc>
-              <a:spcBef>
-                <a:spcPts val="0"/>
-              </a:spcBef>
-              <a:spcAft>
-                <a:spcPts val="0"/>
-              </a:spcAft>
-              <a:buClrTx/>
-              <a:buSzTx/>
-              <a:buFontTx/>
-              <a:buNone/>
-              <a:tabLst/>
-              <a:defRPr/>
-            </a:pPr>
-            <a:r>
-              <a:rPr kumimoji="0" lang="en-US" sz="1400" b="1" i="0" u="none" strike="noStrike" kern="0" cap="none" spc="0" normalizeH="0" baseline="0" noProof="0" dirty="0">
-                <a:ln>
-                  <a:noFill/>
-                </a:ln>
-                <a:gradFill>
-                  <a:gsLst>
-                    <a:gs pos="0">
-                      <a:srgbClr val="FFFFFF"/>
-                    </a:gs>
-                    <a:gs pos="100000">
-                      <a:srgbClr val="FFFFFF"/>
-                    </a:gs>
-                  </a:gsLst>
-                  <a:lin ang="5400000" scaled="0"/>
-                </a:gradFill>
-                <a:effectLst/>
-                <a:uLnTx/>
-                <a:uFillTx/>
-                <a:latin typeface="Segoe UI Light"/>
-                <a:ea typeface="Segoe UI" pitchFamily="34" charset="0"/>
-                <a:cs typeface="Segoe UI" pitchFamily="34" charset="0"/>
-              </a:rPr>
-              <a:t>DEPLOYMENT</a:t>
-            </a:r>
-          </a:p>
-        </p:txBody>
-      </p:sp>
-      <p:pic>
-        <p:nvPicPr>
-          <p:cNvPr id="105" name="Picture 104">
-            <a:extLst>
-              <a:ext uri="{FF2B5EF4-FFF2-40B4-BE49-F238E27FC236}">
-                <a16:creationId xmlns:a16="http://schemas.microsoft.com/office/drawing/2014/main" id="{BCB726B6-7291-E342-8FD5-DEED6C776B1A}"/>
-              </a:ext>
-            </a:extLst>
-          </p:cNvPr>
-          <p:cNvPicPr>
-            <a:picLocks noChangeAspect="1"/>
-          </p:cNvPicPr>
-          <p:nvPr/>
-        </p:nvPicPr>
-        <p:blipFill>
-          <a:blip r:embed="rId5"/>
-          <a:stretch>
-            <a:fillRect/>
-          </a:stretch>
-        </p:blipFill>
-        <p:spPr>
-          <a:xfrm>
-            <a:off x="598356" y="2604806"/>
-            <a:ext cx="508000" cy="508000"/>
-          </a:xfrm>
-          <a:prstGeom prst="rect">
-            <a:avLst/>
-          </a:prstGeom>
-        </p:spPr>
-      </p:pic>
-      <p:pic>
-        <p:nvPicPr>
-          <p:cNvPr id="106" name="Picture 105">
-            <a:extLst>
-              <a:ext uri="{FF2B5EF4-FFF2-40B4-BE49-F238E27FC236}">
-                <a16:creationId xmlns:a16="http://schemas.microsoft.com/office/drawing/2014/main" id="{AE06475A-4E4E-A942-AA53-7ABC22F78264}"/>
-              </a:ext>
-            </a:extLst>
-          </p:cNvPr>
-          <p:cNvPicPr>
-            <a:picLocks noChangeAspect="1"/>
-          </p:cNvPicPr>
-          <p:nvPr/>
-        </p:nvPicPr>
-        <p:blipFill>
-          <a:blip r:embed="rId6"/>
-          <a:stretch>
-            <a:fillRect/>
-          </a:stretch>
-        </p:blipFill>
-        <p:spPr>
-          <a:xfrm>
-            <a:off x="596740" y="1949030"/>
-            <a:ext cx="508000" cy="508000"/>
-          </a:xfrm>
-          <a:prstGeom prst="rect">
-            <a:avLst/>
-          </a:prstGeom>
-        </p:spPr>
-      </p:pic>
-      <p:pic>
-        <p:nvPicPr>
-          <p:cNvPr id="107" name="Graphic 106">
-            <a:extLst>
-              <a:ext uri="{FF2B5EF4-FFF2-40B4-BE49-F238E27FC236}">
-                <a16:creationId xmlns:a16="http://schemas.microsoft.com/office/drawing/2014/main" id="{BD091D20-4BD0-E144-881E-CFF31FBF5AE4}"/>
-              </a:ext>
-            </a:extLst>
-          </p:cNvPr>
-          <p:cNvPicPr>
-            <a:picLocks noChangeAspect="1"/>
-          </p:cNvPicPr>
-          <p:nvPr/>
-        </p:nvPicPr>
-        <p:blipFill>
-          <a:blip r:embed="rId7">
-            <a:extLst>
-              <a:ext uri="{28A0092B-C50C-407E-A947-70E740481C1C}">
-                <a14:useLocalDpi xmlns:a14="http://schemas.microsoft.com/office/drawing/2010/main" val="0"/>
-              </a:ext>
-              <a:ext uri="{96DAC541-7B7A-43D3-8B79-37D633B846F1}">
-                <asvg:svgBlip xmlns:asvg="http://schemas.microsoft.com/office/drawing/2016/SVG/main" r:embed="rId8"/>
-              </a:ext>
-            </a:extLst>
-          </a:blip>
-          <a:stretch>
-            <a:fillRect/>
-          </a:stretch>
-        </p:blipFill>
-        <p:spPr>
-          <a:xfrm>
-            <a:off x="6219910" y="3212940"/>
-            <a:ext cx="414427" cy="560036"/>
-          </a:xfrm>
-          <a:prstGeom prst="rect">
-            <a:avLst/>
-          </a:prstGeom>
-        </p:spPr>
-      </p:pic>
-      <p:sp>
-        <p:nvSpPr>
-          <p:cNvPr id="108" name="TextBox 107">
-            <a:extLst>
-              <a:ext uri="{FF2B5EF4-FFF2-40B4-BE49-F238E27FC236}">
-                <a16:creationId xmlns:a16="http://schemas.microsoft.com/office/drawing/2014/main" id="{3EAE9738-6906-6E41-8021-F437458C873A}"/>
-              </a:ext>
-            </a:extLst>
-          </p:cNvPr>
-          <p:cNvSpPr txBox="1"/>
-          <p:nvPr/>
-        </p:nvSpPr>
-        <p:spPr>
-          <a:xfrm>
-            <a:off x="1222391" y="1972801"/>
-            <a:ext cx="4363720" cy="400110"/>
-          </a:xfrm>
-          <a:prstGeom prst="rect">
-            <a:avLst/>
-          </a:prstGeom>
-          <a:noFill/>
-        </p:spPr>
-        <p:txBody>
-          <a:bodyPr wrap="square" rtlCol="0">
-            <a:spAutoFit/>
-          </a:bodyPr>
-          <a:lstStyle/>
-          <a:p>
-            <a:r>
-              <a:rPr lang="en-US" sz="2000" dirty="0">
-                <a:solidFill>
-                  <a:schemeClr val="bg1"/>
-                </a:solidFill>
-              </a:rPr>
-              <a:t>Azure DevOps</a:t>
-            </a:r>
-          </a:p>
-        </p:txBody>
-      </p:sp>
-      <p:sp>
-        <p:nvSpPr>
-          <p:cNvPr id="109" name="TextBox 108">
-            <a:extLst>
-              <a:ext uri="{FF2B5EF4-FFF2-40B4-BE49-F238E27FC236}">
-                <a16:creationId xmlns:a16="http://schemas.microsoft.com/office/drawing/2014/main" id="{FABC9352-B884-EF47-956D-E75340C7ABB0}"/>
-              </a:ext>
-            </a:extLst>
-          </p:cNvPr>
-          <p:cNvSpPr txBox="1"/>
-          <p:nvPr/>
-        </p:nvSpPr>
-        <p:spPr>
-          <a:xfrm>
-            <a:off x="1242711" y="2631699"/>
-            <a:ext cx="4807265" cy="400110"/>
-          </a:xfrm>
-          <a:prstGeom prst="rect">
-            <a:avLst/>
-          </a:prstGeom>
-          <a:noFill/>
-        </p:spPr>
-        <p:txBody>
-          <a:bodyPr wrap="square" rtlCol="0">
-            <a:spAutoFit/>
-          </a:bodyPr>
-          <a:lstStyle/>
-          <a:p>
-            <a:r>
-              <a:rPr lang="en-US" sz="2000" dirty="0">
-                <a:solidFill>
-                  <a:schemeClr val="bg1"/>
-                </a:solidFill>
-              </a:rPr>
-              <a:t>Azure Repos</a:t>
-            </a:r>
-          </a:p>
-        </p:txBody>
-      </p:sp>
-      <p:sp>
-        <p:nvSpPr>
-          <p:cNvPr id="110" name="TextBox 109">
-            <a:extLst>
-              <a:ext uri="{FF2B5EF4-FFF2-40B4-BE49-F238E27FC236}">
-                <a16:creationId xmlns:a16="http://schemas.microsoft.com/office/drawing/2014/main" id="{D4029EF5-23B2-744F-A2BC-B83DCEF141EF}"/>
-              </a:ext>
-            </a:extLst>
-          </p:cNvPr>
-          <p:cNvSpPr txBox="1"/>
-          <p:nvPr/>
-        </p:nvSpPr>
-        <p:spPr>
-          <a:xfrm>
-            <a:off x="1242711" y="3302581"/>
-            <a:ext cx="5725280" cy="400110"/>
-          </a:xfrm>
-          <a:prstGeom prst="rect">
-            <a:avLst/>
-          </a:prstGeom>
-          <a:noFill/>
-        </p:spPr>
-        <p:txBody>
-          <a:bodyPr wrap="square" rtlCol="0">
-            <a:spAutoFit/>
-          </a:bodyPr>
-          <a:lstStyle/>
-          <a:p>
-            <a:r>
-              <a:rPr lang="en-US" sz="2000" dirty="0">
-                <a:solidFill>
-                  <a:schemeClr val="bg1"/>
-                </a:solidFill>
-              </a:rPr>
-              <a:t>Azure DevOps with GitHub</a:t>
-            </a:r>
-          </a:p>
-        </p:txBody>
-      </p:sp>
-      <p:sp>
-        <p:nvSpPr>
-          <p:cNvPr id="111" name="TextBox 110">
-            <a:extLst>
-              <a:ext uri="{FF2B5EF4-FFF2-40B4-BE49-F238E27FC236}">
-                <a16:creationId xmlns:a16="http://schemas.microsoft.com/office/drawing/2014/main" id="{2F698E33-5102-3148-A2C2-2A079B5994E1}"/>
-              </a:ext>
-            </a:extLst>
-          </p:cNvPr>
-          <p:cNvSpPr txBox="1"/>
-          <p:nvPr/>
-        </p:nvSpPr>
-        <p:spPr>
-          <a:xfrm>
-            <a:off x="6850380" y="2637437"/>
-            <a:ext cx="5725280" cy="400110"/>
-          </a:xfrm>
-          <a:prstGeom prst="rect">
-            <a:avLst/>
-          </a:prstGeom>
-          <a:noFill/>
-        </p:spPr>
-        <p:txBody>
-          <a:bodyPr wrap="square" rtlCol="0">
-            <a:spAutoFit/>
-          </a:bodyPr>
-          <a:lstStyle/>
-          <a:p>
-            <a:r>
-              <a:rPr lang="en-US" sz="2000" dirty="0">
-                <a:solidFill>
-                  <a:schemeClr val="bg1"/>
-                </a:solidFill>
-              </a:rPr>
-              <a:t>Azure Web Apps</a:t>
-            </a:r>
-          </a:p>
-        </p:txBody>
-      </p:sp>
-      <p:sp>
-        <p:nvSpPr>
-          <p:cNvPr id="112" name="TextBox 111">
-            <a:extLst>
-              <a:ext uri="{FF2B5EF4-FFF2-40B4-BE49-F238E27FC236}">
-                <a16:creationId xmlns:a16="http://schemas.microsoft.com/office/drawing/2014/main" id="{8B5B08B5-E947-C444-BF2A-F0C66BCCCC14}"/>
-              </a:ext>
-            </a:extLst>
-          </p:cNvPr>
-          <p:cNvSpPr txBox="1"/>
-          <p:nvPr/>
-        </p:nvSpPr>
-        <p:spPr>
-          <a:xfrm>
-            <a:off x="6850380" y="3302581"/>
-            <a:ext cx="5725280" cy="400110"/>
-          </a:xfrm>
-          <a:prstGeom prst="rect">
-            <a:avLst/>
-          </a:prstGeom>
-          <a:noFill/>
-        </p:spPr>
-        <p:txBody>
-          <a:bodyPr wrap="square" rtlCol="0">
-            <a:spAutoFit/>
-          </a:bodyPr>
-          <a:lstStyle/>
-          <a:p>
-            <a:r>
-              <a:rPr lang="en-US" sz="2000" dirty="0">
-                <a:solidFill>
-                  <a:schemeClr val="bg1"/>
-                </a:solidFill>
-              </a:rPr>
-              <a:t>Azure PostreSQL Database</a:t>
-            </a:r>
-          </a:p>
-        </p:txBody>
-      </p:sp>
-      <p:pic>
-        <p:nvPicPr>
-          <p:cNvPr id="5" name="Picture 4">
-            <a:extLst>
-              <a:ext uri="{FF2B5EF4-FFF2-40B4-BE49-F238E27FC236}">
-                <a16:creationId xmlns:a16="http://schemas.microsoft.com/office/drawing/2014/main" id="{20F4A304-3D88-48B1-86B1-09A467C36F9E}"/>
-              </a:ext>
-            </a:extLst>
-          </p:cNvPr>
-          <p:cNvPicPr>
-            <a:picLocks noChangeAspect="1"/>
-          </p:cNvPicPr>
-          <p:nvPr/>
-        </p:nvPicPr>
-        <p:blipFill>
-          <a:blip r:embed="rId9"/>
-          <a:stretch>
-            <a:fillRect/>
-          </a:stretch>
-        </p:blipFill>
-        <p:spPr>
-          <a:xfrm>
-            <a:off x="6184618" y="3212940"/>
-            <a:ext cx="482855" cy="616327"/>
-          </a:xfrm>
-          <a:prstGeom prst="rect">
-            <a:avLst/>
-          </a:prstGeom>
-        </p:spPr>
-      </p:pic>
+            </a:prstGeom>
+            <a:noFill/>
+          </p:spPr>
+          <p:txBody>
+            <a:bodyPr wrap="square" rtlCol="0">
+              <a:spAutoFit/>
+            </a:bodyPr>
+            <a:lstStyle/>
+            <a:p>
+              <a:r>
+                <a:rPr lang="en-US" sz="2000" dirty="0">
+                  <a:solidFill>
+                    <a:schemeClr val="bg1"/>
+                  </a:solidFill>
+                </a:rPr>
+                <a:t>Azure Repos</a:t>
+              </a:r>
+            </a:p>
+          </p:txBody>
+        </p:sp>
+        <p:sp>
+          <p:nvSpPr>
+            <p:cNvPr id="110" name="TextBox 109">
+              <a:extLst>
+                <a:ext uri="{FF2B5EF4-FFF2-40B4-BE49-F238E27FC236}">
+                  <a16:creationId xmlns:a16="http://schemas.microsoft.com/office/drawing/2014/main" id="{D4029EF5-23B2-744F-A2BC-B83DCEF141EF}"/>
+                </a:ext>
+              </a:extLst>
+            </p:cNvPr>
+            <p:cNvSpPr txBox="1"/>
+            <p:nvPr/>
+          </p:nvSpPr>
+          <p:spPr>
+            <a:xfrm>
+              <a:off x="1242711" y="3302581"/>
+              <a:ext cx="5725280" cy="400110"/>
+            </a:xfrm>
+            <a:prstGeom prst="rect">
+              <a:avLst/>
+            </a:prstGeom>
+            <a:noFill/>
+          </p:spPr>
+          <p:txBody>
+            <a:bodyPr wrap="square" rtlCol="0">
+              <a:spAutoFit/>
+            </a:bodyPr>
+            <a:lstStyle/>
+            <a:p>
+              <a:r>
+                <a:rPr lang="en-US" sz="2000" dirty="0">
+                  <a:solidFill>
+                    <a:schemeClr val="bg1"/>
+                  </a:solidFill>
+                </a:rPr>
+                <a:t>Azure DevOps with GitHub</a:t>
+              </a:r>
+            </a:p>
+          </p:txBody>
+        </p:sp>
+        <p:sp>
+          <p:nvSpPr>
+            <p:cNvPr id="111" name="TextBox 110">
+              <a:extLst>
+                <a:ext uri="{FF2B5EF4-FFF2-40B4-BE49-F238E27FC236}">
+                  <a16:creationId xmlns:a16="http://schemas.microsoft.com/office/drawing/2014/main" id="{2F698E33-5102-3148-A2C2-2A079B5994E1}"/>
+                </a:ext>
+              </a:extLst>
+            </p:cNvPr>
+            <p:cNvSpPr txBox="1"/>
+            <p:nvPr/>
+          </p:nvSpPr>
+          <p:spPr>
+            <a:xfrm>
+              <a:off x="6850380" y="2637437"/>
+              <a:ext cx="5725280" cy="400110"/>
+            </a:xfrm>
+            <a:prstGeom prst="rect">
+              <a:avLst/>
+            </a:prstGeom>
+            <a:noFill/>
+          </p:spPr>
+          <p:txBody>
+            <a:bodyPr wrap="square" rtlCol="0">
+              <a:spAutoFit/>
+            </a:bodyPr>
+            <a:lstStyle/>
+            <a:p>
+              <a:r>
+                <a:rPr lang="en-US" sz="2000" dirty="0">
+                  <a:solidFill>
+                    <a:schemeClr val="bg1"/>
+                  </a:solidFill>
+                </a:rPr>
+                <a:t>Azure Web Apps</a:t>
+              </a:r>
+            </a:p>
+          </p:txBody>
+        </p:sp>
+        <p:sp>
+          <p:nvSpPr>
+            <p:cNvPr id="112" name="TextBox 111">
+              <a:extLst>
+                <a:ext uri="{FF2B5EF4-FFF2-40B4-BE49-F238E27FC236}">
+                  <a16:creationId xmlns:a16="http://schemas.microsoft.com/office/drawing/2014/main" id="{8B5B08B5-E947-C444-BF2A-F0C66BCCCC14}"/>
+                </a:ext>
+              </a:extLst>
+            </p:cNvPr>
+            <p:cNvSpPr txBox="1"/>
+            <p:nvPr/>
+          </p:nvSpPr>
+          <p:spPr>
+            <a:xfrm>
+              <a:off x="6850380" y="3302581"/>
+              <a:ext cx="5725280" cy="400110"/>
+            </a:xfrm>
+            <a:prstGeom prst="rect">
+              <a:avLst/>
+            </a:prstGeom>
+            <a:noFill/>
+          </p:spPr>
+          <p:txBody>
+            <a:bodyPr wrap="square" rtlCol="0">
+              <a:spAutoFit/>
+            </a:bodyPr>
+            <a:lstStyle/>
+            <a:p>
+              <a:r>
+                <a:rPr lang="en-US" sz="2000" dirty="0">
+                  <a:solidFill>
+                    <a:schemeClr val="bg1"/>
+                  </a:solidFill>
+                </a:rPr>
+                <a:t>Azure PostreSQL Database</a:t>
+              </a:r>
+            </a:p>
+          </p:txBody>
+        </p:sp>
+        <p:pic>
+          <p:nvPicPr>
+            <p:cNvPr id="5" name="Picture 4">
+              <a:extLst>
+                <a:ext uri="{FF2B5EF4-FFF2-40B4-BE49-F238E27FC236}">
+                  <a16:creationId xmlns:a16="http://schemas.microsoft.com/office/drawing/2014/main" id="{20F4A304-3D88-48B1-86B1-09A467C36F9E}"/>
+                </a:ext>
+              </a:extLst>
+            </p:cNvPr>
+            <p:cNvPicPr>
+              <a:picLocks noChangeAspect="1"/>
+            </p:cNvPicPr>
+            <p:nvPr/>
+          </p:nvPicPr>
+          <p:blipFill>
+            <a:blip r:embed="rId8"/>
+            <a:stretch>
+              <a:fillRect/>
+            </a:stretch>
+          </p:blipFill>
+          <p:spPr>
+            <a:xfrm>
+              <a:off x="6184618" y="3212940"/>
+              <a:ext cx="482855" cy="616327"/>
+            </a:xfrm>
+            <a:prstGeom prst="rect">
+              <a:avLst/>
+            </a:prstGeom>
+          </p:spPr>
+        </p:pic>
+        <p:pic>
+          <p:nvPicPr>
+            <p:cNvPr id="29" name="Graphic 28">
+              <a:extLst>
+                <a:ext uri="{FF2B5EF4-FFF2-40B4-BE49-F238E27FC236}">
+                  <a16:creationId xmlns:a16="http://schemas.microsoft.com/office/drawing/2014/main" id="{A486B245-9119-4532-B782-4F25F4AFE0E4}"/>
+                </a:ext>
+              </a:extLst>
+            </p:cNvPr>
+            <p:cNvPicPr>
+              <a:picLocks noChangeAspect="1"/>
+            </p:cNvPicPr>
+            <p:nvPr/>
+          </p:nvPicPr>
+          <p:blipFill>
+            <a:blip r:embed="rId9">
+              <a:extLst>
+                <a:ext uri="{28A0092B-C50C-407E-A947-70E740481C1C}">
+                  <a14:useLocalDpi xmlns:a14="http://schemas.microsoft.com/office/drawing/2010/main" val="0"/>
+                </a:ext>
+                <a:ext uri="{96DAC541-7B7A-43D3-8B79-37D633B846F1}">
+                  <asvg:svgBlip xmlns:asvg="http://schemas.microsoft.com/office/drawing/2016/SVG/main" r:embed="rId10"/>
+                </a:ext>
+              </a:extLst>
+            </a:blip>
+            <a:stretch>
+              <a:fillRect/>
+            </a:stretch>
+          </p:blipFill>
+          <p:spPr>
+            <a:xfrm>
+              <a:off x="527029" y="1830601"/>
+              <a:ext cx="662009" cy="662009"/>
+            </a:xfrm>
+            <a:prstGeom prst="rect">
+              <a:avLst/>
+            </a:prstGeom>
+          </p:spPr>
+        </p:pic>
+      </p:grpSp>
     </p:spTree>
     <p:extLst>
       <p:ext uri="{BB962C8B-B14F-4D97-AF65-F5344CB8AC3E}">
@@ -20739,10 +20806,10 @@
       </p:sp>
       <p:grpSp>
         <p:nvGrpSpPr>
-          <p:cNvPr id="2" name="Group 1">
+          <p:cNvPr id="4" name="Group 3">
             <a:extLst>
               <a:ext uri="{FF2B5EF4-FFF2-40B4-BE49-F238E27FC236}">
-                <a16:creationId xmlns:a16="http://schemas.microsoft.com/office/drawing/2014/main" id="{D32D0071-4F8B-43B1-9012-8D41CAD828D8}"/>
+                <a16:creationId xmlns:a16="http://schemas.microsoft.com/office/drawing/2014/main" id="{093E62E8-FEAF-4092-B711-0114A34080FC}"/>
               </a:ext>
             </a:extLst>
           </p:cNvPr>
@@ -22485,36 +22552,6 @@
         </p:grpSp>
         <p:pic>
           <p:nvPicPr>
-            <p:cNvPr id="108" name="Picture 107">
-              <a:extLst>
-                <a:ext uri="{FF2B5EF4-FFF2-40B4-BE49-F238E27FC236}">
-                  <a16:creationId xmlns:a16="http://schemas.microsoft.com/office/drawing/2014/main" id="{769E983E-379D-B149-93CA-E1E64476282B}"/>
-                </a:ext>
-              </a:extLst>
-            </p:cNvPr>
-            <p:cNvPicPr>
-              <a:picLocks noChangeAspect="1"/>
-            </p:cNvPicPr>
-            <p:nvPr/>
-          </p:nvPicPr>
-          <p:blipFill>
-            <a:blip r:embed="rId7"/>
-            <a:stretch>
-              <a:fillRect/>
-            </a:stretch>
-          </p:blipFill>
-          <p:spPr>
-            <a:xfrm>
-              <a:off x="5413287" y="2449522"/>
-              <a:ext cx="318430" cy="318430"/>
-            </a:xfrm>
-            <a:prstGeom prst="rect">
-              <a:avLst/>
-            </a:prstGeom>
-          </p:spPr>
-        </p:pic>
-        <p:pic>
-          <p:nvPicPr>
             <p:cNvPr id="142" name="Graphic 141">
               <a:extLst>
                 <a:ext uri="{FF2B5EF4-FFF2-40B4-BE49-F238E27FC236}">
@@ -22528,13 +22565,13 @@
             <p:nvPr/>
           </p:nvPicPr>
           <p:blipFill>
-            <a:blip r:embed="rId8" cstate="print">
+            <a:blip r:embed="rId7" cstate="print">
               <a:extLst>
                 <a:ext uri="{28A0092B-C50C-407E-A947-70E740481C1C}">
                   <a14:useLocalDpi xmlns:a14="http://schemas.microsoft.com/office/drawing/2010/main" val="0"/>
                 </a:ext>
                 <a:ext uri="{96DAC541-7B7A-43D3-8B79-37D633B846F1}">
-                  <asvg:svgBlip xmlns:asvg="http://schemas.microsoft.com/office/drawing/2016/SVG/main" r:embed="rId9"/>
+                  <asvg:svgBlip xmlns:asvg="http://schemas.microsoft.com/office/drawing/2016/SVG/main" r:embed="rId8"/>
                 </a:ext>
               </a:extLst>
             </a:blip>
@@ -22701,13 +22738,13 @@
             <p:nvPr/>
           </p:nvPicPr>
           <p:blipFill>
-            <a:blip r:embed="rId8" cstate="print">
+            <a:blip r:embed="rId7" cstate="print">
               <a:extLst>
                 <a:ext uri="{28A0092B-C50C-407E-A947-70E740481C1C}">
                   <a14:useLocalDpi xmlns:a14="http://schemas.microsoft.com/office/drawing/2010/main" val="0"/>
                 </a:ext>
                 <a:ext uri="{96DAC541-7B7A-43D3-8B79-37D633B846F1}">
-                  <asvg:svgBlip xmlns:asvg="http://schemas.microsoft.com/office/drawing/2016/SVG/main" r:embed="rId9"/>
+                  <asvg:svgBlip xmlns:asvg="http://schemas.microsoft.com/office/drawing/2016/SVG/main" r:embed="rId8"/>
                 </a:ext>
               </a:extLst>
             </a:blip>
@@ -22874,13 +22911,13 @@
             <p:nvPr/>
           </p:nvPicPr>
           <p:blipFill>
-            <a:blip r:embed="rId8" cstate="print">
+            <a:blip r:embed="rId7" cstate="print">
               <a:extLst>
                 <a:ext uri="{28A0092B-C50C-407E-A947-70E740481C1C}">
                   <a14:useLocalDpi xmlns:a14="http://schemas.microsoft.com/office/drawing/2010/main" val="0"/>
                 </a:ext>
                 <a:ext uri="{96DAC541-7B7A-43D3-8B79-37D633B846F1}">
-                  <asvg:svgBlip xmlns:asvg="http://schemas.microsoft.com/office/drawing/2016/SVG/main" r:embed="rId9"/>
+                  <asvg:svgBlip xmlns:asvg="http://schemas.microsoft.com/office/drawing/2016/SVG/main" r:embed="rId8"/>
                 </a:ext>
               </a:extLst>
             </a:blip>
@@ -22913,7 +22950,7 @@
             <p:nvPr/>
           </p:nvPicPr>
           <p:blipFill rotWithShape="1">
-            <a:blip r:embed="rId10"/>
+            <a:blip r:embed="rId9"/>
             <a:srcRect l="3302" t="6466" r="5732" b="6346"/>
             <a:stretch/>
           </p:blipFill>
@@ -22942,7 +22979,7 @@
             <p:nvPr/>
           </p:nvPicPr>
           <p:blipFill rotWithShape="1">
-            <a:blip r:embed="rId11"/>
+            <a:blip r:embed="rId10"/>
             <a:srcRect l="8063" t="5692" r="7576" b="4929"/>
             <a:stretch/>
           </p:blipFill>
@@ -22971,7 +23008,7 @@
             <p:nvPr/>
           </p:nvPicPr>
           <p:blipFill rotWithShape="1">
-            <a:blip r:embed="rId10"/>
+            <a:blip r:embed="rId9"/>
             <a:srcRect l="3302" t="6466" r="5732" b="6346"/>
             <a:stretch/>
           </p:blipFill>
@@ -23000,7 +23037,7 @@
             <p:nvPr/>
           </p:nvPicPr>
           <p:blipFill rotWithShape="1">
-            <a:blip r:embed="rId11"/>
+            <a:blip r:embed="rId10"/>
             <a:srcRect l="8063" t="5692" r="7576" b="4929"/>
             <a:stretch/>
           </p:blipFill>
@@ -23029,7 +23066,7 @@
             <p:nvPr/>
           </p:nvPicPr>
           <p:blipFill rotWithShape="1">
-            <a:blip r:embed="rId10"/>
+            <a:blip r:embed="rId9"/>
             <a:srcRect l="3302" t="6466" r="5732" b="6346"/>
             <a:stretch/>
           </p:blipFill>
@@ -23058,7 +23095,7 @@
             <p:nvPr/>
           </p:nvPicPr>
           <p:blipFill rotWithShape="1">
-            <a:blip r:embed="rId11"/>
+            <a:blip r:embed="rId10"/>
             <a:srcRect l="8063" t="5692" r="7576" b="4929"/>
             <a:stretch/>
           </p:blipFill>
@@ -23087,7 +23124,7 @@
             <p:nvPr/>
           </p:nvPicPr>
           <p:blipFill>
-            <a:blip r:embed="rId12" cstate="print">
+            <a:blip r:embed="rId11" cstate="print">
               <a:extLst>
                 <a:ext uri="{28A0092B-C50C-407E-A947-70E740481C1C}">
                   <a14:useLocalDpi xmlns:a14="http://schemas.microsoft.com/office/drawing/2010/main" val="0"/>
@@ -23110,6 +23147,83 @@
             <a:solidFill>
               <a:schemeClr val="tx1"/>
             </a:solidFill>
+          </p:spPr>
+        </p:pic>
+        <p:pic>
+          <p:nvPicPr>
+            <p:cNvPr id="56" name="Picture 55" descr="A picture containing airplane, fence&#10;&#10;Description automatically generated">
+              <a:extLst>
+                <a:ext uri="{FF2B5EF4-FFF2-40B4-BE49-F238E27FC236}">
+                  <a16:creationId xmlns:a16="http://schemas.microsoft.com/office/drawing/2014/main" id="{90695FBB-0388-419F-B365-A0D5A7A31190}"/>
+                </a:ext>
+              </a:extLst>
+            </p:cNvPr>
+            <p:cNvPicPr>
+              <a:picLocks noChangeAspect="1"/>
+            </p:cNvPicPr>
+            <p:nvPr/>
+          </p:nvPicPr>
+          <p:blipFill rotWithShape="1">
+            <a:blip r:embed="rId12" cstate="print">
+              <a:extLst>
+                <a:ext uri="{28A0092B-C50C-407E-A947-70E740481C1C}">
+                  <a14:useLocalDpi xmlns:a14="http://schemas.microsoft.com/office/drawing/2010/main" val="0"/>
+                </a:ext>
+              </a:extLst>
+            </a:blip>
+            <a:srcRect l="17926" t="17195" r="18365"/>
+            <a:stretch/>
+          </p:blipFill>
+          <p:spPr>
+            <a:xfrm>
+              <a:off x="500040" y="3118401"/>
+              <a:ext cx="529421" cy="537583"/>
+            </a:xfrm>
+            <a:prstGeom prst="rect">
+              <a:avLst/>
+            </a:prstGeom>
+            <a:solidFill>
+              <a:schemeClr val="tx1"/>
+            </a:solidFill>
+          </p:spPr>
+        </p:pic>
+        <p:pic>
+          <p:nvPicPr>
+            <p:cNvPr id="57" name="Graphic 56">
+              <a:extLst>
+                <a:ext uri="{FF2B5EF4-FFF2-40B4-BE49-F238E27FC236}">
+                  <a16:creationId xmlns:a16="http://schemas.microsoft.com/office/drawing/2014/main" id="{44B3A9A3-8B31-40A4-AD22-A9E81EA18842}"/>
+                </a:ext>
+              </a:extLst>
+            </p:cNvPr>
+            <p:cNvPicPr>
+              <a:picLocks noChangeAspect="1"/>
+            </p:cNvPicPr>
+            <p:nvPr/>
+          </p:nvPicPr>
+          <p:blipFill>
+            <a:blip r:embed="rId13">
+              <a:extLst>
+                <a:ext uri="{28A0092B-C50C-407E-A947-70E740481C1C}">
+                  <a14:useLocalDpi xmlns:a14="http://schemas.microsoft.com/office/drawing/2010/main" val="0"/>
+                </a:ext>
+                <a:ext uri="{96DAC541-7B7A-43D3-8B79-37D633B846F1}">
+                  <asvg:svgBlip xmlns:asvg="http://schemas.microsoft.com/office/drawing/2016/SVG/main" r:embed="rId14"/>
+                </a:ext>
+              </a:extLst>
+            </a:blip>
+            <a:stretch>
+              <a:fillRect/>
+            </a:stretch>
+          </p:blipFill>
+          <p:spPr>
+            <a:xfrm>
+              <a:off x="5387928" y="2424163"/>
+              <a:ext cx="369148" cy="369148"/>
+            </a:xfrm>
+            <a:prstGeom prst="rect">
+              <a:avLst/>
+            </a:prstGeom>
           </p:spPr>
         </p:pic>
       </p:grpSp>

</xml_diff>

<commit_message>
Capitalized the environemnt names (DEVELOPMENT, TEST, PRODUCTION) in diagrams
</commit_message>
<xml_diff>
--- a/Whiteboard design session/WDS trainer presentation - Continuous delivery in Azure DevOps.pptx
+++ b/Whiteboard design session/WDS trainer presentation - Continuous delivery in Azure DevOps.pptx
@@ -231,7 +231,7 @@
           <a:p>
             <a:fld id="{52A13B17-C506-4D51-BB37-16B365906619}" type="datetimeFigureOut">
               <a:rPr lang="en-US" smtClean="0"/>
-              <a:t>12/6/2019</a:t>
+              <a:t>12/13/2019</a:t>
             </a:fld>
             <a:endParaRPr lang="en-US" dirty="0"/>
           </a:p>
@@ -3237,7 +3237,7 @@
                   <a:prstClr val="black"/>
                 </a:solidFill>
               </a:rPr>
-              <a:t>12/6/2019 2:20 AM</a:t>
+              <a:t>12/13/2019 12:06 PM</a:t>
             </a:fld>
             <a:endParaRPr lang="en-US" dirty="0">
               <a:solidFill>
@@ -20806,10 +20806,10 @@
       </p:sp>
       <p:grpSp>
         <p:nvGrpSpPr>
-          <p:cNvPr id="4" name="Group 3">
+          <p:cNvPr id="106" name="Group 105">
             <a:extLst>
               <a:ext uri="{FF2B5EF4-FFF2-40B4-BE49-F238E27FC236}">
-                <a16:creationId xmlns:a16="http://schemas.microsoft.com/office/drawing/2014/main" id="{093E62E8-FEAF-4092-B711-0114A34080FC}"/>
+                <a16:creationId xmlns:a16="http://schemas.microsoft.com/office/drawing/2014/main" id="{0DC9D6D1-DFD3-4C87-968A-4AE5F51250F3}"/>
               </a:ext>
             </a:extLst>
           </p:cNvPr>
@@ -20819,17 +20819,17 @@
         <p:grpSpPr>
           <a:xfrm>
             <a:off x="340550" y="1958796"/>
-            <a:ext cx="11128289" cy="3164850"/>
+            <a:ext cx="11207386" cy="3164850"/>
             <a:chOff x="340550" y="1958796"/>
-            <a:chExt cx="11128289" cy="3164850"/>
+            <a:chExt cx="11207386" cy="3164850"/>
           </a:xfrm>
         </p:grpSpPr>
         <p:grpSp>
           <p:nvGrpSpPr>
-            <p:cNvPr id="107" name="Alt text group" descr="This diagram moves from left to right with arrows between icons that point in a straight line until the lines fork off to three icons in the Azure group at the far right.&#10;&#10;The Edit code (Visual Studio) icon points to an icon labeled Commit and push local branch to VSTS. This points to four icons that are collectively labeled Visual Studio Team Services. From left to right, they are Create a Pull Request for peer review, Merge to master, Continuous Integration (Build (+tests)), and Continuous Deployment (Release Management). &#10;&#10;The Continuous Deployment icon points at three groups of icons that are collectively labeled Azure and Application Insights. The three groups are development, test, and production, and each group includes App Service icons and Azure SQL icons." title="Preferred solution diagram">
+            <p:cNvPr id="108" name="Alt text group" descr="This diagram moves from left to right with arrows between icons that point in a straight line until the lines fork off to three icons in the Azure group at the far right.&#10;&#10;The Edit code (Visual Studio) icon points to an icon labeled Commit and push local branch to VSTS. This points to four icons that are collectively labeled Visual Studio Team Services. From left to right, they are Create a Pull Request for peer review, Merge to master, Continuous Integration (Build (+tests)), and Continuous Deployment (Release Management). &#10;&#10;The Continuous Deployment icon points at three groups of icons that are collectively labeled Azure and Application Insights. The three groups are development, test, and production, and each group includes App Service icons and Azure SQL icons." title="Preferred solution diagram">
               <a:extLst>
                 <a:ext uri="{FF2B5EF4-FFF2-40B4-BE49-F238E27FC236}">
-                  <a16:creationId xmlns:a16="http://schemas.microsoft.com/office/drawing/2014/main" id="{0E0B3E3D-4F7A-0C4E-B15F-FF4ABC292203}"/>
+                  <a16:creationId xmlns:a16="http://schemas.microsoft.com/office/drawing/2014/main" id="{7097883F-0ECF-412F-B8FE-9723E68D0D62}"/>
                 </a:ext>
               </a:extLst>
             </p:cNvPr>
@@ -20839,17 +20839,17 @@
           <p:grpSpPr>
             <a:xfrm>
               <a:off x="340550" y="1958796"/>
-              <a:ext cx="11128289" cy="3164850"/>
+              <a:ext cx="11197651" cy="3164850"/>
               <a:chOff x="340550" y="1958796"/>
-              <a:chExt cx="11128289" cy="3164850"/>
+              <a:chExt cx="11197651" cy="3164850"/>
             </a:xfrm>
           </p:grpSpPr>
           <p:sp>
             <p:nvSpPr>
-              <p:cNvPr id="109" name="Rectangle 108">
+              <p:cNvPr id="164" name="Rectangle 163">
                 <a:extLst>
                   <a:ext uri="{FF2B5EF4-FFF2-40B4-BE49-F238E27FC236}">
-                    <a16:creationId xmlns:a16="http://schemas.microsoft.com/office/drawing/2014/main" id="{BA66AB8B-0673-E84A-AECA-866A6A6599C2}"/>
+                    <a16:creationId xmlns:a16="http://schemas.microsoft.com/office/drawing/2014/main" id="{15D2DA0E-1381-4B5B-B5DF-458D7B71F61B}"/>
                   </a:ext>
                 </a:extLst>
               </p:cNvPr>
@@ -20859,7 +20859,7 @@
             <p:spPr bwMode="auto">
               <a:xfrm>
                 <a:off x="458786" y="1958796"/>
-                <a:ext cx="11010053" cy="3164850"/>
+                <a:ext cx="11079415" cy="3164850"/>
               </a:xfrm>
               <a:prstGeom prst="rect">
                 <a:avLst/>
@@ -20929,10 +20929,10 @@
           </p:sp>
           <p:sp>
             <p:nvSpPr>
-              <p:cNvPr id="110" name="Rectangle 109">
+              <p:cNvPr id="165" name="Rectangle 164">
                 <a:extLst>
                   <a:ext uri="{FF2B5EF4-FFF2-40B4-BE49-F238E27FC236}">
-                    <a16:creationId xmlns:a16="http://schemas.microsoft.com/office/drawing/2014/main" id="{CFBF312F-AB44-D64F-B33D-D0F72D94C57B}"/>
+                    <a16:creationId xmlns:a16="http://schemas.microsoft.com/office/drawing/2014/main" id="{98F84E33-05E3-460B-A7D2-733872A0AF82}"/>
                   </a:ext>
                 </a:extLst>
               </p:cNvPr>
@@ -21015,10 +21015,10 @@
           </p:sp>
           <p:sp>
             <p:nvSpPr>
-              <p:cNvPr id="111" name="TextBox 110">
+              <p:cNvPr id="166" name="TextBox 165">
                 <a:extLst>
                   <a:ext uri="{FF2B5EF4-FFF2-40B4-BE49-F238E27FC236}">
-                    <a16:creationId xmlns:a16="http://schemas.microsoft.com/office/drawing/2014/main" id="{93CA964F-1C4F-714F-8112-CD0B28E107B9}"/>
+                    <a16:creationId xmlns:a16="http://schemas.microsoft.com/office/drawing/2014/main" id="{67D64572-2E9B-4339-8937-CB25651D91E9}"/>
                   </a:ext>
                 </a:extLst>
               </p:cNvPr>
@@ -21064,10 +21064,10 @@
           </p:sp>
           <p:sp>
             <p:nvSpPr>
-              <p:cNvPr id="112" name="TextBox 111">
+              <p:cNvPr id="167" name="TextBox 166">
                 <a:extLst>
                   <a:ext uri="{FF2B5EF4-FFF2-40B4-BE49-F238E27FC236}">
-                    <a16:creationId xmlns:a16="http://schemas.microsoft.com/office/drawing/2014/main" id="{0B34B5D1-2EBA-6545-AA0A-57989452B198}"/>
+                    <a16:creationId xmlns:a16="http://schemas.microsoft.com/office/drawing/2014/main" id="{E1CF9E12-258D-4F1C-B328-B7ED37D72099}"/>
                   </a:ext>
                 </a:extLst>
               </p:cNvPr>
@@ -21113,10 +21113,10 @@
           </p:sp>
           <p:pic>
             <p:nvPicPr>
-              <p:cNvPr id="113" name="Picture 112">
+              <p:cNvPr id="168" name="Picture 167">
                 <a:extLst>
                   <a:ext uri="{FF2B5EF4-FFF2-40B4-BE49-F238E27FC236}">
-                    <a16:creationId xmlns:a16="http://schemas.microsoft.com/office/drawing/2014/main" id="{68F4B73E-43E8-F844-8AEA-F9A192842095}"/>
+                    <a16:creationId xmlns:a16="http://schemas.microsoft.com/office/drawing/2014/main" id="{A8BA0E7F-D9C7-4051-B9D5-6C4661B2EC81}"/>
                   </a:ext>
                 </a:extLst>
               </p:cNvPr>
@@ -21149,10 +21149,10 @@
           </p:pic>
           <p:pic>
             <p:nvPicPr>
-              <p:cNvPr id="114" name="Picture 113">
+              <p:cNvPr id="169" name="Picture 168">
                 <a:extLst>
                   <a:ext uri="{FF2B5EF4-FFF2-40B4-BE49-F238E27FC236}">
-                    <a16:creationId xmlns:a16="http://schemas.microsoft.com/office/drawing/2014/main" id="{762448C4-363D-6047-A2E2-203102AE997B}"/>
+                    <a16:creationId xmlns:a16="http://schemas.microsoft.com/office/drawing/2014/main" id="{D299DF1C-C3D9-4DF6-A971-133591227390}"/>
                   </a:ext>
                 </a:extLst>
               </p:cNvPr>
@@ -21185,10 +21185,10 @@
           </p:pic>
           <p:sp>
             <p:nvSpPr>
-              <p:cNvPr id="115" name="TextBox 114">
+              <p:cNvPr id="170" name="TextBox 169">
                 <a:extLst>
                   <a:ext uri="{FF2B5EF4-FFF2-40B4-BE49-F238E27FC236}">
-                    <a16:creationId xmlns:a16="http://schemas.microsoft.com/office/drawing/2014/main" id="{68BDDCEB-F0EB-4C41-8BEE-BA09A20E41F9}"/>
+                    <a16:creationId xmlns:a16="http://schemas.microsoft.com/office/drawing/2014/main" id="{C0B7B045-D3B2-48CE-ACDB-3ACE5EEA48B0}"/>
                   </a:ext>
                 </a:extLst>
               </p:cNvPr>
@@ -21234,10 +21234,10 @@
           </p:sp>
           <p:sp>
             <p:nvSpPr>
-              <p:cNvPr id="116" name="Rectangle 115">
+              <p:cNvPr id="171" name="Rectangle 170">
                 <a:extLst>
                   <a:ext uri="{FF2B5EF4-FFF2-40B4-BE49-F238E27FC236}">
-                    <a16:creationId xmlns:a16="http://schemas.microsoft.com/office/drawing/2014/main" id="{06CBDF83-924E-594A-90C8-F6E28292A4C2}"/>
+                    <a16:creationId xmlns:a16="http://schemas.microsoft.com/office/drawing/2014/main" id="{49476C3C-23F8-4081-AAD2-86BF5F1029B2}"/>
                   </a:ext>
                 </a:extLst>
               </p:cNvPr>
@@ -21320,10 +21320,10 @@
           </p:sp>
           <p:sp>
             <p:nvSpPr>
-              <p:cNvPr id="117" name="Rectangle 116">
+              <p:cNvPr id="172" name="Rectangle 171">
                 <a:extLst>
                   <a:ext uri="{FF2B5EF4-FFF2-40B4-BE49-F238E27FC236}">
-                    <a16:creationId xmlns:a16="http://schemas.microsoft.com/office/drawing/2014/main" id="{CCB9C95A-CB21-F646-B177-A1F3A88E39ED}"/>
+                    <a16:creationId xmlns:a16="http://schemas.microsoft.com/office/drawing/2014/main" id="{FE276739-430D-4E7F-B4F9-8917F3F9F879}"/>
                   </a:ext>
                 </a:extLst>
               </p:cNvPr>
@@ -21406,10 +21406,10 @@
           </p:sp>
           <p:sp>
             <p:nvSpPr>
-              <p:cNvPr id="118" name="TextBox 117">
+              <p:cNvPr id="173" name="TextBox 172">
                 <a:extLst>
                   <a:ext uri="{FF2B5EF4-FFF2-40B4-BE49-F238E27FC236}">
-                    <a16:creationId xmlns:a16="http://schemas.microsoft.com/office/drawing/2014/main" id="{04324AB9-FB0D-8E49-BBF1-CD9FEC5351E0}"/>
+                    <a16:creationId xmlns:a16="http://schemas.microsoft.com/office/drawing/2014/main" id="{3B37F7A8-676D-4C2D-9049-0792B58E5AA1}"/>
                   </a:ext>
                 </a:extLst>
               </p:cNvPr>
@@ -21455,10 +21455,10 @@
           </p:sp>
           <p:sp>
             <p:nvSpPr>
-              <p:cNvPr id="119" name="TextBox 118">
+              <p:cNvPr id="174" name="TextBox 173">
                 <a:extLst>
                   <a:ext uri="{FF2B5EF4-FFF2-40B4-BE49-F238E27FC236}">
-                    <a16:creationId xmlns:a16="http://schemas.microsoft.com/office/drawing/2014/main" id="{020D6B72-03D7-3642-9C6F-DEF7FC491459}"/>
+                    <a16:creationId xmlns:a16="http://schemas.microsoft.com/office/drawing/2014/main" id="{89191213-3B6D-40B5-8EE1-C18126E5B913}"/>
                   </a:ext>
                 </a:extLst>
               </p:cNvPr>
@@ -21504,10 +21504,10 @@
           </p:sp>
           <p:cxnSp>
             <p:nvCxnSpPr>
-              <p:cNvPr id="120" name="Straight Arrow Connector 119">
+              <p:cNvPr id="175" name="Straight Arrow Connector 174">
                 <a:extLst>
                   <a:ext uri="{FF2B5EF4-FFF2-40B4-BE49-F238E27FC236}">
-                    <a16:creationId xmlns:a16="http://schemas.microsoft.com/office/drawing/2014/main" id="{13C4BD96-548A-5747-9AB1-791979852F0C}"/>
+                    <a16:creationId xmlns:a16="http://schemas.microsoft.com/office/drawing/2014/main" id="{8D01274B-4CE6-443F-AEBF-D15F5B5A1F4D}"/>
                   </a:ext>
                 </a:extLst>
               </p:cNvPr>
@@ -21551,10 +21551,10 @@
           </p:cxnSp>
           <p:cxnSp>
             <p:nvCxnSpPr>
-              <p:cNvPr id="121" name="Straight Arrow Connector 120">
+              <p:cNvPr id="176" name="Straight Arrow Connector 175">
                 <a:extLst>
                   <a:ext uri="{FF2B5EF4-FFF2-40B4-BE49-F238E27FC236}">
-                    <a16:creationId xmlns:a16="http://schemas.microsoft.com/office/drawing/2014/main" id="{CA044F0C-BFD6-5C47-8910-2AE91F8D7B91}"/>
+                    <a16:creationId xmlns:a16="http://schemas.microsoft.com/office/drawing/2014/main" id="{407839B2-ADCD-42E8-B49B-FF6D5615095D}"/>
                   </a:ext>
                 </a:extLst>
               </p:cNvPr>
@@ -21598,10 +21598,10 @@
           </p:cxnSp>
           <p:grpSp>
             <p:nvGrpSpPr>
-              <p:cNvPr id="122" name="Group 121">
+              <p:cNvPr id="177" name="Group 176">
                 <a:extLst>
                   <a:ext uri="{FF2B5EF4-FFF2-40B4-BE49-F238E27FC236}">
-                    <a16:creationId xmlns:a16="http://schemas.microsoft.com/office/drawing/2014/main" id="{F296204A-09CE-4646-9704-7860F073FB34}"/>
+                    <a16:creationId xmlns:a16="http://schemas.microsoft.com/office/drawing/2014/main" id="{88D2A956-4476-4353-BD73-84331475933C}"/>
                   </a:ext>
                 </a:extLst>
               </p:cNvPr>
@@ -21618,10 +21618,10 @@
             </p:grpSpPr>
             <p:sp>
               <p:nvSpPr>
-                <p:cNvPr id="140" name="TextBox 139">
+                <p:cNvPr id="194" name="TextBox 193">
                   <a:extLst>
                     <a:ext uri="{FF2B5EF4-FFF2-40B4-BE49-F238E27FC236}">
-                      <a16:creationId xmlns:a16="http://schemas.microsoft.com/office/drawing/2014/main" id="{385AE711-173E-AB4D-83C5-B1A0F2356F20}"/>
+                      <a16:creationId xmlns:a16="http://schemas.microsoft.com/office/drawing/2014/main" id="{B97140B6-86AB-4BBB-B1B9-BDE8B057A642}"/>
                     </a:ext>
                   </a:extLst>
                 </p:cNvPr>
@@ -21667,10 +21667,10 @@
             </p:sp>
             <p:pic>
               <p:nvPicPr>
-                <p:cNvPr id="141" name="Picture 140">
+                <p:cNvPr id="195" name="Picture 194">
                   <a:extLst>
                     <a:ext uri="{FF2B5EF4-FFF2-40B4-BE49-F238E27FC236}">
-                      <a16:creationId xmlns:a16="http://schemas.microsoft.com/office/drawing/2014/main" id="{E801E60F-E6C2-F345-8EB8-3AD0041FC5CF}"/>
+                      <a16:creationId xmlns:a16="http://schemas.microsoft.com/office/drawing/2014/main" id="{A51CC931-1A39-42D9-ABD0-D9F568B7F037}"/>
                     </a:ext>
                   </a:extLst>
                 </p:cNvPr>
@@ -21704,10 +21704,10 @@
           </p:grpSp>
           <p:grpSp>
             <p:nvGrpSpPr>
-              <p:cNvPr id="123" name="Group 122">
+              <p:cNvPr id="178" name="Group 177">
                 <a:extLst>
                   <a:ext uri="{FF2B5EF4-FFF2-40B4-BE49-F238E27FC236}">
-                    <a16:creationId xmlns:a16="http://schemas.microsoft.com/office/drawing/2014/main" id="{FC03C19E-4794-3045-B3FC-8AB310E3B005}"/>
+                    <a16:creationId xmlns:a16="http://schemas.microsoft.com/office/drawing/2014/main" id="{C126EF62-5C03-486A-9F21-3E1CCFBDDD27}"/>
                   </a:ext>
                 </a:extLst>
               </p:cNvPr>
@@ -21716,18 +21716,18 @@
             </p:nvGrpSpPr>
             <p:grpSpPr>
               <a:xfrm>
-                <a:off x="8512008" y="2486976"/>
-                <a:ext cx="1387384" cy="970705"/>
-                <a:chOff x="8512008" y="2506028"/>
-                <a:chExt cx="1387384" cy="970705"/>
+                <a:off x="8580588" y="2486976"/>
+                <a:ext cx="1492540" cy="970705"/>
+                <a:chOff x="8580588" y="2506028"/>
+                <a:chExt cx="1492540" cy="970705"/>
               </a:xfrm>
             </p:grpSpPr>
             <p:sp>
               <p:nvSpPr>
-                <p:cNvPr id="136" name="Rectangle 135">
+                <p:cNvPr id="191" name="Rectangle 190">
                   <a:extLst>
                     <a:ext uri="{FF2B5EF4-FFF2-40B4-BE49-F238E27FC236}">
-                      <a16:creationId xmlns:a16="http://schemas.microsoft.com/office/drawing/2014/main" id="{672B437C-3B7F-C94B-BBEF-96B7112AAAD4}"/>
+                      <a16:creationId xmlns:a16="http://schemas.microsoft.com/office/drawing/2014/main" id="{82E49AE3-580E-4D87-9281-F31FC9857BD9}"/>
                     </a:ext>
                   </a:extLst>
                 </p:cNvPr>
@@ -21736,8 +21736,8 @@
               </p:nvSpPr>
               <p:spPr bwMode="auto">
                 <a:xfrm>
-                  <a:off x="8640135" y="2506028"/>
-                  <a:ext cx="1076276" cy="858017"/>
+                  <a:off x="8640133" y="2506028"/>
+                  <a:ext cx="1331045" cy="858017"/>
                 </a:xfrm>
                 <a:prstGeom prst="rect">
                   <a:avLst/>
@@ -21797,17 +21797,17 @@
                       <a:ea typeface="Segoe UI" pitchFamily="34" charset="0"/>
                       <a:cs typeface="Arial" panose="020B0604020202020204" pitchFamily="34" charset="0"/>
                     </a:rPr>
-                    <a:t>development</a:t>
+                    <a:t>DEVELOPMENT</a:t>
                   </a:r>
                 </a:p>
               </p:txBody>
             </p:sp>
             <p:sp>
               <p:nvSpPr>
-                <p:cNvPr id="137" name="TextBox 136">
+                <p:cNvPr id="192" name="TextBox 191">
                   <a:extLst>
                     <a:ext uri="{FF2B5EF4-FFF2-40B4-BE49-F238E27FC236}">
-                      <a16:creationId xmlns:a16="http://schemas.microsoft.com/office/drawing/2014/main" id="{E6A73CFD-60EC-E640-93D8-A1317230A2D6}"/>
+                      <a16:creationId xmlns:a16="http://schemas.microsoft.com/office/drawing/2014/main" id="{2EBC7DC3-1D17-40C5-9786-0FDCB169A62F}"/>
                     </a:ext>
                   </a:extLst>
                 </p:cNvPr>
@@ -21816,7 +21816,7 @@
               </p:nvSpPr>
               <p:spPr>
                 <a:xfrm>
-                  <a:off x="8512008" y="2959668"/>
+                  <a:off x="8580588" y="2959668"/>
                   <a:ext cx="739729" cy="517065"/>
                 </a:xfrm>
                 <a:prstGeom prst="rect">
@@ -21851,48 +21851,12 @@
                 </a:p>
               </p:txBody>
             </p:sp>
-            <p:pic>
-              <p:nvPicPr>
-                <p:cNvPr id="138" name="Picture 137">
+            <p:sp>
+              <p:nvSpPr>
+                <p:cNvPr id="193" name="TextBox 192">
                   <a:extLst>
                     <a:ext uri="{FF2B5EF4-FFF2-40B4-BE49-F238E27FC236}">
-                      <a16:creationId xmlns:a16="http://schemas.microsoft.com/office/drawing/2014/main" id="{E06F0036-7C5B-BD4C-888E-1DDF2CDE2B7D}"/>
-                    </a:ext>
-                  </a:extLst>
-                </p:cNvPr>
-                <p:cNvPicPr>
-                  <a:picLocks noChangeAspect="1"/>
-                </p:cNvPicPr>
-                <p:nvPr/>
-              </p:nvPicPr>
-              <p:blipFill>
-                <a:blip r:embed="rId6" cstate="print">
-                  <a:extLst>
-                    <a:ext uri="{28A0092B-C50C-407E-A947-70E740481C1C}">
-                      <a14:useLocalDpi xmlns:a14="http://schemas.microsoft.com/office/drawing/2010/main" val="0"/>
-                    </a:ext>
-                  </a:extLst>
-                </a:blip>
-                <a:stretch>
-                  <a:fillRect/>
-                </a:stretch>
-              </p:blipFill>
-              <p:spPr>
-                <a:xfrm>
-                  <a:off x="8785077" y="2892169"/>
-                  <a:ext cx="193592" cy="193592"/>
-                </a:xfrm>
-                <a:prstGeom prst="rect">
-                  <a:avLst/>
-                </a:prstGeom>
-              </p:spPr>
-            </p:pic>
-            <p:sp>
-              <p:nvSpPr>
-                <p:cNvPr id="139" name="TextBox 138">
-                  <a:extLst>
-                    <a:ext uri="{FF2B5EF4-FFF2-40B4-BE49-F238E27FC236}">
-                      <a16:creationId xmlns:a16="http://schemas.microsoft.com/office/drawing/2014/main" id="{88C4C932-ED80-9442-BE70-BFEF1FD5AE2F}"/>
+                      <a16:creationId xmlns:a16="http://schemas.microsoft.com/office/drawing/2014/main" id="{327E8F07-421E-4F4F-B932-087DF057D591}"/>
                     </a:ext>
                   </a:extLst>
                 </p:cNvPr>
@@ -21901,7 +21865,7 @@
               </p:nvSpPr>
               <p:spPr>
                 <a:xfrm>
-                  <a:off x="8931273" y="2953869"/>
+                  <a:off x="9105009" y="2953869"/>
                   <a:ext cx="968119" cy="517065"/>
                 </a:xfrm>
                 <a:prstGeom prst="rect">
@@ -21939,10 +21903,10 @@
           </p:grpSp>
           <p:sp>
             <p:nvSpPr>
-              <p:cNvPr id="124" name="Rectangle 123">
+              <p:cNvPr id="179" name="Rectangle 178">
                 <a:extLst>
                   <a:ext uri="{FF2B5EF4-FFF2-40B4-BE49-F238E27FC236}">
-                    <a16:creationId xmlns:a16="http://schemas.microsoft.com/office/drawing/2014/main" id="{FFC33034-E830-E748-9F69-CEF470D31A36}"/>
+                    <a16:creationId xmlns:a16="http://schemas.microsoft.com/office/drawing/2014/main" id="{6EEE4032-9872-4252-A6E2-74C7152C1993}"/>
                   </a:ext>
                 </a:extLst>
               </p:cNvPr>
@@ -21951,8 +21915,8 @@
             </p:nvSpPr>
             <p:spPr bwMode="auto">
               <a:xfrm>
-                <a:off x="10079654" y="3013941"/>
-                <a:ext cx="1076276" cy="858017"/>
+                <a:off x="10079653" y="3013941"/>
+                <a:ext cx="1331045" cy="858017"/>
               </a:xfrm>
               <a:prstGeom prst="rect">
                 <a:avLst/>
@@ -22012,17 +21976,17 @@
                     <a:ea typeface="Segoe UI" pitchFamily="34" charset="0"/>
                     <a:cs typeface="Arial" panose="020B0604020202020204" pitchFamily="34" charset="0"/>
                   </a:rPr>
-                  <a:t>test</a:t>
+                  <a:t>TEST</a:t>
                 </a:r>
               </a:p>
             </p:txBody>
           </p:sp>
           <p:sp>
             <p:nvSpPr>
-              <p:cNvPr id="125" name="Rectangle 124">
+              <p:cNvPr id="180" name="Rectangle 179">
                 <a:extLst>
                   <a:ext uri="{FF2B5EF4-FFF2-40B4-BE49-F238E27FC236}">
-                    <a16:creationId xmlns:a16="http://schemas.microsoft.com/office/drawing/2014/main" id="{ADF97EB3-C2AD-0340-8A10-1931789ED012}"/>
+                    <a16:creationId xmlns:a16="http://schemas.microsoft.com/office/drawing/2014/main" id="{DC056400-D4E2-4016-B745-2B74DA21A64C}"/>
                   </a:ext>
                 </a:extLst>
               </p:cNvPr>
@@ -22031,8 +21995,8 @@
             </p:nvSpPr>
             <p:spPr bwMode="auto">
               <a:xfrm>
-                <a:off x="8643516" y="3561298"/>
-                <a:ext cx="1076276" cy="858017"/>
+                <a:off x="8643514" y="3561298"/>
+                <a:ext cx="1331045" cy="858017"/>
               </a:xfrm>
               <a:prstGeom prst="rect">
                 <a:avLst/>
@@ -22092,17 +22056,17 @@
                     <a:ea typeface="Segoe UI" pitchFamily="34" charset="0"/>
                     <a:cs typeface="Arial" panose="020B0604020202020204" pitchFamily="34" charset="0"/>
                   </a:rPr>
-                  <a:t>production</a:t>
+                  <a:t>PRODUCTION</a:t>
                 </a:r>
               </a:p>
             </p:txBody>
           </p:sp>
           <p:cxnSp>
             <p:nvCxnSpPr>
-              <p:cNvPr id="126" name="Straight Arrow Connector 125">
+              <p:cNvPr id="181" name="Straight Arrow Connector 180">
                 <a:extLst>
                   <a:ext uri="{FF2B5EF4-FFF2-40B4-BE49-F238E27FC236}">
-                    <a16:creationId xmlns:a16="http://schemas.microsoft.com/office/drawing/2014/main" id="{43054157-6D46-7044-8A91-FBF581CEF5CD}"/>
+                    <a16:creationId xmlns:a16="http://schemas.microsoft.com/office/drawing/2014/main" id="{F34A70EE-395D-4844-983A-D9405A7C2569}"/>
                   </a:ext>
                 </a:extLst>
               </p:cNvPr>
@@ -22146,10 +22110,10 @@
           </p:cxnSp>
           <p:cxnSp>
             <p:nvCxnSpPr>
-              <p:cNvPr id="127" name="Straight Arrow Connector 126">
+              <p:cNvPr id="182" name="Straight Arrow Connector 181">
                 <a:extLst>
                   <a:ext uri="{FF2B5EF4-FFF2-40B4-BE49-F238E27FC236}">
-                    <a16:creationId xmlns:a16="http://schemas.microsoft.com/office/drawing/2014/main" id="{26F1770A-8ED8-9744-A27E-9DD41916AACF}"/>
+                    <a16:creationId xmlns:a16="http://schemas.microsoft.com/office/drawing/2014/main" id="{E9E83A4A-8208-4561-8A33-57EC9EC15FFE}"/>
                   </a:ext>
                 </a:extLst>
               </p:cNvPr>
@@ -22193,10 +22157,10 @@
           </p:cxnSp>
           <p:cxnSp>
             <p:nvCxnSpPr>
-              <p:cNvPr id="128" name="Straight Arrow Connector 127">
+              <p:cNvPr id="183" name="Straight Arrow Connector 182">
                 <a:extLst>
                   <a:ext uri="{FF2B5EF4-FFF2-40B4-BE49-F238E27FC236}">
-                    <a16:creationId xmlns:a16="http://schemas.microsoft.com/office/drawing/2014/main" id="{BDC1C9B7-F448-7D49-B14A-52D0647C66BA}"/>
+                    <a16:creationId xmlns:a16="http://schemas.microsoft.com/office/drawing/2014/main" id="{E8BF04C8-E00F-4672-8D55-81D083E995CA}"/>
                   </a:ext>
                 </a:extLst>
               </p:cNvPr>
@@ -22240,10 +22204,10 @@
           </p:cxnSp>
           <p:sp>
             <p:nvSpPr>
-              <p:cNvPr id="129" name="TextBox 128">
+              <p:cNvPr id="184" name="TextBox 183">
                 <a:extLst>
                   <a:ext uri="{FF2B5EF4-FFF2-40B4-BE49-F238E27FC236}">
-                    <a16:creationId xmlns:a16="http://schemas.microsoft.com/office/drawing/2014/main" id="{B1211CE7-B9D1-464A-B942-3F4DE6170644}"/>
+                    <a16:creationId xmlns:a16="http://schemas.microsoft.com/office/drawing/2014/main" id="{DDDEFAE6-D65F-4AA5-A77F-76C661CC497D}"/>
                   </a:ext>
                 </a:extLst>
               </p:cNvPr>
@@ -22289,10 +22253,10 @@
           </p:sp>
           <p:pic>
             <p:nvPicPr>
-              <p:cNvPr id="130" name="Picture 129">
+              <p:cNvPr id="185" name="Picture 184">
                 <a:extLst>
                   <a:ext uri="{FF2B5EF4-FFF2-40B4-BE49-F238E27FC236}">
-                    <a16:creationId xmlns:a16="http://schemas.microsoft.com/office/drawing/2014/main" id="{3BF9DD12-EBA1-A948-B13B-35654247CFFE}"/>
+                    <a16:creationId xmlns:a16="http://schemas.microsoft.com/office/drawing/2014/main" id="{6D2F14C4-1783-4B97-A4B8-0FD72430108E}"/>
                   </a:ext>
                 </a:extLst>
               </p:cNvPr>
@@ -22325,10 +22289,10 @@
           </p:pic>
           <p:sp>
             <p:nvSpPr>
-              <p:cNvPr id="131" name="TextBox 130">
+              <p:cNvPr id="186" name="TextBox 185">
                 <a:extLst>
                   <a:ext uri="{FF2B5EF4-FFF2-40B4-BE49-F238E27FC236}">
-                    <a16:creationId xmlns:a16="http://schemas.microsoft.com/office/drawing/2014/main" id="{04911E64-A563-254F-BA6F-EC2C88DAFA57}"/>
+                    <a16:creationId xmlns:a16="http://schemas.microsoft.com/office/drawing/2014/main" id="{AFF85205-48C3-4DA7-8108-E8D3BDC3D5E8}"/>
                   </a:ext>
                 </a:extLst>
               </p:cNvPr>
@@ -22374,10 +22338,10 @@
           </p:sp>
           <p:pic>
             <p:nvPicPr>
-              <p:cNvPr id="132" name="Picture 131">
+              <p:cNvPr id="187" name="Picture 186">
                 <a:extLst>
                   <a:ext uri="{FF2B5EF4-FFF2-40B4-BE49-F238E27FC236}">
-                    <a16:creationId xmlns:a16="http://schemas.microsoft.com/office/drawing/2014/main" id="{C278C31A-BDCE-3243-9487-347ADF25ECB4}"/>
+                    <a16:creationId xmlns:a16="http://schemas.microsoft.com/office/drawing/2014/main" id="{19D05726-0AE1-48BA-B45D-43F787D2234E}"/>
                   </a:ext>
                 </a:extLst>
               </p:cNvPr>
@@ -22410,10 +22374,10 @@
           </p:pic>
           <p:cxnSp>
             <p:nvCxnSpPr>
-              <p:cNvPr id="133" name="Straight Arrow Connector 132">
+              <p:cNvPr id="188" name="Straight Arrow Connector 187">
                 <a:extLst>
                   <a:ext uri="{FF2B5EF4-FFF2-40B4-BE49-F238E27FC236}">
-                    <a16:creationId xmlns:a16="http://schemas.microsoft.com/office/drawing/2014/main" id="{95B677F0-4370-604D-9A90-46CC6F79C290}"/>
+                    <a16:creationId xmlns:a16="http://schemas.microsoft.com/office/drawing/2014/main" id="{EB338D8F-608A-45F5-8A4C-E5874CACB12E}"/>
                   </a:ext>
                 </a:extLst>
               </p:cNvPr>
@@ -22457,10 +22421,10 @@
           </p:cxnSp>
           <p:cxnSp>
             <p:nvCxnSpPr>
-              <p:cNvPr id="134" name="Straight Arrow Connector 133">
+              <p:cNvPr id="189" name="Straight Arrow Connector 188">
                 <a:extLst>
                   <a:ext uri="{FF2B5EF4-FFF2-40B4-BE49-F238E27FC236}">
-                    <a16:creationId xmlns:a16="http://schemas.microsoft.com/office/drawing/2014/main" id="{2AAE71EA-11D2-EB49-A6C5-ECCCB17E96BF}"/>
+                    <a16:creationId xmlns:a16="http://schemas.microsoft.com/office/drawing/2014/main" id="{BDE849F2-2DA2-4848-B7BF-60D156219A76}"/>
                   </a:ext>
                 </a:extLst>
               </p:cNvPr>
@@ -22504,10 +22468,10 @@
           </p:cxnSp>
           <p:cxnSp>
             <p:nvCxnSpPr>
-              <p:cNvPr id="135" name="Straight Arrow Connector 134">
+              <p:cNvPr id="190" name="Straight Arrow Connector 189">
                 <a:extLst>
                   <a:ext uri="{FF2B5EF4-FFF2-40B4-BE49-F238E27FC236}">
-                    <a16:creationId xmlns:a16="http://schemas.microsoft.com/office/drawing/2014/main" id="{3D7FA432-66EF-324F-B890-05C00407E05E}"/>
+                    <a16:creationId xmlns:a16="http://schemas.microsoft.com/office/drawing/2014/main" id="{9D931397-7639-48D9-8DA9-793592456C72}"/>
                   </a:ext>
                 </a:extLst>
               </p:cNvPr>
@@ -22550,51 +22514,12 @@
             </p:style>
           </p:cxnSp>
         </p:grpSp>
-        <p:pic>
-          <p:nvPicPr>
-            <p:cNvPr id="142" name="Graphic 141">
+        <p:sp>
+          <p:nvSpPr>
+            <p:cNvPr id="151" name="TextBox 150">
               <a:extLst>
                 <a:ext uri="{FF2B5EF4-FFF2-40B4-BE49-F238E27FC236}">
-                  <a16:creationId xmlns:a16="http://schemas.microsoft.com/office/drawing/2014/main" id="{26DBC607-57B7-144F-AA32-C301DEF1C98B}"/>
-                </a:ext>
-              </a:extLst>
-            </p:cNvPr>
-            <p:cNvPicPr>
-              <a:picLocks noChangeAspect="1"/>
-            </p:cNvPicPr>
-            <p:nvPr/>
-          </p:nvPicPr>
-          <p:blipFill>
-            <a:blip r:embed="rId7" cstate="print">
-              <a:extLst>
-                <a:ext uri="{28A0092B-C50C-407E-A947-70E740481C1C}">
-                  <a14:useLocalDpi xmlns:a14="http://schemas.microsoft.com/office/drawing/2010/main" val="0"/>
-                </a:ext>
-                <a:ext uri="{96DAC541-7B7A-43D3-8B79-37D633B846F1}">
-                  <asvg:svgBlip xmlns:asvg="http://schemas.microsoft.com/office/drawing/2016/SVG/main" r:embed="rId8"/>
-                </a:ext>
-              </a:extLst>
-            </a:blip>
-            <a:stretch>
-              <a:fillRect/>
-            </a:stretch>
-          </p:blipFill>
-          <p:spPr>
-            <a:xfrm>
-              <a:off x="9350740" y="2887663"/>
-              <a:ext cx="131621" cy="177866"/>
-            </a:xfrm>
-            <a:prstGeom prst="rect">
-              <a:avLst/>
-            </a:prstGeom>
-          </p:spPr>
-        </p:pic>
-        <p:sp>
-          <p:nvSpPr>
-            <p:cNvPr id="143" name="TextBox 142">
-              <a:extLst>
-                <a:ext uri="{FF2B5EF4-FFF2-40B4-BE49-F238E27FC236}">
-                  <a16:creationId xmlns:a16="http://schemas.microsoft.com/office/drawing/2014/main" id="{36865193-B50F-8847-9878-5B44BFBB44CE}"/>
+                  <a16:creationId xmlns:a16="http://schemas.microsoft.com/office/drawing/2014/main" id="{4C2BF8C8-77DD-4679-87C3-513F4C4DC2F2}"/>
                 </a:ext>
               </a:extLst>
             </p:cNvPr>
@@ -22603,7 +22528,7 @@
           </p:nvSpPr>
           <p:spPr>
             <a:xfrm>
-              <a:off x="8931273" y="4012959"/>
+              <a:off x="9105009" y="4012959"/>
               <a:ext cx="966298" cy="517065"/>
             </a:xfrm>
             <a:prstGeom prst="rect">
@@ -22640,10 +22565,10 @@
         </p:sp>
         <p:sp>
           <p:nvSpPr>
-            <p:cNvPr id="144" name="TextBox 143">
+            <p:cNvPr id="152" name="TextBox 151">
               <a:extLst>
                 <a:ext uri="{FF2B5EF4-FFF2-40B4-BE49-F238E27FC236}">
-                  <a16:creationId xmlns:a16="http://schemas.microsoft.com/office/drawing/2014/main" id="{F46E0045-A5E1-6B41-8826-A38C67B47DAE}"/>
+                  <a16:creationId xmlns:a16="http://schemas.microsoft.com/office/drawing/2014/main" id="{6D53E939-D23C-4CFC-99B0-84D1CAEF51A6}"/>
                 </a:ext>
               </a:extLst>
             </p:cNvPr>
@@ -22652,7 +22577,105 @@
           </p:nvSpPr>
           <p:spPr>
             <a:xfrm>
-              <a:off x="8529682" y="4025488"/>
+              <a:off x="8598262" y="4025488"/>
+              <a:ext cx="739729" cy="517065"/>
+            </a:xfrm>
+            <a:prstGeom prst="rect">
+              <a:avLst/>
+            </a:prstGeom>
+            <a:noFill/>
+          </p:spPr>
+          <p:txBody>
+            <a:bodyPr wrap="square" lIns="182880" tIns="146304" rIns="182880" bIns="146304" rtlCol="0">
+              <a:spAutoFit/>
+            </a:bodyPr>
+            <a:lstStyle/>
+            <a:p>
+              <a:pPr algn="ctr">
+                <a:lnSpc>
+                  <a:spcPct val="90000"/>
+                </a:lnSpc>
+                <a:spcAft>
+                  <a:spcPts val="600"/>
+                </a:spcAft>
+              </a:pPr>
+              <a:r>
+                <a:rPr lang="en-US" sz="800" dirty="0">
+                  <a:solidFill>
+                    <a:schemeClr val="bg1"/>
+                  </a:solidFill>
+                  <a:latin typeface="Arial" panose="020B0604020202020204" pitchFamily="34" charset="0"/>
+                  <a:cs typeface="Arial" panose="020B0604020202020204" pitchFamily="34" charset="0"/>
+                </a:rPr>
+                <a:t>App Service</a:t>
+              </a:r>
+            </a:p>
+          </p:txBody>
+        </p:sp>
+        <p:sp>
+          <p:nvSpPr>
+            <p:cNvPr id="153" name="TextBox 152">
+              <a:extLst>
+                <a:ext uri="{FF2B5EF4-FFF2-40B4-BE49-F238E27FC236}">
+                  <a16:creationId xmlns:a16="http://schemas.microsoft.com/office/drawing/2014/main" id="{0E04A473-BDF1-4CD8-A764-8AC6CBA79994}"/>
+                </a:ext>
+              </a:extLst>
+            </p:cNvPr>
+            <p:cNvSpPr txBox="1"/>
+            <p:nvPr/>
+          </p:nvSpPr>
+          <p:spPr>
+            <a:xfrm>
+              <a:off x="10498603" y="3464056"/>
+              <a:ext cx="1049333" cy="517065"/>
+            </a:xfrm>
+            <a:prstGeom prst="rect">
+              <a:avLst/>
+            </a:prstGeom>
+            <a:noFill/>
+          </p:spPr>
+          <p:txBody>
+            <a:bodyPr wrap="square" lIns="182880" tIns="146304" rIns="182880" bIns="146304" rtlCol="0">
+              <a:spAutoFit/>
+            </a:bodyPr>
+            <a:lstStyle/>
+            <a:p>
+              <a:pPr algn="ctr">
+                <a:lnSpc>
+                  <a:spcPct val="90000"/>
+                </a:lnSpc>
+                <a:spcAft>
+                  <a:spcPts val="600"/>
+                </a:spcAft>
+              </a:pPr>
+              <a:r>
+                <a:rPr lang="en-US" sz="800" dirty="0">
+                  <a:solidFill>
+                    <a:schemeClr val="bg1"/>
+                  </a:solidFill>
+                  <a:latin typeface="Arial" panose="020B0604020202020204" pitchFamily="34" charset="0"/>
+                  <a:cs typeface="Arial" panose="020B0604020202020204" pitchFamily="34" charset="0"/>
+                </a:rPr>
+                <a:t>Azure PostgreSQL</a:t>
+              </a:r>
+            </a:p>
+          </p:txBody>
+        </p:sp>
+        <p:sp>
+          <p:nvSpPr>
+            <p:cNvPr id="154" name="TextBox 153">
+              <a:extLst>
+                <a:ext uri="{FF2B5EF4-FFF2-40B4-BE49-F238E27FC236}">
+                  <a16:creationId xmlns:a16="http://schemas.microsoft.com/office/drawing/2014/main" id="{9F46FC12-ACC4-40B6-949C-7400F36DA495}"/>
+                </a:ext>
+              </a:extLst>
+            </p:cNvPr>
+            <p:cNvSpPr txBox="1"/>
+            <p:nvPr/>
+          </p:nvSpPr>
+          <p:spPr>
+            <a:xfrm>
+              <a:off x="10039759" y="3470529"/>
               <a:ext cx="739729" cy="517065"/>
             </a:xfrm>
             <a:prstGeom prst="rect">
@@ -22689,258 +22712,10 @@
         </p:sp>
         <p:pic>
           <p:nvPicPr>
-            <p:cNvPr id="145" name="Picture 144">
+            <p:cNvPr id="155" name="Picture 154">
               <a:extLst>
                 <a:ext uri="{FF2B5EF4-FFF2-40B4-BE49-F238E27FC236}">
-                  <a16:creationId xmlns:a16="http://schemas.microsoft.com/office/drawing/2014/main" id="{4B963048-4005-FD42-9651-4D375A555B16}"/>
-                </a:ext>
-              </a:extLst>
-            </p:cNvPr>
-            <p:cNvPicPr>
-              <a:picLocks noChangeAspect="1"/>
-            </p:cNvPicPr>
-            <p:nvPr/>
-          </p:nvPicPr>
-          <p:blipFill>
-            <a:blip r:embed="rId6" cstate="print">
-              <a:extLst>
-                <a:ext uri="{28A0092B-C50C-407E-A947-70E740481C1C}">
-                  <a14:useLocalDpi xmlns:a14="http://schemas.microsoft.com/office/drawing/2010/main" val="0"/>
-                </a:ext>
-              </a:extLst>
-            </a:blip>
-            <a:stretch>
-              <a:fillRect/>
-            </a:stretch>
-          </p:blipFill>
-          <p:spPr>
-            <a:xfrm>
-              <a:off x="8821295" y="3956979"/>
-              <a:ext cx="193592" cy="193592"/>
-            </a:xfrm>
-            <a:prstGeom prst="rect">
-              <a:avLst/>
-            </a:prstGeom>
-          </p:spPr>
-        </p:pic>
-        <p:pic>
-          <p:nvPicPr>
-            <p:cNvPr id="146" name="Graphic 145">
-              <a:extLst>
-                <a:ext uri="{FF2B5EF4-FFF2-40B4-BE49-F238E27FC236}">
-                  <a16:creationId xmlns:a16="http://schemas.microsoft.com/office/drawing/2014/main" id="{A29A7840-1936-A445-A6F5-CFBFF1C93CAD}"/>
-                </a:ext>
-              </a:extLst>
-            </p:cNvPr>
-            <p:cNvPicPr>
-              <a:picLocks noChangeAspect="1"/>
-            </p:cNvPicPr>
-            <p:nvPr/>
-          </p:nvPicPr>
-          <p:blipFill>
-            <a:blip r:embed="rId7" cstate="print">
-              <a:extLst>
-                <a:ext uri="{28A0092B-C50C-407E-A947-70E740481C1C}">
-                  <a14:useLocalDpi xmlns:a14="http://schemas.microsoft.com/office/drawing/2010/main" val="0"/>
-                </a:ext>
-                <a:ext uri="{96DAC541-7B7A-43D3-8B79-37D633B846F1}">
-                  <asvg:svgBlip xmlns:asvg="http://schemas.microsoft.com/office/drawing/2016/SVG/main" r:embed="rId8"/>
-                </a:ext>
-              </a:extLst>
-            </a:blip>
-            <a:stretch>
-              <a:fillRect/>
-            </a:stretch>
-          </p:blipFill>
-          <p:spPr>
-            <a:xfrm>
-              <a:off x="9365330" y="3949315"/>
-              <a:ext cx="131621" cy="177866"/>
-            </a:xfrm>
-            <a:prstGeom prst="rect">
-              <a:avLst/>
-            </a:prstGeom>
-          </p:spPr>
-        </p:pic>
-        <p:sp>
-          <p:nvSpPr>
-            <p:cNvPr id="147" name="TextBox 146">
-              <a:extLst>
-                <a:ext uri="{FF2B5EF4-FFF2-40B4-BE49-F238E27FC236}">
-                  <a16:creationId xmlns:a16="http://schemas.microsoft.com/office/drawing/2014/main" id="{3112BBED-1814-E44E-AFBA-379210019284}"/>
-                </a:ext>
-              </a:extLst>
-            </p:cNvPr>
-            <p:cNvSpPr txBox="1"/>
-            <p:nvPr/>
-          </p:nvSpPr>
-          <p:spPr>
-            <a:xfrm>
-              <a:off x="10324867" y="3464056"/>
-              <a:ext cx="1049333" cy="517065"/>
-            </a:xfrm>
-            <a:prstGeom prst="rect">
-              <a:avLst/>
-            </a:prstGeom>
-            <a:noFill/>
-          </p:spPr>
-          <p:txBody>
-            <a:bodyPr wrap="square" lIns="182880" tIns="146304" rIns="182880" bIns="146304" rtlCol="0">
-              <a:spAutoFit/>
-            </a:bodyPr>
-            <a:lstStyle/>
-            <a:p>
-              <a:pPr algn="ctr">
-                <a:lnSpc>
-                  <a:spcPct val="90000"/>
-                </a:lnSpc>
-                <a:spcAft>
-                  <a:spcPts val="600"/>
-                </a:spcAft>
-              </a:pPr>
-              <a:r>
-                <a:rPr lang="en-US" sz="800" dirty="0">
-                  <a:solidFill>
-                    <a:schemeClr val="bg1"/>
-                  </a:solidFill>
-                  <a:latin typeface="Arial" panose="020B0604020202020204" pitchFamily="34" charset="0"/>
-                  <a:cs typeface="Arial" panose="020B0604020202020204" pitchFamily="34" charset="0"/>
-                </a:rPr>
-                <a:t>Azure PostgreSQL</a:t>
-              </a:r>
-            </a:p>
-          </p:txBody>
-        </p:sp>
-        <p:sp>
-          <p:nvSpPr>
-            <p:cNvPr id="148" name="TextBox 147">
-              <a:extLst>
-                <a:ext uri="{FF2B5EF4-FFF2-40B4-BE49-F238E27FC236}">
-                  <a16:creationId xmlns:a16="http://schemas.microsoft.com/office/drawing/2014/main" id="{7CEA8FCB-32F3-EA4A-93E8-E7CCA68D947B}"/>
-                </a:ext>
-              </a:extLst>
-            </p:cNvPr>
-            <p:cNvSpPr txBox="1"/>
-            <p:nvPr/>
-          </p:nvSpPr>
-          <p:spPr>
-            <a:xfrm>
-              <a:off x="9971179" y="3470529"/>
-              <a:ext cx="739729" cy="517065"/>
-            </a:xfrm>
-            <a:prstGeom prst="rect">
-              <a:avLst/>
-            </a:prstGeom>
-            <a:noFill/>
-          </p:spPr>
-          <p:txBody>
-            <a:bodyPr wrap="square" lIns="182880" tIns="146304" rIns="182880" bIns="146304" rtlCol="0">
-              <a:spAutoFit/>
-            </a:bodyPr>
-            <a:lstStyle/>
-            <a:p>
-              <a:pPr algn="ctr">
-                <a:lnSpc>
-                  <a:spcPct val="90000"/>
-                </a:lnSpc>
-                <a:spcAft>
-                  <a:spcPts val="600"/>
-                </a:spcAft>
-              </a:pPr>
-              <a:r>
-                <a:rPr lang="en-US" sz="800" dirty="0">
-                  <a:solidFill>
-                    <a:schemeClr val="bg1"/>
-                  </a:solidFill>
-                  <a:latin typeface="Arial" panose="020B0604020202020204" pitchFamily="34" charset="0"/>
-                  <a:cs typeface="Arial" panose="020B0604020202020204" pitchFamily="34" charset="0"/>
-                </a:rPr>
-                <a:t>App Service</a:t>
-              </a:r>
-            </a:p>
-          </p:txBody>
-        </p:sp>
-        <p:pic>
-          <p:nvPicPr>
-            <p:cNvPr id="149" name="Picture 148">
-              <a:extLst>
-                <a:ext uri="{FF2B5EF4-FFF2-40B4-BE49-F238E27FC236}">
-                  <a16:creationId xmlns:a16="http://schemas.microsoft.com/office/drawing/2014/main" id="{7092B6CE-B30F-D946-8CB9-21195B2A938E}"/>
-                </a:ext>
-              </a:extLst>
-            </p:cNvPr>
-            <p:cNvPicPr>
-              <a:picLocks noChangeAspect="1"/>
-            </p:cNvPicPr>
-            <p:nvPr/>
-          </p:nvPicPr>
-          <p:blipFill>
-            <a:blip r:embed="rId6" cstate="print">
-              <a:extLst>
-                <a:ext uri="{28A0092B-C50C-407E-A947-70E740481C1C}">
-                  <a14:useLocalDpi xmlns:a14="http://schemas.microsoft.com/office/drawing/2010/main" val="0"/>
-                </a:ext>
-              </a:extLst>
-            </a:blip>
-            <a:stretch>
-              <a:fillRect/>
-            </a:stretch>
-          </p:blipFill>
-          <p:spPr>
-            <a:xfrm>
-              <a:off x="10251882" y="3400082"/>
-              <a:ext cx="193592" cy="193592"/>
-            </a:xfrm>
-            <a:prstGeom prst="rect">
-              <a:avLst/>
-            </a:prstGeom>
-          </p:spPr>
-        </p:pic>
-        <p:pic>
-          <p:nvPicPr>
-            <p:cNvPr id="150" name="Graphic 149">
-              <a:extLst>
-                <a:ext uri="{FF2B5EF4-FFF2-40B4-BE49-F238E27FC236}">
-                  <a16:creationId xmlns:a16="http://schemas.microsoft.com/office/drawing/2014/main" id="{905B2035-5D37-FD4D-BDF3-83D98664314A}"/>
-                </a:ext>
-              </a:extLst>
-            </p:cNvPr>
-            <p:cNvPicPr>
-              <a:picLocks noChangeAspect="1"/>
-            </p:cNvPicPr>
-            <p:nvPr/>
-          </p:nvPicPr>
-          <p:blipFill>
-            <a:blip r:embed="rId7" cstate="print">
-              <a:extLst>
-                <a:ext uri="{28A0092B-C50C-407E-A947-70E740481C1C}">
-                  <a14:useLocalDpi xmlns:a14="http://schemas.microsoft.com/office/drawing/2010/main" val="0"/>
-                </a:ext>
-                <a:ext uri="{96DAC541-7B7A-43D3-8B79-37D633B846F1}">
-                  <asvg:svgBlip xmlns:asvg="http://schemas.microsoft.com/office/drawing/2016/SVG/main" r:embed="rId8"/>
-                </a:ext>
-              </a:extLst>
-            </a:blip>
-            <a:stretch>
-              <a:fillRect/>
-            </a:stretch>
-          </p:blipFill>
-          <p:spPr>
-            <a:xfrm>
-              <a:off x="10790321" y="3410680"/>
-              <a:ext cx="131621" cy="177866"/>
-            </a:xfrm>
-            <a:prstGeom prst="rect">
-              <a:avLst/>
-            </a:prstGeom>
-          </p:spPr>
-        </p:pic>
-        <p:pic>
-          <p:nvPicPr>
-            <p:cNvPr id="48" name="Picture 47">
-              <a:extLst>
-                <a:ext uri="{FF2B5EF4-FFF2-40B4-BE49-F238E27FC236}">
-                  <a16:creationId xmlns:a16="http://schemas.microsoft.com/office/drawing/2014/main" id="{A6F2AD7D-41E6-4AA4-9E4F-F10307A8CF87}"/>
+                  <a16:creationId xmlns:a16="http://schemas.microsoft.com/office/drawing/2014/main" id="{B2D5F433-A422-4EC3-BE36-A7294D86A662}"/>
                 </a:ext>
               </a:extLst>
             </p:cNvPr>
@@ -22950,13 +22725,13 @@
             <p:nvPr/>
           </p:nvPicPr>
           <p:blipFill rotWithShape="1">
-            <a:blip r:embed="rId9"/>
+            <a:blip r:embed="rId6"/>
             <a:srcRect l="3302" t="6466" r="5732" b="6346"/>
             <a:stretch/>
           </p:blipFill>
           <p:spPr>
             <a:xfrm>
-              <a:off x="8786711" y="2875298"/>
+              <a:off x="8855291" y="2875298"/>
               <a:ext cx="191958" cy="190661"/>
             </a:xfrm>
             <a:prstGeom prst="rect">
@@ -22966,10 +22741,10 @@
         </p:pic>
         <p:pic>
           <p:nvPicPr>
-            <p:cNvPr id="49" name="Picture 48">
+            <p:cNvPr id="156" name="Picture 155">
               <a:extLst>
                 <a:ext uri="{FF2B5EF4-FFF2-40B4-BE49-F238E27FC236}">
-                  <a16:creationId xmlns:a16="http://schemas.microsoft.com/office/drawing/2014/main" id="{4BD78F7D-9809-4AAF-839B-23FD97DE071C}"/>
+                  <a16:creationId xmlns:a16="http://schemas.microsoft.com/office/drawing/2014/main" id="{DF4A35D8-D569-4F30-A28F-5B9473B5BF99}"/>
                 </a:ext>
               </a:extLst>
             </p:cNvPr>
@@ -22979,13 +22754,13 @@
             <p:nvPr/>
           </p:nvPicPr>
           <p:blipFill rotWithShape="1">
-            <a:blip r:embed="rId10"/>
+            <a:blip r:embed="rId7"/>
             <a:srcRect l="8063" t="5692" r="7576" b="4929"/>
             <a:stretch/>
           </p:blipFill>
           <p:spPr>
             <a:xfrm>
-              <a:off x="9350740" y="2887663"/>
+              <a:off x="9524476" y="2887663"/>
               <a:ext cx="131524" cy="177866"/>
             </a:xfrm>
             <a:prstGeom prst="rect">
@@ -22995,10 +22770,10 @@
         </p:pic>
         <p:pic>
           <p:nvPicPr>
-            <p:cNvPr id="52" name="Picture 51">
+            <p:cNvPr id="157" name="Picture 156">
               <a:extLst>
                 <a:ext uri="{FF2B5EF4-FFF2-40B4-BE49-F238E27FC236}">
-                  <a16:creationId xmlns:a16="http://schemas.microsoft.com/office/drawing/2014/main" id="{790AB284-ADDC-4395-8C49-DFE732D1A9B0}"/>
+                  <a16:creationId xmlns:a16="http://schemas.microsoft.com/office/drawing/2014/main" id="{B29B0ED4-2A2C-4F88-A3FC-8406AAB87590}"/>
                 </a:ext>
               </a:extLst>
             </p:cNvPr>
@@ -23008,13 +22783,13 @@
             <p:nvPr/>
           </p:nvPicPr>
           <p:blipFill rotWithShape="1">
-            <a:blip r:embed="rId9"/>
+            <a:blip r:embed="rId6"/>
             <a:srcRect l="3302" t="6466" r="5732" b="6346"/>
             <a:stretch/>
           </p:blipFill>
           <p:spPr>
             <a:xfrm>
-              <a:off x="8821198" y="3956686"/>
+              <a:off x="8889778" y="3956686"/>
               <a:ext cx="191958" cy="190661"/>
             </a:xfrm>
             <a:prstGeom prst="rect">
@@ -23024,10 +22799,10 @@
         </p:pic>
         <p:pic>
           <p:nvPicPr>
-            <p:cNvPr id="53" name="Picture 52">
+            <p:cNvPr id="158" name="Picture 157">
               <a:extLst>
                 <a:ext uri="{FF2B5EF4-FFF2-40B4-BE49-F238E27FC236}">
-                  <a16:creationId xmlns:a16="http://schemas.microsoft.com/office/drawing/2014/main" id="{6F61E858-D378-4ADB-B73F-7002CA4114B6}"/>
+                  <a16:creationId xmlns:a16="http://schemas.microsoft.com/office/drawing/2014/main" id="{9293EE3E-561B-441E-AAFE-205B7812C07E}"/>
                 </a:ext>
               </a:extLst>
             </p:cNvPr>
@@ -23037,13 +22812,13 @@
             <p:nvPr/>
           </p:nvPicPr>
           <p:blipFill rotWithShape="1">
-            <a:blip r:embed="rId10"/>
+            <a:blip r:embed="rId7"/>
             <a:srcRect l="8063" t="5692" r="7576" b="4929"/>
             <a:stretch/>
           </p:blipFill>
           <p:spPr>
             <a:xfrm>
-              <a:off x="9365330" y="3956979"/>
+              <a:off x="9539066" y="3956979"/>
               <a:ext cx="131524" cy="177866"/>
             </a:xfrm>
             <a:prstGeom prst="rect">
@@ -23053,10 +22828,10 @@
         </p:pic>
         <p:pic>
           <p:nvPicPr>
-            <p:cNvPr id="54" name="Picture 53">
+            <p:cNvPr id="159" name="Picture 158">
               <a:extLst>
                 <a:ext uri="{FF2B5EF4-FFF2-40B4-BE49-F238E27FC236}">
-                  <a16:creationId xmlns:a16="http://schemas.microsoft.com/office/drawing/2014/main" id="{F22B5599-72D3-4BB3-9F6F-DDA77B3DB932}"/>
+                  <a16:creationId xmlns:a16="http://schemas.microsoft.com/office/drawing/2014/main" id="{3A2DFC04-55FF-477D-A5EE-472A74623C5A}"/>
                 </a:ext>
               </a:extLst>
             </p:cNvPr>
@@ -23066,13 +22841,13 @@
             <p:nvPr/>
           </p:nvPicPr>
           <p:blipFill rotWithShape="1">
-            <a:blip r:embed="rId9"/>
+            <a:blip r:embed="rId6"/>
             <a:srcRect l="3302" t="6466" r="5732" b="6346"/>
             <a:stretch/>
           </p:blipFill>
           <p:spPr>
             <a:xfrm>
-              <a:off x="10254430" y="3401547"/>
+              <a:off x="10323010" y="3401547"/>
               <a:ext cx="191958" cy="190661"/>
             </a:xfrm>
             <a:prstGeom prst="rect">
@@ -23082,10 +22857,10 @@
         </p:pic>
         <p:pic>
           <p:nvPicPr>
-            <p:cNvPr id="55" name="Picture 54">
+            <p:cNvPr id="160" name="Picture 159">
               <a:extLst>
                 <a:ext uri="{FF2B5EF4-FFF2-40B4-BE49-F238E27FC236}">
-                  <a16:creationId xmlns:a16="http://schemas.microsoft.com/office/drawing/2014/main" id="{8CBA2556-4EC4-4D18-AB5A-2B7B4622FF86}"/>
+                  <a16:creationId xmlns:a16="http://schemas.microsoft.com/office/drawing/2014/main" id="{66D81A37-E65E-465A-B6C5-3986698290E5}"/>
                 </a:ext>
               </a:extLst>
             </p:cNvPr>
@@ -23095,13 +22870,13 @@
             <p:nvPr/>
           </p:nvPicPr>
           <p:blipFill rotWithShape="1">
-            <a:blip r:embed="rId10"/>
+            <a:blip r:embed="rId7"/>
             <a:srcRect l="8063" t="5692" r="7576" b="4929"/>
             <a:stretch/>
           </p:blipFill>
           <p:spPr>
             <a:xfrm>
-              <a:off x="10791081" y="3411868"/>
+              <a:off x="10964817" y="3411868"/>
               <a:ext cx="131524" cy="177866"/>
             </a:xfrm>
             <a:prstGeom prst="rect">
@@ -23111,10 +22886,10 @@
         </p:pic>
         <p:pic>
           <p:nvPicPr>
-            <p:cNvPr id="1026" name="Picture 2" descr="See the source image">
+            <p:cNvPr id="161" name="Picture 2" descr="See the source image">
               <a:extLst>
                 <a:ext uri="{FF2B5EF4-FFF2-40B4-BE49-F238E27FC236}">
-                  <a16:creationId xmlns:a16="http://schemas.microsoft.com/office/drawing/2014/main" id="{3F43361F-CBBE-4CFD-BF1A-EF55A3BF6BB0}"/>
+                  <a16:creationId xmlns:a16="http://schemas.microsoft.com/office/drawing/2014/main" id="{46E14383-BA60-42C8-9E33-97C8A7CAAE40}"/>
                 </a:ext>
               </a:extLst>
             </p:cNvPr>
@@ -23124,7 +22899,7 @@
             <p:nvPr/>
           </p:nvPicPr>
           <p:blipFill>
-            <a:blip r:embed="rId11" cstate="print">
+            <a:blip r:embed="rId8" cstate="print">
               <a:extLst>
                 <a:ext uri="{28A0092B-C50C-407E-A947-70E740481C1C}">
                   <a14:useLocalDpi xmlns:a14="http://schemas.microsoft.com/office/drawing/2010/main" val="0"/>
@@ -23151,10 +22926,10 @@
         </p:pic>
         <p:pic>
           <p:nvPicPr>
-            <p:cNvPr id="56" name="Picture 55" descr="A picture containing airplane, fence&#10;&#10;Description automatically generated">
+            <p:cNvPr id="162" name="Picture 161" descr="A picture containing airplane, fence&#10;&#10;Description automatically generated">
               <a:extLst>
                 <a:ext uri="{FF2B5EF4-FFF2-40B4-BE49-F238E27FC236}">
-                  <a16:creationId xmlns:a16="http://schemas.microsoft.com/office/drawing/2014/main" id="{90695FBB-0388-419F-B365-A0D5A7A31190}"/>
+                  <a16:creationId xmlns:a16="http://schemas.microsoft.com/office/drawing/2014/main" id="{986F0685-83AD-46C3-B0DD-1B184533EA26}"/>
                 </a:ext>
               </a:extLst>
             </p:cNvPr>
@@ -23164,7 +22939,7 @@
             <p:nvPr/>
           </p:nvPicPr>
           <p:blipFill rotWithShape="1">
-            <a:blip r:embed="rId12" cstate="print">
+            <a:blip r:embed="rId9" cstate="print">
               <a:extLst>
                 <a:ext uri="{28A0092B-C50C-407E-A947-70E740481C1C}">
                   <a14:useLocalDpi xmlns:a14="http://schemas.microsoft.com/office/drawing/2010/main" val="0"/>
@@ -23189,10 +22964,10 @@
         </p:pic>
         <p:pic>
           <p:nvPicPr>
-            <p:cNvPr id="57" name="Graphic 56">
+            <p:cNvPr id="163" name="Graphic 162">
               <a:extLst>
                 <a:ext uri="{FF2B5EF4-FFF2-40B4-BE49-F238E27FC236}">
-                  <a16:creationId xmlns:a16="http://schemas.microsoft.com/office/drawing/2014/main" id="{44B3A9A3-8B31-40A4-AD22-A9E81EA18842}"/>
+                  <a16:creationId xmlns:a16="http://schemas.microsoft.com/office/drawing/2014/main" id="{C1DD6313-7D9C-44AD-AD62-BE3A2139E68D}"/>
                 </a:ext>
               </a:extLst>
             </p:cNvPr>
@@ -23202,13 +22977,13 @@
             <p:nvPr/>
           </p:nvPicPr>
           <p:blipFill>
-            <a:blip r:embed="rId13">
+            <a:blip r:embed="rId10">
               <a:extLst>
                 <a:ext uri="{28A0092B-C50C-407E-A947-70E740481C1C}">
                   <a14:useLocalDpi xmlns:a14="http://schemas.microsoft.com/office/drawing/2010/main" val="0"/>
                 </a:ext>
                 <a:ext uri="{96DAC541-7B7A-43D3-8B79-37D633B846F1}">
-                  <asvg:svgBlip xmlns:asvg="http://schemas.microsoft.com/office/drawing/2016/SVG/main" r:embed="rId14"/>
+                  <asvg:svgBlip xmlns:asvg="http://schemas.microsoft.com/office/drawing/2016/SVG/main" r:embed="rId11"/>
                 </a:ext>
               </a:extLst>
             </a:blip>

</xml_diff>